<commit_message>
delete slide references, all will be on the bib slide at the end
</commit_message>
<xml_diff>
--- a/content/presentation/Presentation-Stream-Processing-Merged.pptx
+++ b/content/presentation/Presentation-Stream-Processing-Merged.pptx
@@ -303,14 +303,14 @@
           <a:effectLst/>
           <a:extLst>
             <a:ext uri="{909E8E84-426E-40dd-AFC4-6F175D3DCCD1}">
-              <a14:hiddenFill xmlns:a14="http://schemas.microsoft.com/office/drawing/2010/main" xmlns="">
+              <a14:hiddenFill xmlns="" xmlns:a14="http://schemas.microsoft.com/office/drawing/2010/main">
                 <a:solidFill>
                   <a:schemeClr val="accent1"/>
                 </a:solidFill>
               </a14:hiddenFill>
             </a:ext>
             <a:ext uri="{91240B29-F687-4f45-9708-019B960494DF}">
-              <a14:hiddenLine xmlns:a14="http://schemas.microsoft.com/office/drawing/2010/main" xmlns="" w="9525">
+              <a14:hiddenLine xmlns="" xmlns:a14="http://schemas.microsoft.com/office/drawing/2010/main" w="9525">
                 <a:solidFill>
                   <a:schemeClr val="tx1"/>
                 </a:solidFill>
@@ -320,7 +320,7 @@
               </a14:hiddenLine>
             </a:ext>
             <a:ext uri="{AF507438-7753-43e0-B8FC-AC1667EBCBE1}">
-              <a14:hiddenEffects xmlns:a14="http://schemas.microsoft.com/office/drawing/2010/main" xmlns="">
+              <a14:hiddenEffects xmlns="" xmlns:a14="http://schemas.microsoft.com/office/drawing/2010/main">
                 <a:effectLst>
                   <a:outerShdw blurRad="63500" dist="38099" dir="2700000" algn="ctr" rotWithShape="0">
                     <a:schemeClr val="bg2">
@@ -331,7 +331,7 @@
               </a14:hiddenEffects>
             </a:ext>
             <a:ext uri="{FAA26D3D-D897-4be2-8F04-BA451C77F1D7}">
-              <ma14:placeholderFlag xmlns:ma14="http://schemas.microsoft.com/office/mac/drawingml/2011/main" xmlns="" val="1"/>
+              <ma14:placeholderFlag xmlns="" xmlns:ma14="http://schemas.microsoft.com/office/mac/drawingml/2011/main" val="1"/>
             </a:ext>
           </a:extLst>
         </p:spPr>
@@ -381,14 +381,14 @@
           <a:effectLst/>
           <a:extLst>
             <a:ext uri="{909E8E84-426E-40dd-AFC4-6F175D3DCCD1}">
-              <a14:hiddenFill xmlns:a14="http://schemas.microsoft.com/office/drawing/2010/main" xmlns="">
+              <a14:hiddenFill xmlns="" xmlns:a14="http://schemas.microsoft.com/office/drawing/2010/main">
                 <a:solidFill>
                   <a:schemeClr val="accent1"/>
                 </a:solidFill>
               </a14:hiddenFill>
             </a:ext>
             <a:ext uri="{91240B29-F687-4f45-9708-019B960494DF}">
-              <a14:hiddenLine xmlns:a14="http://schemas.microsoft.com/office/drawing/2010/main" xmlns="" w="9525">
+              <a14:hiddenLine xmlns="" xmlns:a14="http://schemas.microsoft.com/office/drawing/2010/main" w="9525">
                 <a:solidFill>
                   <a:schemeClr val="tx1"/>
                 </a:solidFill>
@@ -398,7 +398,7 @@
               </a14:hiddenLine>
             </a:ext>
             <a:ext uri="{AF507438-7753-43e0-B8FC-AC1667EBCBE1}">
-              <a14:hiddenEffects xmlns:a14="http://schemas.microsoft.com/office/drawing/2010/main" xmlns="">
+              <a14:hiddenEffects xmlns="" xmlns:a14="http://schemas.microsoft.com/office/drawing/2010/main">
                 <a:effectLst>
                   <a:outerShdw blurRad="63500" dist="38099" dir="2700000" algn="ctr" rotWithShape="0">
                     <a:schemeClr val="bg2">
@@ -409,7 +409,7 @@
               </a14:hiddenEffects>
             </a:ext>
             <a:ext uri="{FAA26D3D-D897-4be2-8F04-BA451C77F1D7}">
-              <ma14:placeholderFlag xmlns:ma14="http://schemas.microsoft.com/office/mac/drawingml/2011/main" xmlns="" val="1"/>
+              <ma14:placeholderFlag xmlns="" xmlns:ma14="http://schemas.microsoft.com/office/mac/drawingml/2011/main" val="1"/>
             </a:ext>
           </a:extLst>
         </p:spPr>
@@ -459,14 +459,14 @@
           <a:effectLst/>
           <a:extLst>
             <a:ext uri="{909E8E84-426E-40dd-AFC4-6F175D3DCCD1}">
-              <a14:hiddenFill xmlns:a14="http://schemas.microsoft.com/office/drawing/2010/main" xmlns="">
+              <a14:hiddenFill xmlns="" xmlns:a14="http://schemas.microsoft.com/office/drawing/2010/main">
                 <a:solidFill>
                   <a:schemeClr val="accent1"/>
                 </a:solidFill>
               </a14:hiddenFill>
             </a:ext>
             <a:ext uri="{91240B29-F687-4f45-9708-019B960494DF}">
-              <a14:hiddenLine xmlns:a14="http://schemas.microsoft.com/office/drawing/2010/main" xmlns="" w="9525">
+              <a14:hiddenLine xmlns="" xmlns:a14="http://schemas.microsoft.com/office/drawing/2010/main" w="9525">
                 <a:solidFill>
                   <a:schemeClr val="tx1"/>
                 </a:solidFill>
@@ -476,7 +476,7 @@
               </a14:hiddenLine>
             </a:ext>
             <a:ext uri="{AF507438-7753-43e0-B8FC-AC1667EBCBE1}">
-              <a14:hiddenEffects xmlns:a14="http://schemas.microsoft.com/office/drawing/2010/main" xmlns="">
+              <a14:hiddenEffects xmlns="" xmlns:a14="http://schemas.microsoft.com/office/drawing/2010/main">
                 <a:effectLst>
                   <a:outerShdw blurRad="63500" dist="38099" dir="2700000" algn="ctr" rotWithShape="0">
                     <a:schemeClr val="bg2">
@@ -487,7 +487,7 @@
               </a14:hiddenEffects>
             </a:ext>
             <a:ext uri="{FAA26D3D-D897-4be2-8F04-BA451C77F1D7}">
-              <ma14:placeholderFlag xmlns:ma14="http://schemas.microsoft.com/office/mac/drawingml/2011/main" xmlns="" val="1"/>
+              <ma14:placeholderFlag xmlns="" xmlns:ma14="http://schemas.microsoft.com/office/mac/drawingml/2011/main" val="1"/>
             </a:ext>
           </a:extLst>
         </p:spPr>
@@ -537,14 +537,14 @@
           <a:effectLst/>
           <a:extLst>
             <a:ext uri="{909E8E84-426E-40dd-AFC4-6F175D3DCCD1}">
-              <a14:hiddenFill xmlns:a14="http://schemas.microsoft.com/office/drawing/2010/main" xmlns="">
+              <a14:hiddenFill xmlns="" xmlns:a14="http://schemas.microsoft.com/office/drawing/2010/main">
                 <a:solidFill>
                   <a:schemeClr val="accent1"/>
                 </a:solidFill>
               </a14:hiddenFill>
             </a:ext>
             <a:ext uri="{91240B29-F687-4f45-9708-019B960494DF}">
-              <a14:hiddenLine xmlns:a14="http://schemas.microsoft.com/office/drawing/2010/main" xmlns="" w="9525">
+              <a14:hiddenLine xmlns="" xmlns:a14="http://schemas.microsoft.com/office/drawing/2010/main" w="9525">
                 <a:solidFill>
                   <a:schemeClr val="tx1"/>
                 </a:solidFill>
@@ -554,7 +554,7 @@
               </a14:hiddenLine>
             </a:ext>
             <a:ext uri="{AF507438-7753-43e0-B8FC-AC1667EBCBE1}">
-              <a14:hiddenEffects xmlns:a14="http://schemas.microsoft.com/office/drawing/2010/main" xmlns="">
+              <a14:hiddenEffects xmlns="" xmlns:a14="http://schemas.microsoft.com/office/drawing/2010/main">
                 <a:effectLst>
                   <a:outerShdw blurRad="63500" dist="38099" dir="2700000" algn="ctr" rotWithShape="0">
                     <a:schemeClr val="bg2">
@@ -565,7 +565,7 @@
               </a14:hiddenEffects>
             </a:ext>
             <a:ext uri="{FAA26D3D-D897-4be2-8F04-BA451C77F1D7}">
-              <ma14:placeholderFlag xmlns:ma14="http://schemas.microsoft.com/office/mac/drawingml/2011/main" xmlns="" val="1"/>
+              <ma14:placeholderFlag xmlns="" xmlns:ma14="http://schemas.microsoft.com/office/mac/drawingml/2011/main" val="1"/>
             </a:ext>
           </a:extLst>
         </p:spPr>
@@ -589,7 +589,7 @@
             <a:fld id="{D54606BC-1185-6343-8CD4-1A7CC7DA3AB6}" type="slidenum">
               <a:rPr lang="de-DE"/>
               <a:pPr/>
-              <a:t>‹Nr.›</a:t>
+              <a:t>‹#›</a:t>
             </a:fld>
             <a:endParaRPr lang="de-DE"/>
           </a:p>
@@ -661,7 +661,7 @@
           <a:effectLst/>
           <a:extLst>
             <a:ext uri="{AF507438-7753-43e0-B8FC-AC1667EBCBE1}">
-              <a14:hiddenEffects xmlns:a14="http://schemas.microsoft.com/office/drawing/2010/main" xmlns="">
+              <a14:hiddenEffects xmlns="" xmlns:a14="http://schemas.microsoft.com/office/drawing/2010/main">
                 <a:effectLst>
                   <a:outerShdw blurRad="63500" dist="38099" dir="2700000" algn="ctr" rotWithShape="0">
                     <a:srgbClr val="000000">
@@ -672,7 +672,7 @@
               </a14:hiddenEffects>
             </a:ext>
             <a:ext uri="{53640926-AAD7-44d8-BBD7-CCE9431645EC}">
-              <a14:shadowObscured xmlns:a14="http://schemas.microsoft.com/office/drawing/2010/main" xmlns="" val="1"/>
+              <a14:shadowObscured xmlns="" xmlns:a14="http://schemas.microsoft.com/office/drawing/2010/main" val="1"/>
             </a:ext>
           </a:extLst>
         </p:spPr>
@@ -702,14 +702,14 @@
           <a:effectLst/>
           <a:extLst>
             <a:ext uri="{909E8E84-426E-40dd-AFC4-6F175D3DCCD1}">
-              <a14:hiddenFill xmlns:a14="http://schemas.microsoft.com/office/drawing/2010/main" xmlns="">
+              <a14:hiddenFill xmlns="" xmlns:a14="http://schemas.microsoft.com/office/drawing/2010/main">
                 <a:solidFill>
                   <a:schemeClr val="accent1"/>
                 </a:solidFill>
               </a14:hiddenFill>
             </a:ext>
             <a:ext uri="{91240B29-F687-4f45-9708-019B960494DF}">
-              <a14:hiddenLine xmlns:a14="http://schemas.microsoft.com/office/drawing/2010/main" xmlns="" w="9525">
+              <a14:hiddenLine xmlns="" xmlns:a14="http://schemas.microsoft.com/office/drawing/2010/main" w="9525">
                 <a:solidFill>
                   <a:schemeClr val="tx1"/>
                 </a:solidFill>
@@ -719,7 +719,7 @@
               </a14:hiddenLine>
             </a:ext>
             <a:ext uri="{AF507438-7753-43e0-B8FC-AC1667EBCBE1}">
-              <a14:hiddenEffects xmlns:a14="http://schemas.microsoft.com/office/drawing/2010/main" xmlns="">
+              <a14:hiddenEffects xmlns="" xmlns:a14="http://schemas.microsoft.com/office/drawing/2010/main">
                 <a:effectLst>
                   <a:outerShdw blurRad="63500" dist="38099" dir="2700000" algn="ctr" rotWithShape="0">
                     <a:schemeClr val="bg2">
@@ -730,7 +730,7 @@
               </a14:hiddenEffects>
             </a:ext>
             <a:ext uri="{FAA26D3D-D897-4be2-8F04-BA451C77F1D7}">
-              <ma14:placeholderFlag xmlns:ma14="http://schemas.microsoft.com/office/mac/drawingml/2011/main" xmlns="" val="1"/>
+              <ma14:placeholderFlag xmlns="" xmlns:ma14="http://schemas.microsoft.com/office/mac/drawingml/2011/main" val="1"/>
             </a:ext>
           </a:extLst>
         </p:spPr>
@@ -2941,14 +2941,14 @@
           <a:effectLst/>
           <a:extLst>
             <a:ext uri="{909E8E84-426E-40dd-AFC4-6F175D3DCCD1}">
-              <a14:hiddenFill xmlns:a14="http://schemas.microsoft.com/office/drawing/2010/main" xmlns="">
+              <a14:hiddenFill xmlns="" xmlns:a14="http://schemas.microsoft.com/office/drawing/2010/main">
                 <a:solidFill>
                   <a:schemeClr val="accent2"/>
                 </a:solidFill>
               </a14:hiddenFill>
             </a:ext>
             <a:ext uri="{AF507438-7753-43e0-B8FC-AC1667EBCBE1}">
-              <a14:hiddenEffects xmlns:a14="http://schemas.microsoft.com/office/drawing/2010/main" xmlns="">
+              <a14:hiddenEffects xmlns="" xmlns:a14="http://schemas.microsoft.com/office/drawing/2010/main">
                 <a:effectLst>
                   <a:outerShdw blurRad="63500" dist="35921" dir="2700000" algn="ctr" rotWithShape="0">
                     <a:schemeClr val="bg2"/>
@@ -3462,14 +3462,14 @@
           <a:effectLst/>
           <a:extLst>
             <a:ext uri="{909E8E84-426E-40dd-AFC4-6F175D3DCCD1}">
-              <a14:hiddenFill xmlns:a14="http://schemas.microsoft.com/office/drawing/2010/main" xmlns="">
+              <a14:hiddenFill xmlns="" xmlns:a14="http://schemas.microsoft.com/office/drawing/2010/main">
                 <a:solidFill>
                   <a:schemeClr val="accent2"/>
                 </a:solidFill>
               </a14:hiddenFill>
             </a:ext>
             <a:ext uri="{AF507438-7753-43e0-B8FC-AC1667EBCBE1}">
-              <a14:hiddenEffects xmlns:a14="http://schemas.microsoft.com/office/drawing/2010/main" xmlns="">
+              <a14:hiddenEffects xmlns="" xmlns:a14="http://schemas.microsoft.com/office/drawing/2010/main">
                 <a:effectLst>
                   <a:outerShdw blurRad="63500" dist="35921" dir="2700000" algn="ctr" rotWithShape="0">
                     <a:schemeClr val="bg2"/>
@@ -3651,7 +3651,7 @@
           <a:noFill/>
           <a:extLst>
             <a:ext uri="{909E8E84-426E-40dd-AFC4-6F175D3DCCD1}">
-              <a14:hiddenFill xmlns:a14="http://schemas.microsoft.com/office/drawing/2010/main" xmlns="">
+              <a14:hiddenFill xmlns="" xmlns:a14="http://schemas.microsoft.com/office/drawing/2010/main">
                 <a:solidFill>
                   <a:srgbClr val="FFFFFF"/>
                 </a:solidFill>
@@ -3692,7 +3692,7 @@
           <a:noFill/>
           <a:extLst>
             <a:ext uri="{909E8E84-426E-40dd-AFC4-6F175D3DCCD1}">
-              <a14:hiddenFill xmlns:a14="http://schemas.microsoft.com/office/drawing/2010/main" xmlns="">
+              <a14:hiddenFill xmlns="" xmlns:a14="http://schemas.microsoft.com/office/drawing/2010/main">
                 <a:solidFill>
                   <a:srgbClr val="FFFFFF"/>
                 </a:solidFill>
@@ -3721,14 +3721,14 @@
           </a:prstGeom>
           <a:extLst>
             <a:ext uri="{909E8E84-426E-40dd-AFC4-6F175D3DCCD1}">
-              <a14:hiddenFill xmlns:a14="http://schemas.microsoft.com/office/drawing/2010/main" xmlns="">
+              <a14:hiddenFill xmlns="" xmlns:a14="http://schemas.microsoft.com/office/drawing/2010/main">
                 <a:solidFill>
                   <a:schemeClr val="accent2"/>
                 </a:solidFill>
               </a14:hiddenFill>
             </a:ext>
             <a:ext uri="{91240B29-F687-4f45-9708-019B960494DF}">
-              <a14:hiddenLine xmlns:a14="http://schemas.microsoft.com/office/drawing/2010/main" xmlns="" w="9525">
+              <a14:hiddenLine xmlns="" xmlns:a14="http://schemas.microsoft.com/office/drawing/2010/main" w="9525">
                 <a:solidFill>
                   <a:schemeClr val="accent2"/>
                 </a:solidFill>
@@ -4127,7 +4127,7 @@
           <a:noFill/>
           <a:extLst>
             <a:ext uri="{909E8E84-426E-40dd-AFC4-6F175D3DCCD1}">
-              <a14:hiddenFill xmlns:a14="http://schemas.microsoft.com/office/drawing/2010/main" xmlns="">
+              <a14:hiddenFill xmlns="" xmlns:a14="http://schemas.microsoft.com/office/drawing/2010/main">
                 <a:solidFill>
                   <a:srgbClr val="FFFFFF"/>
                 </a:solidFill>
@@ -4322,14 +4322,14 @@
           <a:effectLst/>
           <a:extLst>
             <a:ext uri="{909E8E84-426E-40dd-AFC4-6F175D3DCCD1}">
-              <a14:hiddenFill xmlns:a14="http://schemas.microsoft.com/office/drawing/2010/main" xmlns="">
+              <a14:hiddenFill xmlns="" xmlns:a14="http://schemas.microsoft.com/office/drawing/2010/main">
                 <a:solidFill>
                   <a:schemeClr val="accent2"/>
                 </a:solidFill>
               </a14:hiddenFill>
             </a:ext>
             <a:ext uri="{AF507438-7753-43e0-B8FC-AC1667EBCBE1}">
-              <a14:hiddenEffects xmlns:a14="http://schemas.microsoft.com/office/drawing/2010/main" xmlns="">
+              <a14:hiddenEffects xmlns="" xmlns:a14="http://schemas.microsoft.com/office/drawing/2010/main">
                 <a:effectLst>
                   <a:outerShdw blurRad="63500" dist="35921" dir="2700000" algn="ctr" rotWithShape="0">
                     <a:schemeClr val="bg2"/>
@@ -4411,7 +4411,7 @@
           <a:noFill/>
           <a:extLst>
             <a:ext uri="{909E8E84-426E-40dd-AFC4-6F175D3DCCD1}">
-              <a14:hiddenFill xmlns:a14="http://schemas.microsoft.com/office/drawing/2010/main" xmlns="">
+              <a14:hiddenFill xmlns="" xmlns:a14="http://schemas.microsoft.com/office/drawing/2010/main">
                 <a:solidFill>
                   <a:srgbClr val="FFFFFF"/>
                 </a:solidFill>
@@ -4443,14 +4443,14 @@
           <a:effectLst/>
           <a:extLst>
             <a:ext uri="{909E8E84-426E-40dd-AFC4-6F175D3DCCD1}">
-              <a14:hiddenFill xmlns:a14="http://schemas.microsoft.com/office/drawing/2010/main" xmlns="">
+              <a14:hiddenFill xmlns="" xmlns:a14="http://schemas.microsoft.com/office/drawing/2010/main">
                 <a:solidFill>
                   <a:schemeClr val="accent1"/>
                 </a:solidFill>
               </a14:hiddenFill>
             </a:ext>
             <a:ext uri="{91240B29-F687-4f45-9708-019B960494DF}">
-              <a14:hiddenLine xmlns:a14="http://schemas.microsoft.com/office/drawing/2010/main" xmlns="" w="9525">
+              <a14:hiddenLine xmlns="" xmlns:a14="http://schemas.microsoft.com/office/drawing/2010/main" w="9525">
                 <a:solidFill>
                   <a:schemeClr val="tx1"/>
                 </a:solidFill>
@@ -4460,7 +4460,7 @@
               </a14:hiddenLine>
             </a:ext>
             <a:ext uri="{AF507438-7753-43e0-B8FC-AC1667EBCBE1}">
-              <a14:hiddenEffects xmlns:a14="http://schemas.microsoft.com/office/drawing/2010/main" xmlns="">
+              <a14:hiddenEffects xmlns="" xmlns:a14="http://schemas.microsoft.com/office/drawing/2010/main">
                 <a:effectLst>
                   <a:outerShdw blurRad="63500" dist="38099" dir="2700000" algn="ctr" rotWithShape="0">
                     <a:schemeClr val="bg2">
@@ -4517,7 +4517,7 @@
                   <a:spcPts val="0"/>
                 </a:spcBef>
               </a:pPr>
-              <a:t>‹Nr.›</a:t>
+              <a:t>‹#›</a:t>
             </a:fld>
             <a:r>
               <a:rPr lang="de-DE" sz="800" dirty="0">
@@ -4562,7 +4562,7 @@
           <a:noFill/>
           <a:extLst>
             <a:ext uri="{909E8E84-426E-40dd-AFC4-6F175D3DCCD1}">
-              <a14:hiddenFill xmlns:a14="http://schemas.microsoft.com/office/drawing/2010/main" xmlns="">
+              <a14:hiddenFill xmlns="" xmlns:a14="http://schemas.microsoft.com/office/drawing/2010/main">
                 <a:solidFill>
                   <a:srgbClr val="FFFFFF"/>
                 </a:solidFill>
@@ -4603,7 +4603,7 @@
           <a:noFill/>
           <a:extLst>
             <a:ext uri="{909E8E84-426E-40dd-AFC4-6F175D3DCCD1}">
-              <a14:hiddenFill xmlns:a14="http://schemas.microsoft.com/office/drawing/2010/main" xmlns="">
+              <a14:hiddenFill xmlns="" xmlns:a14="http://schemas.microsoft.com/office/drawing/2010/main">
                 <a:solidFill>
                   <a:srgbClr val="FFFFFF"/>
                 </a:solidFill>
@@ -4641,14 +4641,14 @@
           <a:effectLst/>
           <a:extLst>
             <a:ext uri="{909E8E84-426E-40dd-AFC4-6F175D3DCCD1}">
-              <a14:hiddenFill xmlns:a14="http://schemas.microsoft.com/office/drawing/2010/main" xmlns="">
+              <a14:hiddenFill xmlns="" xmlns:a14="http://schemas.microsoft.com/office/drawing/2010/main">
                 <a:solidFill>
                   <a:schemeClr val="accent1"/>
                 </a:solidFill>
               </a14:hiddenFill>
             </a:ext>
             <a:ext uri="{91240B29-F687-4f45-9708-019B960494DF}">
-              <a14:hiddenLine xmlns:a14="http://schemas.microsoft.com/office/drawing/2010/main" xmlns="" w="9525">
+              <a14:hiddenLine xmlns="" xmlns:a14="http://schemas.microsoft.com/office/drawing/2010/main" w="9525">
                 <a:solidFill>
                   <a:schemeClr val="tx1"/>
                 </a:solidFill>
@@ -4658,7 +4658,7 @@
               </a14:hiddenLine>
             </a:ext>
             <a:ext uri="{AF507438-7753-43e0-B8FC-AC1667EBCBE1}">
-              <a14:hiddenEffects xmlns:a14="http://schemas.microsoft.com/office/drawing/2010/main" xmlns="">
+              <a14:hiddenEffects xmlns="" xmlns:a14="http://schemas.microsoft.com/office/drawing/2010/main">
                 <a:effectLst>
                   <a:outerShdw blurRad="63500" dist="38099" dir="2700000" algn="ctr" rotWithShape="0">
                     <a:schemeClr val="bg2">
@@ -5289,97 +5289,27 @@
             <p:ph type="title"/>
           </p:nvPr>
         </p:nvSpPr>
-        <p:spPr/>
+        <p:spPr>
+          <a:xfrm>
+            <a:off x="572400" y="184706"/>
+            <a:ext cx="8063999" cy="369332"/>
+          </a:xfrm>
+        </p:spPr>
         <p:txBody>
-          <a:bodyPr/>
+          <a:bodyPr anchor="ctr">
+            <a:normAutofit/>
+          </a:bodyPr>
           <a:lstStyle/>
           <a:p>
+            <a:pPr>
+              <a:lnSpc>
+                <a:spcPct val="90000"/>
+              </a:lnSpc>
+            </a:pPr>
             <a:r>
-              <a:rPr lang="de-DE" dirty="0"/>
+              <a:rPr lang="de-DE" sz="2000"/>
               <a:t>Apache Spark</a:t>
             </a:r>
-          </a:p>
-        </p:txBody>
-      </p:sp>
-      <p:sp>
-        <p:nvSpPr>
-          <p:cNvPr id="5" name="Textplatzhalter 4">
-            <a:extLst>
-              <a:ext uri="{FF2B5EF4-FFF2-40B4-BE49-F238E27FC236}">
-                <a16:creationId xmlns:a16="http://schemas.microsoft.com/office/drawing/2014/main" id="{2CC840F3-B6A1-CF2E-1008-FB7F9B8190F7}"/>
-              </a:ext>
-            </a:extLst>
-          </p:cNvPr>
-          <p:cNvSpPr>
-            <a:spLocks noGrp="1"/>
-          </p:cNvSpPr>
-          <p:nvPr>
-            <p:ph type="body" sz="quarter" idx="12"/>
-          </p:nvPr>
-        </p:nvSpPr>
-        <p:spPr/>
-        <p:txBody>
-          <a:bodyPr/>
-          <a:lstStyle/>
-          <a:p>
-            <a:r>
-              <a:rPr lang="de-DE" dirty="0" err="1"/>
-              <a:t>Overview</a:t>
-            </a:r>
-            <a:endParaRPr lang="de-DE" dirty="0"/>
-          </a:p>
-        </p:txBody>
-      </p:sp>
-      <p:sp>
-        <p:nvSpPr>
-          <p:cNvPr id="13" name="Inhaltsplatzhalter 12">
-            <a:extLst>
-              <a:ext uri="{FF2B5EF4-FFF2-40B4-BE49-F238E27FC236}">
-                <a16:creationId xmlns:a16="http://schemas.microsoft.com/office/drawing/2014/main" id="{3675987C-4F66-C465-DF77-15CE17022677}"/>
-              </a:ext>
-            </a:extLst>
-          </p:cNvPr>
-          <p:cNvSpPr>
-            <a:spLocks noGrp="1"/>
-          </p:cNvSpPr>
-          <p:nvPr>
-            <p:ph sz="quarter" idx="10"/>
-          </p:nvPr>
-        </p:nvSpPr>
-        <p:spPr/>
-        <p:txBody>
-          <a:bodyPr/>
-          <a:lstStyle/>
-          <a:p>
-            <a:r>
-              <a:rPr lang="de-DE" dirty="0">
-                <a:latin typeface="+mj-lt"/>
-              </a:rPr>
-              <a:t>12. </a:t>
-            </a:r>
-            <a:r>
-              <a:rPr lang="en-US" sz="900" b="0" i="0" u="none" strike="noStrike" dirty="0" err="1">
-                <a:solidFill>
-                  <a:srgbClr val="7D8591"/>
-                </a:solidFill>
-                <a:effectLst/>
-                <a:latin typeface="+mj-lt"/>
-              </a:rPr>
-              <a:t>Achari</a:t>
-            </a:r>
-            <a:r>
-              <a:rPr lang="en-US" sz="900" b="0" i="0" u="none" strike="noStrike" dirty="0">
-                <a:solidFill>
-                  <a:srgbClr val="7D8591"/>
-                </a:solidFill>
-                <a:effectLst/>
-                <a:latin typeface="+mj-lt"/>
-              </a:rPr>
-              <a:t>, S. (2015)</a:t>
-            </a:r>
-            <a:endParaRPr lang="de-DE" dirty="0">
-              <a:latin typeface="+mj-lt"/>
-            </a:endParaRPr>
           </a:p>
         </p:txBody>
       </p:sp>
@@ -5405,14 +5335,56 @@
         </p:blipFill>
         <p:spPr>
           <a:xfrm>
-            <a:off x="1376362" y="2146634"/>
-            <a:ext cx="6391275" cy="2009775"/>
+            <a:off x="573088" y="2442783"/>
+            <a:ext cx="8063999" cy="2540160"/>
           </a:xfrm>
           <a:prstGeom prst="rect">
             <a:avLst/>
           </a:prstGeom>
+          <a:noFill/>
         </p:spPr>
       </p:pic>
+      <p:sp>
+        <p:nvSpPr>
+          <p:cNvPr id="5" name="Textplatzhalter 4">
+            <a:extLst>
+              <a:ext uri="{FF2B5EF4-FFF2-40B4-BE49-F238E27FC236}">
+                <a16:creationId xmlns:a16="http://schemas.microsoft.com/office/drawing/2014/main" id="{2CC840F3-B6A1-CF2E-1008-FB7F9B8190F7}"/>
+              </a:ext>
+            </a:extLst>
+          </p:cNvPr>
+          <p:cNvSpPr>
+            <a:spLocks noGrp="1"/>
+          </p:cNvSpPr>
+          <p:nvPr>
+            <p:ph type="body" sz="quarter" idx="12"/>
+          </p:nvPr>
+        </p:nvSpPr>
+        <p:spPr>
+          <a:xfrm>
+            <a:off x="572400" y="583200"/>
+            <a:ext cx="8063999" cy="273600"/>
+          </a:xfrm>
+        </p:spPr>
+        <p:txBody>
+          <a:bodyPr anchor="ctr">
+            <a:normAutofit/>
+          </a:bodyPr>
+          <a:lstStyle/>
+          <a:p>
+            <a:pPr>
+              <a:lnSpc>
+                <a:spcPct val="90000"/>
+              </a:lnSpc>
+            </a:pPr>
+            <a:r>
+              <a:rPr lang="de-DE" sz="1300" err="1"/>
+              <a:t>Overview</a:t>
+            </a:r>
+            <a:endParaRPr lang="de-DE" sz="1300"/>
+          </a:p>
+        </p:txBody>
+      </p:sp>
     </p:spTree>
     <p:extLst>
       <p:ext uri="{BB962C8B-B14F-4D97-AF65-F5344CB8AC3E}">
@@ -5462,83 +5434,27 @@
             <p:ph type="title"/>
           </p:nvPr>
         </p:nvSpPr>
-        <p:spPr/>
+        <p:spPr>
+          <a:xfrm>
+            <a:off x="572400" y="184706"/>
+            <a:ext cx="8063999" cy="369332"/>
+          </a:xfrm>
+        </p:spPr>
         <p:txBody>
-          <a:bodyPr/>
+          <a:bodyPr anchor="ctr">
+            <a:normAutofit/>
+          </a:bodyPr>
           <a:lstStyle/>
           <a:p>
+            <a:pPr>
+              <a:lnSpc>
+                <a:spcPct val="90000"/>
+              </a:lnSpc>
+            </a:pPr>
             <a:r>
-              <a:rPr lang="de-DE" dirty="0"/>
+              <a:rPr lang="de-DE" sz="2000"/>
               <a:t>Apache Spark</a:t>
             </a:r>
-          </a:p>
-        </p:txBody>
-      </p:sp>
-      <p:sp>
-        <p:nvSpPr>
-          <p:cNvPr id="5" name="Textplatzhalter 4">
-            <a:extLst>
-              <a:ext uri="{FF2B5EF4-FFF2-40B4-BE49-F238E27FC236}">
-                <a16:creationId xmlns:a16="http://schemas.microsoft.com/office/drawing/2014/main" id="{2CC840F3-B6A1-CF2E-1008-FB7F9B8190F7}"/>
-              </a:ext>
-            </a:extLst>
-          </p:cNvPr>
-          <p:cNvSpPr>
-            <a:spLocks noGrp="1"/>
-          </p:cNvSpPr>
-          <p:nvPr>
-            <p:ph type="body" sz="quarter" idx="12"/>
-          </p:nvPr>
-        </p:nvSpPr>
-        <p:spPr/>
-        <p:txBody>
-          <a:bodyPr/>
-          <a:lstStyle/>
-          <a:p>
-            <a:r>
-              <a:rPr lang="de-DE" dirty="0"/>
-              <a:t>Structured Streaming</a:t>
-            </a:r>
-          </a:p>
-        </p:txBody>
-      </p:sp>
-      <p:sp>
-        <p:nvSpPr>
-          <p:cNvPr id="13" name="Inhaltsplatzhalter 12">
-            <a:extLst>
-              <a:ext uri="{FF2B5EF4-FFF2-40B4-BE49-F238E27FC236}">
-                <a16:creationId xmlns:a16="http://schemas.microsoft.com/office/drawing/2014/main" id="{3675987C-4F66-C465-DF77-15CE17022677}"/>
-              </a:ext>
-            </a:extLst>
-          </p:cNvPr>
-          <p:cNvSpPr>
-            <a:spLocks noGrp="1"/>
-          </p:cNvSpPr>
-          <p:nvPr>
-            <p:ph sz="quarter" idx="10"/>
-          </p:nvPr>
-        </p:nvSpPr>
-        <p:spPr/>
-        <p:txBody>
-          <a:bodyPr/>
-          <a:lstStyle/>
-          <a:p>
-            <a:r>
-              <a:rPr lang="en-US" sz="900" dirty="0">
-                <a:solidFill>
-                  <a:srgbClr val="7D8591"/>
-                </a:solidFill>
-                <a:latin typeface="+mj-lt"/>
-              </a:rPr>
-              <a:t>13. Online: Apache Spark Documentation https://spark.apache.org/docs/latest/structured-streaming-programming-guide.html</a:t>
-            </a:r>
-            <a:endParaRPr lang="en-US" sz="900" b="0" i="0" u="none" strike="noStrike" dirty="0">
-              <a:solidFill>
-                <a:srgbClr val="7D8591"/>
-              </a:solidFill>
-              <a:effectLst/>
-              <a:latin typeface="+mj-lt"/>
-            </a:endParaRPr>
           </a:p>
         </p:txBody>
       </p:sp>
@@ -5564,14 +5480,55 @@
         </p:blipFill>
         <p:spPr>
           <a:xfrm>
-            <a:off x="320040" y="1572768"/>
-            <a:ext cx="8206072" cy="3548189"/>
+            <a:off x="573088" y="1969023"/>
+            <a:ext cx="8063999" cy="3487679"/>
           </a:xfrm>
           <a:prstGeom prst="rect">
             <a:avLst/>
           </a:prstGeom>
+          <a:noFill/>
         </p:spPr>
       </p:pic>
+      <p:sp>
+        <p:nvSpPr>
+          <p:cNvPr id="5" name="Textplatzhalter 4">
+            <a:extLst>
+              <a:ext uri="{FF2B5EF4-FFF2-40B4-BE49-F238E27FC236}">
+                <a16:creationId xmlns:a16="http://schemas.microsoft.com/office/drawing/2014/main" id="{2CC840F3-B6A1-CF2E-1008-FB7F9B8190F7}"/>
+              </a:ext>
+            </a:extLst>
+          </p:cNvPr>
+          <p:cNvSpPr>
+            <a:spLocks noGrp="1"/>
+          </p:cNvSpPr>
+          <p:nvPr>
+            <p:ph type="body" sz="quarter" idx="12"/>
+          </p:nvPr>
+        </p:nvSpPr>
+        <p:spPr>
+          <a:xfrm>
+            <a:off x="572400" y="583200"/>
+            <a:ext cx="8063999" cy="273600"/>
+          </a:xfrm>
+        </p:spPr>
+        <p:txBody>
+          <a:bodyPr anchor="ctr">
+            <a:normAutofit/>
+          </a:bodyPr>
+          <a:lstStyle/>
+          <a:p>
+            <a:pPr>
+              <a:lnSpc>
+                <a:spcPct val="90000"/>
+              </a:lnSpc>
+            </a:pPr>
+            <a:r>
+              <a:rPr lang="de-DE" sz="1300"/>
+              <a:t>Structured Streaming</a:t>
+            </a:r>
+          </a:p>
+        </p:txBody>
+      </p:sp>
     </p:spTree>
     <p:extLst>
       <p:ext uri="{BB962C8B-B14F-4D97-AF65-F5344CB8AC3E}">
@@ -5672,76 +5629,6 @@
       </p:pic>
       <p:sp>
         <p:nvSpPr>
-          <p:cNvPr id="21" name="Content Placeholder 3">
-            <a:extLst>
-              <a:ext uri="{FF2B5EF4-FFF2-40B4-BE49-F238E27FC236}">
-                <a16:creationId xmlns:a16="http://schemas.microsoft.com/office/drawing/2014/main" id="{995106A9-44B5-0237-6AC8-16D7D44CA91B}"/>
-              </a:ext>
-            </a:extLst>
-          </p:cNvPr>
-          <p:cNvSpPr>
-            <a:spLocks noGrp="1"/>
-          </p:cNvSpPr>
-          <p:nvPr>
-            <p:ph sz="quarter" idx="10"/>
-          </p:nvPr>
-        </p:nvSpPr>
-        <p:spPr>
-          <a:xfrm>
-            <a:off x="1286541" y="5818708"/>
-            <a:ext cx="7350546" cy="292162"/>
-          </a:xfrm>
-        </p:spPr>
-        <p:txBody>
-          <a:bodyPr/>
-          <a:lstStyle/>
-          <a:p>
-            <a:r>
-              <a:rPr lang="en-US" dirty="0">
-                <a:latin typeface="+mj-lt"/>
-              </a:rPr>
-              <a:t>2. Feick, Martin, Niko </a:t>
-            </a:r>
-            <a:r>
-              <a:rPr lang="en-US" dirty="0" err="1">
-                <a:latin typeface="+mj-lt"/>
-              </a:rPr>
-              <a:t>Kleer</a:t>
-            </a:r>
-            <a:r>
-              <a:rPr lang="en-US" dirty="0">
-                <a:latin typeface="+mj-lt"/>
-              </a:rPr>
-              <a:t>, and Marek Kohn. "Fundamentals of real-time data processing architectures lambda and kappa.“</a:t>
-            </a:r>
-            <a:br>
-              <a:rPr lang="en-US" dirty="0">
-                <a:latin typeface="+mj-lt"/>
-              </a:rPr>
-            </a:br>
-            <a:r>
-              <a:rPr lang="en-US" dirty="0">
-                <a:latin typeface="+mj-lt"/>
-              </a:rPr>
-              <a:t>3. </a:t>
-            </a:r>
-            <a:r>
-              <a:rPr lang="en-US" dirty="0" err="1">
-                <a:latin typeface="+mj-lt"/>
-              </a:rPr>
-              <a:t>Owczarek</a:t>
-            </a:r>
-            <a:r>
-              <a:rPr lang="en-US" dirty="0">
-                <a:latin typeface="+mj-lt"/>
-              </a:rPr>
-              <a:t>. “Lambda vs. Kappa Architecture.” URL: https://nexocode.com/blog/posts/lambda-vs-kappa-architecture/</a:t>
-            </a:r>
-          </a:p>
-        </p:txBody>
-      </p:sp>
-      <p:sp>
-        <p:nvSpPr>
           <p:cNvPr id="23" name="Text Placeholder 4">
             <a:extLst>
               <a:ext uri="{FF2B5EF4-FFF2-40B4-BE49-F238E27FC236}">
@@ -5889,6 +5776,102 @@
           </a:extLst>
         </p:spPr>
       </p:pic>
+      <p:sp>
+        <p:nvSpPr>
+          <p:cNvPr id="4" name="Rectangle 3">
+            <a:extLst>
+              <a:ext uri="{FF2B5EF4-FFF2-40B4-BE49-F238E27FC236}">
+                <a16:creationId xmlns:a16="http://schemas.microsoft.com/office/drawing/2014/main" id="{B8D0FF9A-7F8D-0EE8-7B00-940B853D3CC7}"/>
+              </a:ext>
+            </a:extLst>
+          </p:cNvPr>
+          <p:cNvSpPr/>
+          <p:nvPr/>
+        </p:nvSpPr>
+        <p:spPr bwMode="auto">
+          <a:xfrm>
+            <a:off x="573088" y="5797296"/>
+            <a:ext cx="1014984" cy="265176"/>
+          </a:xfrm>
+          <a:prstGeom prst="rect">
+            <a:avLst/>
+          </a:prstGeom>
+          <a:ln>
+            <a:headEnd type="none" w="med" len="med"/>
+            <a:tailEnd type="none" w="med" len="med"/>
+          </a:ln>
+          <a:extLst>
+            <a:ext uri="{909E8E84-426E-40dd-AFC4-6F175D3DCCD1}">
+              <a14:hiddenFill xmlns:a14="http://schemas.microsoft.com/office/drawing/2010/main" xmlns="">
+                <a:solidFill>
+                  <a:schemeClr val="accent2"/>
+                </a:solidFill>
+              </a14:hiddenFill>
+            </a:ext>
+            <a:ext uri="{AF507438-7753-43e0-B8FC-AC1667EBCBE1}">
+              <a14:hiddenEffects xmlns:a14="http://schemas.microsoft.com/office/drawing/2010/main" xmlns="">
+                <a:effectLst>
+                  <a:outerShdw blurRad="63500" dist="35921" dir="2700000" algn="ctr" rotWithShape="0">
+                    <a:schemeClr val="bg2"/>
+                  </a:outerShdw>
+                </a:effectLst>
+              </a14:hiddenEffects>
+            </a:ext>
+          </a:extLst>
+        </p:spPr>
+        <p:style>
+          <a:lnRef idx="2">
+            <a:schemeClr val="accent3"/>
+          </a:lnRef>
+          <a:fillRef idx="1">
+            <a:schemeClr val="lt1"/>
+          </a:fillRef>
+          <a:effectRef idx="0">
+            <a:schemeClr val="accent3"/>
+          </a:effectRef>
+          <a:fontRef idx="minor">
+            <a:schemeClr val="dk1"/>
+          </a:fontRef>
+        </p:style>
+        <p:txBody>
+          <a:bodyPr vert="horz" wrap="square" lIns="0" tIns="0" rIns="0" bIns="0" numCol="1" rtlCol="0" anchor="ctr" anchorCtr="0" compatLnSpc="1">
+            <a:prstTxWarp prst="textNoShape">
+              <a:avLst/>
+            </a:prstTxWarp>
+            <a:spAutoFit/>
+          </a:bodyPr>
+          <a:lstStyle/>
+          <a:p>
+            <a:pPr marL="0" marR="0" indent="0" algn="ctr" defTabSz="914400" rtl="0" eaLnBrk="0" fontAlgn="base" latinLnBrk="0" hangingPunct="0">
+              <a:lnSpc>
+                <a:spcPct val="100000"/>
+              </a:lnSpc>
+              <a:spcBef>
+                <a:spcPct val="0"/>
+              </a:spcBef>
+              <a:spcAft>
+                <a:spcPct val="0"/>
+              </a:spcAft>
+              <a:buClrTx/>
+              <a:buSzTx/>
+              <a:buFontTx/>
+              <a:buNone/>
+              <a:tabLst/>
+            </a:pPr>
+            <a:endParaRPr kumimoji="0" lang="en-US" sz="2400" b="0" i="0" u="none" strike="noStrike" cap="none" normalizeH="0" baseline="0">
+              <a:ln>
+                <a:noFill/>
+              </a:ln>
+              <a:solidFill>
+                <a:srgbClr val="000000"/>
+              </a:solidFill>
+              <a:effectLst/>
+              <a:latin typeface="Arial" charset="0"/>
+              <a:ea typeface="ＭＳ Ｐゴシック" charset="0"/>
+            </a:endParaRPr>
+          </a:p>
+        </p:txBody>
+      </p:sp>
     </p:spTree>
     <p:extLst>
       <p:ext uri="{BB962C8B-B14F-4D97-AF65-F5344CB8AC3E}">
@@ -6066,7 +6049,7 @@
         </p:spPr>
         <p:txBody>
           <a:bodyPr anchor="ctr">
-            <a:noAutofit/>
+            <a:normAutofit/>
           </a:bodyPr>
           <a:lstStyle/>
           <a:p>
@@ -6076,104 +6059,15 @@
               </a:lnSpc>
             </a:pPr>
             <a:r>
-              <a:rPr lang="en-US" dirty="0"/>
+              <a:rPr lang="en-US" sz="2000"/>
               <a:t>Introduction to Apache Kafka</a:t>
-            </a:r>
-          </a:p>
-        </p:txBody>
-      </p:sp>
-      <p:sp>
-        <p:nvSpPr>
-          <p:cNvPr id="15" name="Content Placeholder 3">
-            <a:extLst>
-              <a:ext uri="{FF2B5EF4-FFF2-40B4-BE49-F238E27FC236}">
-                <a16:creationId xmlns:a16="http://schemas.microsoft.com/office/drawing/2014/main" id="{7176AFD4-2854-20FE-6647-2E7DC6466E1F}"/>
-              </a:ext>
-            </a:extLst>
-          </p:cNvPr>
-          <p:cNvSpPr>
-            <a:spLocks noGrp="1"/>
-          </p:cNvSpPr>
-          <p:nvPr>
-            <p:ph sz="quarter" idx="10"/>
-          </p:nvPr>
-        </p:nvSpPr>
-        <p:spPr>
-          <a:xfrm>
-            <a:off x="1286541" y="5818708"/>
-            <a:ext cx="7350546" cy="292162"/>
-          </a:xfrm>
-        </p:spPr>
-        <p:txBody>
-          <a:bodyPr/>
-          <a:lstStyle/>
-          <a:p>
-            <a:r>
-              <a:rPr lang="en-US" dirty="0"/>
-              <a:t>4. Garg, Nishant. Apache </a:t>
-            </a:r>
-            <a:r>
-              <a:rPr lang="en-US" dirty="0" err="1"/>
-              <a:t>kafka</a:t>
-            </a:r>
-            <a:r>
-              <a:rPr lang="en-US" dirty="0"/>
-              <a:t>. Birmingham, UK: </a:t>
-            </a:r>
-            <a:r>
-              <a:rPr lang="en-US" dirty="0" err="1"/>
-              <a:t>Packt</a:t>
-            </a:r>
-            <a:r>
-              <a:rPr lang="en-US" dirty="0"/>
-              <a:t> Publishing, 2013.</a:t>
-            </a:r>
-          </a:p>
-        </p:txBody>
-      </p:sp>
-      <p:sp>
-        <p:nvSpPr>
-          <p:cNvPr id="4" name="Text Placeholder 3">
-            <a:extLst>
-              <a:ext uri="{FF2B5EF4-FFF2-40B4-BE49-F238E27FC236}">
-                <a16:creationId xmlns:a16="http://schemas.microsoft.com/office/drawing/2014/main" id="{BBA48FA6-A484-8C09-3659-CB7BB84B2DAE}"/>
-              </a:ext>
-            </a:extLst>
-          </p:cNvPr>
-          <p:cNvSpPr>
-            <a:spLocks noGrp="1"/>
-          </p:cNvSpPr>
-          <p:nvPr>
-            <p:ph type="body" sz="quarter" idx="12"/>
-          </p:nvPr>
-        </p:nvSpPr>
-        <p:spPr>
-          <a:xfrm>
-            <a:off x="573088" y="581897"/>
-            <a:ext cx="8063999" cy="274637"/>
-          </a:xfrm>
-        </p:spPr>
-        <p:txBody>
-          <a:bodyPr anchor="ctr">
-            <a:noAutofit/>
-          </a:bodyPr>
-          <a:lstStyle/>
-          <a:p>
-            <a:pPr>
-              <a:lnSpc>
-                <a:spcPct val="90000"/>
-              </a:lnSpc>
-            </a:pPr>
-            <a:r>
-              <a:rPr lang="en-US" dirty="0"/>
-              <a:t>De Facto Standard API for Event Streaming</a:t>
             </a:r>
           </a:p>
         </p:txBody>
       </p:sp>
       <p:pic>
         <p:nvPicPr>
-          <p:cNvPr id="3" name="Picture 2">
+          <p:cNvPr id="3" name="Picture 2" descr="A screenshot of a computer&#10;&#10;Description automatically generated">
             <a:extLst>
               <a:ext uri="{FF2B5EF4-FFF2-40B4-BE49-F238E27FC236}">
                 <a16:creationId xmlns:a16="http://schemas.microsoft.com/office/drawing/2014/main" id="{982B9C89-9BE2-305B-3C12-9B5DFD8C6270}"/>
@@ -6193,14 +6087,55 @@
         </p:blipFill>
         <p:spPr>
           <a:xfrm>
-            <a:off x="1123950" y="1456258"/>
-            <a:ext cx="6896100" cy="4362450"/>
+            <a:off x="1025338" y="1448672"/>
+            <a:ext cx="7159498" cy="4528382"/>
           </a:xfrm>
           <a:prstGeom prst="rect">
             <a:avLst/>
           </a:prstGeom>
+          <a:noFill/>
         </p:spPr>
       </p:pic>
+      <p:sp>
+        <p:nvSpPr>
+          <p:cNvPr id="4" name="Text Placeholder 3">
+            <a:extLst>
+              <a:ext uri="{FF2B5EF4-FFF2-40B4-BE49-F238E27FC236}">
+                <a16:creationId xmlns:a16="http://schemas.microsoft.com/office/drawing/2014/main" id="{BBA48FA6-A484-8C09-3659-CB7BB84B2DAE}"/>
+              </a:ext>
+            </a:extLst>
+          </p:cNvPr>
+          <p:cNvSpPr>
+            <a:spLocks noGrp="1"/>
+          </p:cNvSpPr>
+          <p:nvPr>
+            <p:ph type="body" sz="quarter" idx="12"/>
+          </p:nvPr>
+        </p:nvSpPr>
+        <p:spPr>
+          <a:xfrm>
+            <a:off x="573088" y="581897"/>
+            <a:ext cx="8063999" cy="274637"/>
+          </a:xfrm>
+        </p:spPr>
+        <p:txBody>
+          <a:bodyPr anchor="ctr">
+            <a:normAutofit/>
+          </a:bodyPr>
+          <a:lstStyle/>
+          <a:p>
+            <a:pPr>
+              <a:lnSpc>
+                <a:spcPct val="90000"/>
+              </a:lnSpc>
+            </a:pPr>
+            <a:r>
+              <a:rPr lang="en-US" sz="1300"/>
+              <a:t>De Facto Standard API for Event Streaming</a:t>
+            </a:r>
+          </a:p>
+        </p:txBody>
+      </p:sp>
     </p:spTree>
     <p:extLst>
       <p:ext uri="{BB962C8B-B14F-4D97-AF65-F5344CB8AC3E}">
@@ -6258,7 +6193,7 @@
         </p:spPr>
         <p:txBody>
           <a:bodyPr anchor="ctr">
-            <a:noAutofit/>
+            <a:normAutofit/>
           </a:bodyPr>
           <a:lstStyle/>
           <a:p>
@@ -6268,20 +6203,20 @@
               </a:lnSpc>
             </a:pPr>
             <a:r>
-              <a:rPr lang="en-US" dirty="0"/>
+              <a:rPr lang="en-US" sz="2000"/>
               <a:t>Apache </a:t>
             </a:r>
             <a:r>
-              <a:rPr lang="en-US" dirty="0" err="1"/>
+              <a:rPr lang="en-US" sz="2000" err="1"/>
               <a:t>Flink</a:t>
             </a:r>
-            <a:endParaRPr lang="en-US" dirty="0"/>
+            <a:endParaRPr lang="en-US" sz="2000"/>
           </a:p>
         </p:txBody>
       </p:sp>
       <p:pic>
         <p:nvPicPr>
-          <p:cNvPr id="3" name="Picture 2">
+          <p:cNvPr id="3" name="Picture 2" descr="A screenshot of a computer&#10;&#10;Description automatically generated">
             <a:extLst>
               <a:ext uri="{FF2B5EF4-FFF2-40B4-BE49-F238E27FC236}">
                 <a16:creationId xmlns:a16="http://schemas.microsoft.com/office/drawing/2014/main" id="{8FE111B0-ABA7-5F91-3668-25CFA912CDE6}"/>
@@ -6301,8 +6236,8 @@
         </p:blipFill>
         <p:spPr>
           <a:xfrm>
-            <a:off x="1106692" y="1448672"/>
-            <a:ext cx="6997291" cy="4338321"/>
+            <a:off x="953167" y="1448672"/>
+            <a:ext cx="7303841" cy="4528382"/>
           </a:xfrm>
           <a:prstGeom prst="rect">
             <a:avLst/>
@@ -6310,47 +6245,6 @@
           <a:noFill/>
         </p:spPr>
       </p:pic>
-      <p:sp>
-        <p:nvSpPr>
-          <p:cNvPr id="1036" name="Content Placeholder 3">
-            <a:extLst>
-              <a:ext uri="{FF2B5EF4-FFF2-40B4-BE49-F238E27FC236}">
-                <a16:creationId xmlns:a16="http://schemas.microsoft.com/office/drawing/2014/main" id="{BD47D014-6E1A-C7F8-2F87-525DED66E6E9}"/>
-              </a:ext>
-            </a:extLst>
-          </p:cNvPr>
-          <p:cNvSpPr>
-            <a:spLocks noGrp="1"/>
-          </p:cNvSpPr>
-          <p:nvPr>
-            <p:ph sz="quarter" idx="10"/>
-          </p:nvPr>
-        </p:nvSpPr>
-        <p:spPr>
-          <a:xfrm>
-            <a:off x="1286541" y="5818708"/>
-            <a:ext cx="7350546" cy="292162"/>
-          </a:xfrm>
-        </p:spPr>
-        <p:txBody>
-          <a:bodyPr/>
-          <a:lstStyle/>
-          <a:p>
-            <a:r>
-              <a:rPr lang="en-US" dirty="0"/>
-              <a:t>6. Apache </a:t>
-            </a:r>
-            <a:r>
-              <a:rPr lang="en-US" dirty="0" err="1"/>
-              <a:t>Flink</a:t>
-            </a:r>
-            <a:r>
-              <a:rPr lang="en-US" dirty="0"/>
-              <a:t> Documentation: https://nightlies.apache.org/flink/flink-docs-release-1.16/docs/concepts/flink-architecture/</a:t>
-            </a:r>
-          </a:p>
-        </p:txBody>
-      </p:sp>
       <p:sp>
         <p:nvSpPr>
           <p:cNvPr id="4" name="Text Placeholder 3">
@@ -6375,7 +6269,7 @@
         </p:spPr>
         <p:txBody>
           <a:bodyPr anchor="ctr">
-            <a:noAutofit/>
+            <a:normAutofit/>
           </a:bodyPr>
           <a:lstStyle/>
           <a:p>
@@ -6385,7 +6279,7 @@
               </a:lnSpc>
             </a:pPr>
             <a:r>
-              <a:rPr lang="en-US" dirty="0"/>
+              <a:rPr lang="en-US" sz="1300"/>
               <a:t>Stateful Computations over Data Streams</a:t>
             </a:r>
           </a:p>
@@ -6440,19 +6334,79 @@
             <p:ph type="title"/>
           </p:nvPr>
         </p:nvSpPr>
-        <p:spPr/>
+        <p:spPr>
+          <a:xfrm>
+            <a:off x="572400" y="184706"/>
+            <a:ext cx="8063999" cy="369332"/>
+          </a:xfrm>
+        </p:spPr>
         <p:txBody>
-          <a:bodyPr/>
+          <a:bodyPr anchor="ctr">
+            <a:normAutofit/>
+          </a:bodyPr>
           <a:lstStyle/>
           <a:p>
+            <a:pPr>
+              <a:lnSpc>
+                <a:spcPct val="90000"/>
+              </a:lnSpc>
+            </a:pPr>
             <a:r>
-              <a:rPr lang="en-US" dirty="0"/>
+              <a:rPr lang="en-US" sz="2000"/>
               <a:t>Real Case Study: Twitter</a:t>
             </a:r>
-            <a:endParaRPr lang="de-DE" dirty="0"/>
+            <a:endParaRPr lang="de-DE" sz="2000"/>
           </a:p>
         </p:txBody>
       </p:sp>
+      <p:pic>
+        <p:nvPicPr>
+          <p:cNvPr id="2050" name="Picture 2" descr="A diagram of a software company&#10;&#10;Description automatically generated">
+            <a:extLst>
+              <a:ext uri="{FF2B5EF4-FFF2-40B4-BE49-F238E27FC236}">
+                <a16:creationId xmlns:a16="http://schemas.microsoft.com/office/drawing/2014/main" id="{3A9A3DD8-12CE-3E3A-E149-7D816301C43D}"/>
+              </a:ext>
+            </a:extLst>
+          </p:cNvPr>
+          <p:cNvPicPr>
+            <a:picLocks noChangeAspect="1" noChangeArrowheads="1"/>
+          </p:cNvPicPr>
+          <p:nvPr/>
+        </p:nvPicPr>
+        <p:blipFill>
+          <a:blip r:embed="rId3">
+            <a:extLst>
+              <a:ext uri="{28A0092B-C50C-407E-A947-70E740481C1C}">
+                <a14:useLocalDpi xmlns:a14="http://schemas.microsoft.com/office/drawing/2010/main" val="0"/>
+              </a:ext>
+            </a:extLst>
+          </a:blip>
+          <a:stretch>
+            <a:fillRect/>
+          </a:stretch>
+        </p:blipFill>
+        <p:spPr bwMode="auto">
+          <a:xfrm>
+            <a:off x="573088" y="1989184"/>
+            <a:ext cx="8063999" cy="3447358"/>
+          </a:xfrm>
+          <a:prstGeom prst="rect">
+            <a:avLst/>
+          </a:prstGeom>
+          <a:solidFill>
+            <a:srgbClr val="FFFFFF"/>
+          </a:solidFill>
+          <a:extLst>
+            <a:ext uri="{909E8E84-426E-40DD-AFC4-6F175D3DCCD1}">
+              <a14:hiddenFill xmlns:a14="http://schemas.microsoft.com/office/drawing/2010/main">
+                <a:solidFill>
+                  <a:srgbClr val="FFFFFF"/>
+                </a:solidFill>
+              </a14:hiddenFill>
+            </a:ext>
+          </a:extLst>
+        </p:spPr>
+      </p:pic>
       <p:sp>
         <p:nvSpPr>
           <p:cNvPr id="5" name="Textplatzhalter 4">
@@ -6469,98 +6423,27 @@
             <p:ph type="body" sz="quarter" idx="12"/>
           </p:nvPr>
         </p:nvSpPr>
-        <p:spPr/>
+        <p:spPr>
+          <a:xfrm>
+            <a:off x="572400" y="583200"/>
+            <a:ext cx="8063999" cy="273600"/>
+          </a:xfrm>
+        </p:spPr>
         <p:txBody>
-          <a:bodyPr/>
+          <a:bodyPr anchor="ctr">
+            <a:normAutofit/>
+          </a:bodyPr>
           <a:lstStyle/>
           <a:p>
+            <a:pPr>
+              <a:lnSpc>
+                <a:spcPct val="90000"/>
+              </a:lnSpc>
+            </a:pPr>
             <a:r>
-              <a:rPr lang="de-DE" dirty="0"/>
+              <a:rPr lang="de-DE" sz="1300"/>
               <a:t>After: Lambda</a:t>
             </a:r>
-          </a:p>
-        </p:txBody>
-      </p:sp>
-      <p:pic>
-        <p:nvPicPr>
-          <p:cNvPr id="2050" name="Picture 2">
-            <a:extLst>
-              <a:ext uri="{FF2B5EF4-FFF2-40B4-BE49-F238E27FC236}">
-                <a16:creationId xmlns:a16="http://schemas.microsoft.com/office/drawing/2014/main" id="{3A9A3DD8-12CE-3E3A-E149-7D816301C43D}"/>
-              </a:ext>
-            </a:extLst>
-          </p:cNvPr>
-          <p:cNvPicPr>
-            <a:picLocks noChangeAspect="1" noChangeArrowheads="1"/>
-          </p:cNvPicPr>
-          <p:nvPr/>
-        </p:nvPicPr>
-        <p:blipFill>
-          <a:blip r:embed="rId3">
-            <a:extLst>
-              <a:ext uri="{28A0092B-C50C-407E-A947-70E740481C1C}">
-                <a14:useLocalDpi xmlns:a14="http://schemas.microsoft.com/office/drawing/2010/main" val="0"/>
-              </a:ext>
-            </a:extLst>
-          </a:blip>
-          <a:srcRect/>
-          <a:stretch>
-            <a:fillRect/>
-          </a:stretch>
-        </p:blipFill>
-        <p:spPr bwMode="auto">
-          <a:xfrm>
-            <a:off x="1243321" y="2010266"/>
-            <a:ext cx="6657358" cy="2837468"/>
-          </a:xfrm>
-          <a:prstGeom prst="rect">
-            <a:avLst/>
-          </a:prstGeom>
-          <a:noFill/>
-          <a:extLst>
-            <a:ext uri="{909E8E84-426E-40DD-AFC4-6F175D3DCCD1}">
-              <a14:hiddenFill xmlns:a14="http://schemas.microsoft.com/office/drawing/2010/main">
-                <a:solidFill>
-                  <a:srgbClr val="FFFFFF"/>
-                </a:solidFill>
-              </a14:hiddenFill>
-            </a:ext>
-          </a:extLst>
-        </p:spPr>
-      </p:pic>
-      <p:sp>
-        <p:nvSpPr>
-          <p:cNvPr id="3" name="Content Placeholder 3">
-            <a:extLst>
-              <a:ext uri="{FF2B5EF4-FFF2-40B4-BE49-F238E27FC236}">
-                <a16:creationId xmlns:a16="http://schemas.microsoft.com/office/drawing/2014/main" id="{A3BC8D8D-1193-6360-914F-2499A39C17A1}"/>
-              </a:ext>
-            </a:extLst>
-          </p:cNvPr>
-          <p:cNvSpPr>
-            <a:spLocks noGrp="1"/>
-          </p:cNvSpPr>
-          <p:nvPr>
-            <p:ph sz="quarter" idx="10"/>
-          </p:nvPr>
-        </p:nvSpPr>
-        <p:spPr>
-          <a:xfrm>
-            <a:off x="1285875" y="5818188"/>
-            <a:ext cx="7351713" cy="292100"/>
-          </a:xfrm>
-        </p:spPr>
-        <p:txBody>
-          <a:bodyPr/>
-          <a:lstStyle/>
-          <a:p>
-            <a:r>
-              <a:rPr lang="en-US" dirty="0"/>
-              <a:t>5. Twitter Blog: https://blog.twitter.com/engineering/en_us/topics/infrastructure/2021/processing-billions-of-events-in-real-time-at-twitter-</a:t>
-            </a:r>
-          </a:p>
-          <a:p>
-            <a:endParaRPr lang="en-US" dirty="0"/>
           </a:p>
         </p:txBody>
       </p:sp>
@@ -6621,7 +6504,7 @@
         </p:spPr>
         <p:txBody>
           <a:bodyPr anchor="ctr">
-            <a:noAutofit/>
+            <a:normAutofit/>
           </a:bodyPr>
           <a:lstStyle/>
           <a:p>
@@ -6631,7 +6514,7 @@
               </a:lnSpc>
             </a:pPr>
             <a:r>
-              <a:rPr lang="en-US" dirty="0"/>
+              <a:rPr lang="en-US" sz="2000"/>
               <a:t>Real Case Study: Twitter</a:t>
             </a:r>
           </a:p>
@@ -6639,7 +6522,7 @@
       </p:sp>
       <p:pic>
         <p:nvPicPr>
-          <p:cNvPr id="5" name="Picture 4">
+          <p:cNvPr id="5" name="Picture 4" descr="A diagram of a data center&#10;&#10;Description automatically generated">
             <a:extLst>
               <a:ext uri="{FF2B5EF4-FFF2-40B4-BE49-F238E27FC236}">
                 <a16:creationId xmlns:a16="http://schemas.microsoft.com/office/drawing/2014/main" id="{FD7310D9-4AD2-CA65-21E9-04829AD6453B}"/>
@@ -6659,8 +6542,8 @@
         </p:blipFill>
         <p:spPr>
           <a:xfrm>
-            <a:off x="1280953" y="1448672"/>
-            <a:ext cx="6648768" cy="4338321"/>
+            <a:off x="1135063" y="1448672"/>
+            <a:ext cx="6940049" cy="4528382"/>
           </a:xfrm>
           <a:prstGeom prst="rect">
             <a:avLst/>
@@ -6668,42 +6551,6 @@
           <a:noFill/>
         </p:spPr>
       </p:pic>
-      <p:sp>
-        <p:nvSpPr>
-          <p:cNvPr id="10" name="Content Placeholder 3">
-            <a:extLst>
-              <a:ext uri="{FF2B5EF4-FFF2-40B4-BE49-F238E27FC236}">
-                <a16:creationId xmlns:a16="http://schemas.microsoft.com/office/drawing/2014/main" id="{C2C11FAD-7D71-9847-B773-4A5DFA2D62A6}"/>
-              </a:ext>
-            </a:extLst>
-          </p:cNvPr>
-          <p:cNvSpPr>
-            <a:spLocks noGrp="1"/>
-          </p:cNvSpPr>
-          <p:nvPr>
-            <p:ph sz="quarter" idx="10"/>
-          </p:nvPr>
-        </p:nvSpPr>
-        <p:spPr>
-          <a:xfrm>
-            <a:off x="1286541" y="5818708"/>
-            <a:ext cx="7350546" cy="292162"/>
-          </a:xfrm>
-        </p:spPr>
-        <p:txBody>
-          <a:bodyPr/>
-          <a:lstStyle/>
-          <a:p>
-            <a:r>
-              <a:rPr lang="en-US" dirty="0"/>
-              <a:t>5. Twitter Blog: https://blog.twitter.com/engineering/en_us/topics/infrastructure/2021/processing-billions-of-events-in-real-time-at-twitter-</a:t>
-            </a:r>
-          </a:p>
-          <a:p>
-            <a:endParaRPr lang="en-US" dirty="0"/>
-          </a:p>
-        </p:txBody>
-      </p:sp>
       <p:sp>
         <p:nvSpPr>
           <p:cNvPr id="4" name="Text Placeholder 3">
@@ -6728,7 +6575,7 @@
         </p:spPr>
         <p:txBody>
           <a:bodyPr anchor="ctr">
-            <a:noAutofit/>
+            <a:normAutofit/>
           </a:bodyPr>
           <a:lstStyle/>
           <a:p>
@@ -6738,7 +6585,7 @@
               </a:lnSpc>
             </a:pPr>
             <a:r>
-              <a:rPr lang="en-US" dirty="0"/>
+              <a:rPr lang="en-US" sz="1300"/>
               <a:t>After: Kappa</a:t>
             </a:r>
           </a:p>
@@ -7678,14 +7525,14 @@
           </a:ln>
           <a:extLst>
             <a:ext uri="{909E8E84-426E-40dd-AFC4-6F175D3DCCD1}">
-              <a14:hiddenFill xmlns="" xmlns:a14="http://schemas.microsoft.com/office/drawing/2010/main">
+              <a14:hiddenFill xmlns:a14="http://schemas.microsoft.com/office/drawing/2010/main" xmlns="">
                 <a:solidFill>
                   <a:schemeClr val="accent2"/>
                 </a:solidFill>
               </a14:hiddenFill>
             </a:ext>
             <a:ext uri="{AF507438-7753-43e0-B8FC-AC1667EBCBE1}">
-              <a14:hiddenEffects xmlns="" xmlns:a14="http://schemas.microsoft.com/office/drawing/2010/main">
+              <a14:hiddenEffects xmlns:a14="http://schemas.microsoft.com/office/drawing/2010/main" xmlns="">
                 <a:effectLst>
                   <a:outerShdw blurRad="63500" dist="35921" dir="2700000" algn="ctr" rotWithShape="0">
                     <a:schemeClr val="bg2"/>
@@ -7778,14 +7625,14 @@
           </a:ln>
           <a:extLst>
             <a:ext uri="{909E8E84-426E-40dd-AFC4-6F175D3DCCD1}">
-              <a14:hiddenFill xmlns="" xmlns:a14="http://schemas.microsoft.com/office/drawing/2010/main">
+              <a14:hiddenFill xmlns:a14="http://schemas.microsoft.com/office/drawing/2010/main" xmlns="">
                 <a:solidFill>
                   <a:schemeClr val="accent2"/>
                 </a:solidFill>
               </a14:hiddenFill>
             </a:ext>
             <a:ext uri="{AF507438-7753-43e0-B8FC-AC1667EBCBE1}">
-              <a14:hiddenEffects xmlns="" xmlns:a14="http://schemas.microsoft.com/office/drawing/2010/main">
+              <a14:hiddenEffects xmlns:a14="http://schemas.microsoft.com/office/drawing/2010/main" xmlns="">
                 <a:effectLst>
                   <a:outerShdw blurRad="63500" dist="35921" dir="2700000" algn="ctr" rotWithShape="0">
                     <a:schemeClr val="bg2"/>
@@ -7878,14 +7725,14 @@
           </a:ln>
           <a:extLst>
             <a:ext uri="{909E8E84-426E-40dd-AFC4-6F175D3DCCD1}">
-              <a14:hiddenFill xmlns="" xmlns:a14="http://schemas.microsoft.com/office/drawing/2010/main">
+              <a14:hiddenFill xmlns:a14="http://schemas.microsoft.com/office/drawing/2010/main" xmlns="">
                 <a:solidFill>
                   <a:schemeClr val="accent2"/>
                 </a:solidFill>
               </a14:hiddenFill>
             </a:ext>
             <a:ext uri="{AF507438-7753-43e0-B8FC-AC1667EBCBE1}">
-              <a14:hiddenEffects xmlns="" xmlns:a14="http://schemas.microsoft.com/office/drawing/2010/main">
+              <a14:hiddenEffects xmlns:a14="http://schemas.microsoft.com/office/drawing/2010/main" xmlns="">
                 <a:effectLst>
                   <a:outerShdw blurRad="63500" dist="35921" dir="2700000" algn="ctr" rotWithShape="0">
                     <a:schemeClr val="bg2"/>
@@ -7978,14 +7825,14 @@
           </a:ln>
           <a:extLst>
             <a:ext uri="{909E8E84-426E-40dd-AFC4-6F175D3DCCD1}">
-              <a14:hiddenFill xmlns="" xmlns:a14="http://schemas.microsoft.com/office/drawing/2010/main">
+              <a14:hiddenFill xmlns:a14="http://schemas.microsoft.com/office/drawing/2010/main" xmlns="">
                 <a:solidFill>
                   <a:schemeClr val="accent2"/>
                 </a:solidFill>
               </a14:hiddenFill>
             </a:ext>
             <a:ext uri="{AF507438-7753-43e0-B8FC-AC1667EBCBE1}">
-              <a14:hiddenEffects xmlns="" xmlns:a14="http://schemas.microsoft.com/office/drawing/2010/main">
+              <a14:hiddenEffects xmlns:a14="http://schemas.microsoft.com/office/drawing/2010/main" xmlns="">
                 <a:effectLst>
                   <a:outerShdw blurRad="63500" dist="35921" dir="2700000" algn="ctr" rotWithShape="0">
                     <a:schemeClr val="bg2"/>
@@ -8078,14 +7925,14 @@
           </a:ln>
           <a:extLst>
             <a:ext uri="{909E8E84-426E-40dd-AFC4-6F175D3DCCD1}">
-              <a14:hiddenFill xmlns="" xmlns:a14="http://schemas.microsoft.com/office/drawing/2010/main">
+              <a14:hiddenFill xmlns:a14="http://schemas.microsoft.com/office/drawing/2010/main" xmlns="">
                 <a:solidFill>
                   <a:schemeClr val="accent2"/>
                 </a:solidFill>
               </a14:hiddenFill>
             </a:ext>
             <a:ext uri="{AF507438-7753-43e0-B8FC-AC1667EBCBE1}">
-              <a14:hiddenEffects xmlns="" xmlns:a14="http://schemas.microsoft.com/office/drawing/2010/main">
+              <a14:hiddenEffects xmlns:a14="http://schemas.microsoft.com/office/drawing/2010/main" xmlns="">
                 <a:effectLst>
                   <a:outerShdw blurRad="63500" dist="35921" dir="2700000" algn="ctr" rotWithShape="0">
                     <a:schemeClr val="bg2"/>
@@ -8178,14 +8025,14 @@
           </a:ln>
           <a:extLst>
             <a:ext uri="{909E8E84-426E-40dd-AFC4-6F175D3DCCD1}">
-              <a14:hiddenFill xmlns="" xmlns:a14="http://schemas.microsoft.com/office/drawing/2010/main">
+              <a14:hiddenFill xmlns:a14="http://schemas.microsoft.com/office/drawing/2010/main" xmlns="">
                 <a:solidFill>
                   <a:schemeClr val="accent2"/>
                 </a:solidFill>
               </a14:hiddenFill>
             </a:ext>
             <a:ext uri="{AF507438-7753-43e0-B8FC-AC1667EBCBE1}">
-              <a14:hiddenEffects xmlns="" xmlns:a14="http://schemas.microsoft.com/office/drawing/2010/main">
+              <a14:hiddenEffects xmlns:a14="http://schemas.microsoft.com/office/drawing/2010/main" xmlns="">
                 <a:effectLst>
                   <a:outerShdw blurRad="63500" dist="35921" dir="2700000" algn="ctr" rotWithShape="0">
                     <a:schemeClr val="bg2"/>
@@ -8278,14 +8125,14 @@
           </a:ln>
           <a:extLst>
             <a:ext uri="{909E8E84-426E-40dd-AFC4-6F175D3DCCD1}">
-              <a14:hiddenFill xmlns="" xmlns:a14="http://schemas.microsoft.com/office/drawing/2010/main">
+              <a14:hiddenFill xmlns:a14="http://schemas.microsoft.com/office/drawing/2010/main" xmlns="">
                 <a:solidFill>
                   <a:schemeClr val="accent2"/>
                 </a:solidFill>
               </a14:hiddenFill>
             </a:ext>
             <a:ext uri="{AF507438-7753-43e0-B8FC-AC1667EBCBE1}">
-              <a14:hiddenEffects xmlns="" xmlns:a14="http://schemas.microsoft.com/office/drawing/2010/main">
+              <a14:hiddenEffects xmlns:a14="http://schemas.microsoft.com/office/drawing/2010/main" xmlns="">
                 <a:effectLst>
                   <a:outerShdw blurRad="63500" dist="35921" dir="2700000" algn="ctr" rotWithShape="0">
                     <a:schemeClr val="bg2"/>
@@ -8378,14 +8225,14 @@
           </a:ln>
           <a:extLst>
             <a:ext uri="{909E8E84-426E-40dd-AFC4-6F175D3DCCD1}">
-              <a14:hiddenFill xmlns="" xmlns:a14="http://schemas.microsoft.com/office/drawing/2010/main">
+              <a14:hiddenFill xmlns:a14="http://schemas.microsoft.com/office/drawing/2010/main" xmlns="">
                 <a:solidFill>
                   <a:schemeClr val="accent2"/>
                 </a:solidFill>
               </a14:hiddenFill>
             </a:ext>
             <a:ext uri="{AF507438-7753-43e0-B8FC-AC1667EBCBE1}">
-              <a14:hiddenEffects xmlns="" xmlns:a14="http://schemas.microsoft.com/office/drawing/2010/main">
+              <a14:hiddenEffects xmlns:a14="http://schemas.microsoft.com/office/drawing/2010/main" xmlns="">
                 <a:effectLst>
                   <a:outerShdw blurRad="63500" dist="35921" dir="2700000" algn="ctr" rotWithShape="0">
                     <a:schemeClr val="bg2"/>
@@ -8478,14 +8325,14 @@
           </a:ln>
           <a:extLst>
             <a:ext uri="{909E8E84-426E-40dd-AFC4-6F175D3DCCD1}">
-              <a14:hiddenFill xmlns="" xmlns:a14="http://schemas.microsoft.com/office/drawing/2010/main">
+              <a14:hiddenFill xmlns:a14="http://schemas.microsoft.com/office/drawing/2010/main" xmlns="">
                 <a:solidFill>
                   <a:schemeClr val="accent2"/>
                 </a:solidFill>
               </a14:hiddenFill>
             </a:ext>
             <a:ext uri="{AF507438-7753-43e0-B8FC-AC1667EBCBE1}">
-              <a14:hiddenEffects xmlns="" xmlns:a14="http://schemas.microsoft.com/office/drawing/2010/main">
+              <a14:hiddenEffects xmlns:a14="http://schemas.microsoft.com/office/drawing/2010/main" xmlns="">
                 <a:effectLst>
                   <a:outerShdw blurRad="63500" dist="35921" dir="2700000" algn="ctr" rotWithShape="0">
                     <a:schemeClr val="bg2"/>
@@ -8578,14 +8425,14 @@
           </a:ln>
           <a:extLst>
             <a:ext uri="{909E8E84-426E-40dd-AFC4-6F175D3DCCD1}">
-              <a14:hiddenFill xmlns="" xmlns:a14="http://schemas.microsoft.com/office/drawing/2010/main">
+              <a14:hiddenFill xmlns:a14="http://schemas.microsoft.com/office/drawing/2010/main" xmlns="">
                 <a:solidFill>
                   <a:schemeClr val="accent2"/>
                 </a:solidFill>
               </a14:hiddenFill>
             </a:ext>
             <a:ext uri="{AF507438-7753-43e0-B8FC-AC1667EBCBE1}">
-              <a14:hiddenEffects xmlns="" xmlns:a14="http://schemas.microsoft.com/office/drawing/2010/main">
+              <a14:hiddenEffects xmlns:a14="http://schemas.microsoft.com/office/drawing/2010/main" xmlns="">
                 <a:effectLst>
                   <a:outerShdw blurRad="63500" dist="35921" dir="2700000" algn="ctr" rotWithShape="0">
                     <a:schemeClr val="bg2"/>
@@ -8678,14 +8525,14 @@
           </a:ln>
           <a:extLst>
             <a:ext uri="{909E8E84-426E-40dd-AFC4-6F175D3DCCD1}">
-              <a14:hiddenFill xmlns="" xmlns:a14="http://schemas.microsoft.com/office/drawing/2010/main">
+              <a14:hiddenFill xmlns:a14="http://schemas.microsoft.com/office/drawing/2010/main" xmlns="">
                 <a:solidFill>
                   <a:schemeClr val="accent2"/>
                 </a:solidFill>
               </a14:hiddenFill>
             </a:ext>
             <a:ext uri="{AF507438-7753-43e0-B8FC-AC1667EBCBE1}">
-              <a14:hiddenEffects xmlns="" xmlns:a14="http://schemas.microsoft.com/office/drawing/2010/main">
+              <a14:hiddenEffects xmlns:a14="http://schemas.microsoft.com/office/drawing/2010/main" xmlns="">
                 <a:effectLst>
                   <a:outerShdw blurRad="63500" dist="35921" dir="2700000" algn="ctr" rotWithShape="0">
                     <a:schemeClr val="bg2"/>
@@ -8778,14 +8625,14 @@
           </a:ln>
           <a:extLst>
             <a:ext uri="{909E8E84-426E-40dd-AFC4-6F175D3DCCD1}">
-              <a14:hiddenFill xmlns="" xmlns:a14="http://schemas.microsoft.com/office/drawing/2010/main">
+              <a14:hiddenFill xmlns:a14="http://schemas.microsoft.com/office/drawing/2010/main" xmlns="">
                 <a:solidFill>
                   <a:schemeClr val="accent2"/>
                 </a:solidFill>
               </a14:hiddenFill>
             </a:ext>
             <a:ext uri="{AF507438-7753-43e0-B8FC-AC1667EBCBE1}">
-              <a14:hiddenEffects xmlns="" xmlns:a14="http://schemas.microsoft.com/office/drawing/2010/main">
+              <a14:hiddenEffects xmlns:a14="http://schemas.microsoft.com/office/drawing/2010/main" xmlns="">
                 <a:effectLst>
                   <a:outerShdw blurRad="63500" dist="35921" dir="2700000" algn="ctr" rotWithShape="0">
                     <a:schemeClr val="bg2"/>
@@ -8878,14 +8725,14 @@
           </a:ln>
           <a:extLst>
             <a:ext uri="{909E8E84-426E-40dd-AFC4-6F175D3DCCD1}">
-              <a14:hiddenFill xmlns="" xmlns:a14="http://schemas.microsoft.com/office/drawing/2010/main">
+              <a14:hiddenFill xmlns:a14="http://schemas.microsoft.com/office/drawing/2010/main" xmlns="">
                 <a:solidFill>
                   <a:schemeClr val="accent2"/>
                 </a:solidFill>
               </a14:hiddenFill>
             </a:ext>
             <a:ext uri="{AF507438-7753-43e0-B8FC-AC1667EBCBE1}">
-              <a14:hiddenEffects xmlns="" xmlns:a14="http://schemas.microsoft.com/office/drawing/2010/main">
+              <a14:hiddenEffects xmlns:a14="http://schemas.microsoft.com/office/drawing/2010/main" xmlns="">
                 <a:effectLst>
                   <a:outerShdw blurRad="63500" dist="35921" dir="2700000" algn="ctr" rotWithShape="0">
                     <a:schemeClr val="bg2"/>
@@ -8978,14 +8825,14 @@
           </a:ln>
           <a:extLst>
             <a:ext uri="{909E8E84-426E-40dd-AFC4-6F175D3DCCD1}">
-              <a14:hiddenFill xmlns="" xmlns:a14="http://schemas.microsoft.com/office/drawing/2010/main">
+              <a14:hiddenFill xmlns:a14="http://schemas.microsoft.com/office/drawing/2010/main" xmlns="">
                 <a:solidFill>
                   <a:schemeClr val="accent2"/>
                 </a:solidFill>
               </a14:hiddenFill>
             </a:ext>
             <a:ext uri="{AF507438-7753-43e0-B8FC-AC1667EBCBE1}">
-              <a14:hiddenEffects xmlns="" xmlns:a14="http://schemas.microsoft.com/office/drawing/2010/main">
+              <a14:hiddenEffects xmlns:a14="http://schemas.microsoft.com/office/drawing/2010/main" xmlns="">
                 <a:effectLst>
                   <a:outerShdw blurRad="63500" dist="35921" dir="2700000" algn="ctr" rotWithShape="0">
                     <a:schemeClr val="bg2"/>
@@ -9078,14 +8925,14 @@
           </a:ln>
           <a:extLst>
             <a:ext uri="{909E8E84-426E-40dd-AFC4-6F175D3DCCD1}">
-              <a14:hiddenFill xmlns="" xmlns:a14="http://schemas.microsoft.com/office/drawing/2010/main">
+              <a14:hiddenFill xmlns:a14="http://schemas.microsoft.com/office/drawing/2010/main" xmlns="">
                 <a:solidFill>
                   <a:schemeClr val="accent2"/>
                 </a:solidFill>
               </a14:hiddenFill>
             </a:ext>
             <a:ext uri="{AF507438-7753-43e0-B8FC-AC1667EBCBE1}">
-              <a14:hiddenEffects xmlns="" xmlns:a14="http://schemas.microsoft.com/office/drawing/2010/main">
+              <a14:hiddenEffects xmlns:a14="http://schemas.microsoft.com/office/drawing/2010/main" xmlns="">
                 <a:effectLst>
                   <a:outerShdw blurRad="63500" dist="35921" dir="2700000" algn="ctr" rotWithShape="0">
                     <a:schemeClr val="bg2"/>
@@ -9178,14 +9025,14 @@
           </a:ln>
           <a:extLst>
             <a:ext uri="{909E8E84-426E-40dd-AFC4-6F175D3DCCD1}">
-              <a14:hiddenFill xmlns="" xmlns:a14="http://schemas.microsoft.com/office/drawing/2010/main">
+              <a14:hiddenFill xmlns:a14="http://schemas.microsoft.com/office/drawing/2010/main" xmlns="">
                 <a:solidFill>
                   <a:schemeClr val="accent2"/>
                 </a:solidFill>
               </a14:hiddenFill>
             </a:ext>
             <a:ext uri="{AF507438-7753-43e0-B8FC-AC1667EBCBE1}">
-              <a14:hiddenEffects xmlns="" xmlns:a14="http://schemas.microsoft.com/office/drawing/2010/main">
+              <a14:hiddenEffects xmlns:a14="http://schemas.microsoft.com/office/drawing/2010/main" xmlns="">
                 <a:effectLst>
                   <a:outerShdw blurRad="63500" dist="35921" dir="2700000" algn="ctr" rotWithShape="0">
                     <a:schemeClr val="bg2"/>
@@ -9278,14 +9125,14 @@
           </a:ln>
           <a:extLst>
             <a:ext uri="{909E8E84-426E-40dd-AFC4-6F175D3DCCD1}">
-              <a14:hiddenFill xmlns="" xmlns:a14="http://schemas.microsoft.com/office/drawing/2010/main">
+              <a14:hiddenFill xmlns:a14="http://schemas.microsoft.com/office/drawing/2010/main" xmlns="">
                 <a:solidFill>
                   <a:schemeClr val="accent2"/>
                 </a:solidFill>
               </a14:hiddenFill>
             </a:ext>
             <a:ext uri="{AF507438-7753-43e0-B8FC-AC1667EBCBE1}">
-              <a14:hiddenEffects xmlns="" xmlns:a14="http://schemas.microsoft.com/office/drawing/2010/main">
+              <a14:hiddenEffects xmlns:a14="http://schemas.microsoft.com/office/drawing/2010/main" xmlns="">
                 <a:effectLst>
                   <a:outerShdw blurRad="63500" dist="35921" dir="2700000" algn="ctr" rotWithShape="0">
                     <a:schemeClr val="bg2"/>
@@ -9378,14 +9225,14 @@
           </a:ln>
           <a:extLst>
             <a:ext uri="{909E8E84-426E-40dd-AFC4-6F175D3DCCD1}">
-              <a14:hiddenFill xmlns="" xmlns:a14="http://schemas.microsoft.com/office/drawing/2010/main">
+              <a14:hiddenFill xmlns:a14="http://schemas.microsoft.com/office/drawing/2010/main" xmlns="">
                 <a:solidFill>
                   <a:schemeClr val="accent2"/>
                 </a:solidFill>
               </a14:hiddenFill>
             </a:ext>
             <a:ext uri="{AF507438-7753-43e0-B8FC-AC1667EBCBE1}">
-              <a14:hiddenEffects xmlns="" xmlns:a14="http://schemas.microsoft.com/office/drawing/2010/main">
+              <a14:hiddenEffects xmlns:a14="http://schemas.microsoft.com/office/drawing/2010/main" xmlns="">
                 <a:effectLst>
                   <a:outerShdw blurRad="63500" dist="35921" dir="2700000" algn="ctr" rotWithShape="0">
                     <a:schemeClr val="bg2"/>
@@ -9478,14 +9325,14 @@
           </a:ln>
           <a:extLst>
             <a:ext uri="{909E8E84-426E-40dd-AFC4-6F175D3DCCD1}">
-              <a14:hiddenFill xmlns="" xmlns:a14="http://schemas.microsoft.com/office/drawing/2010/main">
+              <a14:hiddenFill xmlns:a14="http://schemas.microsoft.com/office/drawing/2010/main" xmlns="">
                 <a:solidFill>
                   <a:schemeClr val="accent2"/>
                 </a:solidFill>
               </a14:hiddenFill>
             </a:ext>
             <a:ext uri="{AF507438-7753-43e0-B8FC-AC1667EBCBE1}">
-              <a14:hiddenEffects xmlns="" xmlns:a14="http://schemas.microsoft.com/office/drawing/2010/main">
+              <a14:hiddenEffects xmlns:a14="http://schemas.microsoft.com/office/drawing/2010/main" xmlns="">
                 <a:effectLst>
                   <a:outerShdw blurRad="63500" dist="35921" dir="2700000" algn="ctr" rotWithShape="0">
                     <a:schemeClr val="bg2"/>
@@ -9578,14 +9425,14 @@
           </a:ln>
           <a:extLst>
             <a:ext uri="{909E8E84-426E-40dd-AFC4-6F175D3DCCD1}">
-              <a14:hiddenFill xmlns="" xmlns:a14="http://schemas.microsoft.com/office/drawing/2010/main">
+              <a14:hiddenFill xmlns:a14="http://schemas.microsoft.com/office/drawing/2010/main" xmlns="">
                 <a:solidFill>
                   <a:schemeClr val="accent2"/>
                 </a:solidFill>
               </a14:hiddenFill>
             </a:ext>
             <a:ext uri="{AF507438-7753-43e0-B8FC-AC1667EBCBE1}">
-              <a14:hiddenEffects xmlns="" xmlns:a14="http://schemas.microsoft.com/office/drawing/2010/main">
+              <a14:hiddenEffects xmlns:a14="http://schemas.microsoft.com/office/drawing/2010/main" xmlns="">
                 <a:effectLst>
                   <a:outerShdw blurRad="63500" dist="35921" dir="2700000" algn="ctr" rotWithShape="0">
                     <a:schemeClr val="bg2"/>
@@ -9678,14 +9525,14 @@
           </a:ln>
           <a:extLst>
             <a:ext uri="{909E8E84-426E-40dd-AFC4-6F175D3DCCD1}">
-              <a14:hiddenFill xmlns="" xmlns:a14="http://schemas.microsoft.com/office/drawing/2010/main">
+              <a14:hiddenFill xmlns:a14="http://schemas.microsoft.com/office/drawing/2010/main" xmlns="">
                 <a:solidFill>
                   <a:schemeClr val="accent2"/>
                 </a:solidFill>
               </a14:hiddenFill>
             </a:ext>
             <a:ext uri="{AF507438-7753-43e0-B8FC-AC1667EBCBE1}">
-              <a14:hiddenEffects xmlns="" xmlns:a14="http://schemas.microsoft.com/office/drawing/2010/main">
+              <a14:hiddenEffects xmlns:a14="http://schemas.microsoft.com/office/drawing/2010/main" xmlns="">
                 <a:effectLst>
                   <a:outerShdw blurRad="63500" dist="35921" dir="2700000" algn="ctr" rotWithShape="0">
                     <a:schemeClr val="bg2"/>
@@ -9778,14 +9625,14 @@
           </a:ln>
           <a:extLst>
             <a:ext uri="{909E8E84-426E-40dd-AFC4-6F175D3DCCD1}">
-              <a14:hiddenFill xmlns="" xmlns:a14="http://schemas.microsoft.com/office/drawing/2010/main">
+              <a14:hiddenFill xmlns:a14="http://schemas.microsoft.com/office/drawing/2010/main" xmlns="">
                 <a:solidFill>
                   <a:schemeClr val="accent2"/>
                 </a:solidFill>
               </a14:hiddenFill>
             </a:ext>
             <a:ext uri="{AF507438-7753-43e0-B8FC-AC1667EBCBE1}">
-              <a14:hiddenEffects xmlns="" xmlns:a14="http://schemas.microsoft.com/office/drawing/2010/main">
+              <a14:hiddenEffects xmlns:a14="http://schemas.microsoft.com/office/drawing/2010/main" xmlns="">
                 <a:effectLst>
                   <a:outerShdw blurRad="63500" dist="35921" dir="2700000" algn="ctr" rotWithShape="0">
                     <a:schemeClr val="bg2"/>
@@ -9878,14 +9725,14 @@
           </a:ln>
           <a:extLst>
             <a:ext uri="{909E8E84-426E-40dd-AFC4-6F175D3DCCD1}">
-              <a14:hiddenFill xmlns="" xmlns:a14="http://schemas.microsoft.com/office/drawing/2010/main">
+              <a14:hiddenFill xmlns:a14="http://schemas.microsoft.com/office/drawing/2010/main" xmlns="">
                 <a:solidFill>
                   <a:schemeClr val="accent2"/>
                 </a:solidFill>
               </a14:hiddenFill>
             </a:ext>
             <a:ext uri="{AF507438-7753-43e0-B8FC-AC1667EBCBE1}">
-              <a14:hiddenEffects xmlns="" xmlns:a14="http://schemas.microsoft.com/office/drawing/2010/main">
+              <a14:hiddenEffects xmlns:a14="http://schemas.microsoft.com/office/drawing/2010/main" xmlns="">
                 <a:effectLst>
                   <a:outerShdw blurRad="63500" dist="35921" dir="2700000" algn="ctr" rotWithShape="0">
                     <a:schemeClr val="bg2"/>
@@ -9978,14 +9825,14 @@
           </a:ln>
           <a:extLst>
             <a:ext uri="{909E8E84-426E-40dd-AFC4-6F175D3DCCD1}">
-              <a14:hiddenFill xmlns="" xmlns:a14="http://schemas.microsoft.com/office/drawing/2010/main">
+              <a14:hiddenFill xmlns:a14="http://schemas.microsoft.com/office/drawing/2010/main" xmlns="">
                 <a:solidFill>
                   <a:schemeClr val="accent2"/>
                 </a:solidFill>
               </a14:hiddenFill>
             </a:ext>
             <a:ext uri="{AF507438-7753-43e0-B8FC-AC1667EBCBE1}">
-              <a14:hiddenEffects xmlns="" xmlns:a14="http://schemas.microsoft.com/office/drawing/2010/main">
+              <a14:hiddenEffects xmlns:a14="http://schemas.microsoft.com/office/drawing/2010/main" xmlns="">
                 <a:effectLst>
                   <a:outerShdw blurRad="63500" dist="35921" dir="2700000" algn="ctr" rotWithShape="0">
                     <a:schemeClr val="bg2"/>
@@ -10078,14 +9925,14 @@
           </a:ln>
           <a:extLst>
             <a:ext uri="{909E8E84-426E-40dd-AFC4-6F175D3DCCD1}">
-              <a14:hiddenFill xmlns="" xmlns:a14="http://schemas.microsoft.com/office/drawing/2010/main">
+              <a14:hiddenFill xmlns:a14="http://schemas.microsoft.com/office/drawing/2010/main" xmlns="">
                 <a:solidFill>
                   <a:schemeClr val="accent2"/>
                 </a:solidFill>
               </a14:hiddenFill>
             </a:ext>
             <a:ext uri="{AF507438-7753-43e0-B8FC-AC1667EBCBE1}">
-              <a14:hiddenEffects xmlns="" xmlns:a14="http://schemas.microsoft.com/office/drawing/2010/main">
+              <a14:hiddenEffects xmlns:a14="http://schemas.microsoft.com/office/drawing/2010/main" xmlns="">
                 <a:effectLst>
                   <a:outerShdw blurRad="63500" dist="35921" dir="2700000" algn="ctr" rotWithShape="0">
                     <a:schemeClr val="bg2"/>
@@ -10178,14 +10025,14 @@
           </a:ln>
           <a:extLst>
             <a:ext uri="{909E8E84-426E-40dd-AFC4-6F175D3DCCD1}">
-              <a14:hiddenFill xmlns="" xmlns:a14="http://schemas.microsoft.com/office/drawing/2010/main">
+              <a14:hiddenFill xmlns:a14="http://schemas.microsoft.com/office/drawing/2010/main" xmlns="">
                 <a:solidFill>
                   <a:schemeClr val="accent2"/>
                 </a:solidFill>
               </a14:hiddenFill>
             </a:ext>
             <a:ext uri="{AF507438-7753-43e0-B8FC-AC1667EBCBE1}">
-              <a14:hiddenEffects xmlns="" xmlns:a14="http://schemas.microsoft.com/office/drawing/2010/main">
+              <a14:hiddenEffects xmlns:a14="http://schemas.microsoft.com/office/drawing/2010/main" xmlns="">
                 <a:effectLst>
                   <a:outerShdw blurRad="63500" dist="35921" dir="2700000" algn="ctr" rotWithShape="0">
                     <a:schemeClr val="bg2"/>
@@ -10278,14 +10125,14 @@
           </a:ln>
           <a:extLst>
             <a:ext uri="{909E8E84-426E-40dd-AFC4-6F175D3DCCD1}">
-              <a14:hiddenFill xmlns="" xmlns:a14="http://schemas.microsoft.com/office/drawing/2010/main">
+              <a14:hiddenFill xmlns:a14="http://schemas.microsoft.com/office/drawing/2010/main" xmlns="">
                 <a:solidFill>
                   <a:schemeClr val="accent2"/>
                 </a:solidFill>
               </a14:hiddenFill>
             </a:ext>
             <a:ext uri="{AF507438-7753-43e0-B8FC-AC1667EBCBE1}">
-              <a14:hiddenEffects xmlns="" xmlns:a14="http://schemas.microsoft.com/office/drawing/2010/main">
+              <a14:hiddenEffects xmlns:a14="http://schemas.microsoft.com/office/drawing/2010/main" xmlns="">
                 <a:effectLst>
                   <a:outerShdw blurRad="63500" dist="35921" dir="2700000" algn="ctr" rotWithShape="0">
                     <a:schemeClr val="bg2"/>
@@ -10378,14 +10225,14 @@
           </a:ln>
           <a:extLst>
             <a:ext uri="{909E8E84-426E-40dd-AFC4-6F175D3DCCD1}">
-              <a14:hiddenFill xmlns="" xmlns:a14="http://schemas.microsoft.com/office/drawing/2010/main">
+              <a14:hiddenFill xmlns:a14="http://schemas.microsoft.com/office/drawing/2010/main" xmlns="">
                 <a:solidFill>
                   <a:schemeClr val="accent2"/>
                 </a:solidFill>
               </a14:hiddenFill>
             </a:ext>
             <a:ext uri="{AF507438-7753-43e0-B8FC-AC1667EBCBE1}">
-              <a14:hiddenEffects xmlns="" xmlns:a14="http://schemas.microsoft.com/office/drawing/2010/main">
+              <a14:hiddenEffects xmlns:a14="http://schemas.microsoft.com/office/drawing/2010/main" xmlns="">
                 <a:effectLst>
                   <a:outerShdw blurRad="63500" dist="35921" dir="2700000" algn="ctr" rotWithShape="0">
                     <a:schemeClr val="bg2"/>
@@ -10478,14 +10325,14 @@
           </a:ln>
           <a:extLst>
             <a:ext uri="{909E8E84-426E-40dd-AFC4-6F175D3DCCD1}">
-              <a14:hiddenFill xmlns="" xmlns:a14="http://schemas.microsoft.com/office/drawing/2010/main">
+              <a14:hiddenFill xmlns:a14="http://schemas.microsoft.com/office/drawing/2010/main" xmlns="">
                 <a:solidFill>
                   <a:schemeClr val="accent2"/>
                 </a:solidFill>
               </a14:hiddenFill>
             </a:ext>
             <a:ext uri="{AF507438-7753-43e0-B8FC-AC1667EBCBE1}">
-              <a14:hiddenEffects xmlns="" xmlns:a14="http://schemas.microsoft.com/office/drawing/2010/main">
+              <a14:hiddenEffects xmlns:a14="http://schemas.microsoft.com/office/drawing/2010/main" xmlns="">
                 <a:effectLst>
                   <a:outerShdw blurRad="63500" dist="35921" dir="2700000" algn="ctr" rotWithShape="0">
                     <a:schemeClr val="bg2"/>
@@ -10578,14 +10425,14 @@
           </a:ln>
           <a:extLst>
             <a:ext uri="{909E8E84-426E-40dd-AFC4-6F175D3DCCD1}">
-              <a14:hiddenFill xmlns="" xmlns:a14="http://schemas.microsoft.com/office/drawing/2010/main">
+              <a14:hiddenFill xmlns:a14="http://schemas.microsoft.com/office/drawing/2010/main" xmlns="">
                 <a:solidFill>
                   <a:schemeClr val="accent2"/>
                 </a:solidFill>
               </a14:hiddenFill>
             </a:ext>
             <a:ext uri="{AF507438-7753-43e0-B8FC-AC1667EBCBE1}">
-              <a14:hiddenEffects xmlns="" xmlns:a14="http://schemas.microsoft.com/office/drawing/2010/main">
+              <a14:hiddenEffects xmlns:a14="http://schemas.microsoft.com/office/drawing/2010/main" xmlns="">
                 <a:effectLst>
                   <a:outerShdw blurRad="63500" dist="35921" dir="2700000" algn="ctr" rotWithShape="0">
                     <a:schemeClr val="bg2"/>
@@ -10678,14 +10525,14 @@
           </a:ln>
           <a:extLst>
             <a:ext uri="{909E8E84-426E-40dd-AFC4-6F175D3DCCD1}">
-              <a14:hiddenFill xmlns="" xmlns:a14="http://schemas.microsoft.com/office/drawing/2010/main">
+              <a14:hiddenFill xmlns:a14="http://schemas.microsoft.com/office/drawing/2010/main" xmlns="">
                 <a:solidFill>
                   <a:schemeClr val="accent2"/>
                 </a:solidFill>
               </a14:hiddenFill>
             </a:ext>
             <a:ext uri="{AF507438-7753-43e0-B8FC-AC1667EBCBE1}">
-              <a14:hiddenEffects xmlns="" xmlns:a14="http://schemas.microsoft.com/office/drawing/2010/main">
+              <a14:hiddenEffects xmlns:a14="http://schemas.microsoft.com/office/drawing/2010/main" xmlns="">
                 <a:effectLst>
                   <a:outerShdw blurRad="63500" dist="35921" dir="2700000" algn="ctr" rotWithShape="0">
                     <a:schemeClr val="bg2"/>
@@ -10778,14 +10625,14 @@
           </a:ln>
           <a:extLst>
             <a:ext uri="{909E8E84-426E-40dd-AFC4-6F175D3DCCD1}">
-              <a14:hiddenFill xmlns="" xmlns:a14="http://schemas.microsoft.com/office/drawing/2010/main">
+              <a14:hiddenFill xmlns:a14="http://schemas.microsoft.com/office/drawing/2010/main" xmlns="">
                 <a:solidFill>
                   <a:schemeClr val="accent2"/>
                 </a:solidFill>
               </a14:hiddenFill>
             </a:ext>
             <a:ext uri="{AF507438-7753-43e0-B8FC-AC1667EBCBE1}">
-              <a14:hiddenEffects xmlns="" xmlns:a14="http://schemas.microsoft.com/office/drawing/2010/main">
+              <a14:hiddenEffects xmlns:a14="http://schemas.microsoft.com/office/drawing/2010/main" xmlns="">
                 <a:effectLst>
                   <a:outerShdw blurRad="63500" dist="35921" dir="2700000" algn="ctr" rotWithShape="0">
                     <a:schemeClr val="bg2"/>
@@ -10878,14 +10725,14 @@
           </a:ln>
           <a:extLst>
             <a:ext uri="{909E8E84-426E-40dd-AFC4-6F175D3DCCD1}">
-              <a14:hiddenFill xmlns="" xmlns:a14="http://schemas.microsoft.com/office/drawing/2010/main">
+              <a14:hiddenFill xmlns:a14="http://schemas.microsoft.com/office/drawing/2010/main" xmlns="">
                 <a:solidFill>
                   <a:schemeClr val="accent2"/>
                 </a:solidFill>
               </a14:hiddenFill>
             </a:ext>
             <a:ext uri="{AF507438-7753-43e0-B8FC-AC1667EBCBE1}">
-              <a14:hiddenEffects xmlns="" xmlns:a14="http://schemas.microsoft.com/office/drawing/2010/main">
+              <a14:hiddenEffects xmlns:a14="http://schemas.microsoft.com/office/drawing/2010/main" xmlns="">
                 <a:effectLst>
                   <a:outerShdw blurRad="63500" dist="35921" dir="2700000" algn="ctr" rotWithShape="0">
                     <a:schemeClr val="bg2"/>
@@ -10978,14 +10825,14 @@
           </a:ln>
           <a:extLst>
             <a:ext uri="{909E8E84-426E-40dd-AFC4-6F175D3DCCD1}">
-              <a14:hiddenFill xmlns="" xmlns:a14="http://schemas.microsoft.com/office/drawing/2010/main">
+              <a14:hiddenFill xmlns:a14="http://schemas.microsoft.com/office/drawing/2010/main" xmlns="">
                 <a:solidFill>
                   <a:schemeClr val="accent2"/>
                 </a:solidFill>
               </a14:hiddenFill>
             </a:ext>
             <a:ext uri="{AF507438-7753-43e0-B8FC-AC1667EBCBE1}">
-              <a14:hiddenEffects xmlns="" xmlns:a14="http://schemas.microsoft.com/office/drawing/2010/main">
+              <a14:hiddenEffects xmlns:a14="http://schemas.microsoft.com/office/drawing/2010/main" xmlns="">
                 <a:effectLst>
                   <a:outerShdw blurRad="63500" dist="35921" dir="2700000" algn="ctr" rotWithShape="0">
                     <a:schemeClr val="bg2"/>
@@ -11078,14 +10925,14 @@
           </a:ln>
           <a:extLst>
             <a:ext uri="{909E8E84-426E-40dd-AFC4-6F175D3DCCD1}">
-              <a14:hiddenFill xmlns="" xmlns:a14="http://schemas.microsoft.com/office/drawing/2010/main">
+              <a14:hiddenFill xmlns:a14="http://schemas.microsoft.com/office/drawing/2010/main" xmlns="">
                 <a:solidFill>
                   <a:schemeClr val="accent2"/>
                 </a:solidFill>
               </a14:hiddenFill>
             </a:ext>
             <a:ext uri="{AF507438-7753-43e0-B8FC-AC1667EBCBE1}">
-              <a14:hiddenEffects xmlns="" xmlns:a14="http://schemas.microsoft.com/office/drawing/2010/main">
+              <a14:hiddenEffects xmlns:a14="http://schemas.microsoft.com/office/drawing/2010/main" xmlns="">
                 <a:effectLst>
                   <a:outerShdw blurRad="63500" dist="35921" dir="2700000" algn="ctr" rotWithShape="0">
                     <a:schemeClr val="bg2"/>
@@ -11178,14 +11025,14 @@
           </a:ln>
           <a:extLst>
             <a:ext uri="{909E8E84-426E-40dd-AFC4-6F175D3DCCD1}">
-              <a14:hiddenFill xmlns="" xmlns:a14="http://schemas.microsoft.com/office/drawing/2010/main">
+              <a14:hiddenFill xmlns:a14="http://schemas.microsoft.com/office/drawing/2010/main" xmlns="">
                 <a:solidFill>
                   <a:schemeClr val="accent2"/>
                 </a:solidFill>
               </a14:hiddenFill>
             </a:ext>
             <a:ext uri="{AF507438-7753-43e0-B8FC-AC1667EBCBE1}">
-              <a14:hiddenEffects xmlns="" xmlns:a14="http://schemas.microsoft.com/office/drawing/2010/main">
+              <a14:hiddenEffects xmlns:a14="http://schemas.microsoft.com/office/drawing/2010/main" xmlns="">
                 <a:effectLst>
                   <a:outerShdw blurRad="63500" dist="35921" dir="2700000" algn="ctr" rotWithShape="0">
                     <a:schemeClr val="bg2"/>
@@ -11278,14 +11125,14 @@
           </a:ln>
           <a:extLst>
             <a:ext uri="{909E8E84-426E-40dd-AFC4-6F175D3DCCD1}">
-              <a14:hiddenFill xmlns="" xmlns:a14="http://schemas.microsoft.com/office/drawing/2010/main">
+              <a14:hiddenFill xmlns:a14="http://schemas.microsoft.com/office/drawing/2010/main" xmlns="">
                 <a:solidFill>
                   <a:schemeClr val="accent2"/>
                 </a:solidFill>
               </a14:hiddenFill>
             </a:ext>
             <a:ext uri="{AF507438-7753-43e0-B8FC-AC1667EBCBE1}">
-              <a14:hiddenEffects xmlns="" xmlns:a14="http://schemas.microsoft.com/office/drawing/2010/main">
+              <a14:hiddenEffects xmlns:a14="http://schemas.microsoft.com/office/drawing/2010/main" xmlns="">
                 <a:effectLst>
                   <a:outerShdw blurRad="63500" dist="35921" dir="2700000" algn="ctr" rotWithShape="0">
                     <a:schemeClr val="bg2"/>
@@ -11378,14 +11225,14 @@
           </a:ln>
           <a:extLst>
             <a:ext uri="{909E8E84-426E-40dd-AFC4-6F175D3DCCD1}">
-              <a14:hiddenFill xmlns="" xmlns:a14="http://schemas.microsoft.com/office/drawing/2010/main">
+              <a14:hiddenFill xmlns:a14="http://schemas.microsoft.com/office/drawing/2010/main" xmlns="">
                 <a:solidFill>
                   <a:schemeClr val="accent2"/>
                 </a:solidFill>
               </a14:hiddenFill>
             </a:ext>
             <a:ext uri="{AF507438-7753-43e0-B8FC-AC1667EBCBE1}">
-              <a14:hiddenEffects xmlns="" xmlns:a14="http://schemas.microsoft.com/office/drawing/2010/main">
+              <a14:hiddenEffects xmlns:a14="http://schemas.microsoft.com/office/drawing/2010/main" xmlns="">
                 <a:effectLst>
                   <a:outerShdw blurRad="63500" dist="35921" dir="2700000" algn="ctr" rotWithShape="0">
                     <a:schemeClr val="bg2"/>
@@ -11478,14 +11325,14 @@
           </a:ln>
           <a:extLst>
             <a:ext uri="{909E8E84-426E-40dd-AFC4-6F175D3DCCD1}">
-              <a14:hiddenFill xmlns="" xmlns:a14="http://schemas.microsoft.com/office/drawing/2010/main">
+              <a14:hiddenFill xmlns:a14="http://schemas.microsoft.com/office/drawing/2010/main" xmlns="">
                 <a:solidFill>
                   <a:schemeClr val="accent2"/>
                 </a:solidFill>
               </a14:hiddenFill>
             </a:ext>
             <a:ext uri="{AF507438-7753-43e0-B8FC-AC1667EBCBE1}">
-              <a14:hiddenEffects xmlns="" xmlns:a14="http://schemas.microsoft.com/office/drawing/2010/main">
+              <a14:hiddenEffects xmlns:a14="http://schemas.microsoft.com/office/drawing/2010/main" xmlns="">
                 <a:effectLst>
                   <a:outerShdw blurRad="63500" dist="35921" dir="2700000" algn="ctr" rotWithShape="0">
                     <a:schemeClr val="bg2"/>
@@ -11578,14 +11425,14 @@
           </a:ln>
           <a:extLst>
             <a:ext uri="{909E8E84-426E-40dd-AFC4-6F175D3DCCD1}">
-              <a14:hiddenFill xmlns="" xmlns:a14="http://schemas.microsoft.com/office/drawing/2010/main">
+              <a14:hiddenFill xmlns:a14="http://schemas.microsoft.com/office/drawing/2010/main" xmlns="">
                 <a:solidFill>
                   <a:schemeClr val="accent2"/>
                 </a:solidFill>
               </a14:hiddenFill>
             </a:ext>
             <a:ext uri="{AF507438-7753-43e0-B8FC-AC1667EBCBE1}">
-              <a14:hiddenEffects xmlns="" xmlns:a14="http://schemas.microsoft.com/office/drawing/2010/main">
+              <a14:hiddenEffects xmlns:a14="http://schemas.microsoft.com/office/drawing/2010/main" xmlns="">
                 <a:effectLst>
                   <a:outerShdw blurRad="63500" dist="35921" dir="2700000" algn="ctr" rotWithShape="0">
                     <a:schemeClr val="bg2"/>
@@ -11678,14 +11525,14 @@
           </a:ln>
           <a:extLst>
             <a:ext uri="{909E8E84-426E-40dd-AFC4-6F175D3DCCD1}">
-              <a14:hiddenFill xmlns="" xmlns:a14="http://schemas.microsoft.com/office/drawing/2010/main">
+              <a14:hiddenFill xmlns:a14="http://schemas.microsoft.com/office/drawing/2010/main" xmlns="">
                 <a:solidFill>
                   <a:schemeClr val="accent2"/>
                 </a:solidFill>
               </a14:hiddenFill>
             </a:ext>
             <a:ext uri="{AF507438-7753-43e0-B8FC-AC1667EBCBE1}">
-              <a14:hiddenEffects xmlns="" xmlns:a14="http://schemas.microsoft.com/office/drawing/2010/main">
+              <a14:hiddenEffects xmlns:a14="http://schemas.microsoft.com/office/drawing/2010/main" xmlns="">
                 <a:effectLst>
                   <a:outerShdw blurRad="63500" dist="35921" dir="2700000" algn="ctr" rotWithShape="0">
                     <a:schemeClr val="bg2"/>
@@ -11778,14 +11625,14 @@
           </a:ln>
           <a:extLst>
             <a:ext uri="{909E8E84-426E-40dd-AFC4-6F175D3DCCD1}">
-              <a14:hiddenFill xmlns="" xmlns:a14="http://schemas.microsoft.com/office/drawing/2010/main">
+              <a14:hiddenFill xmlns:a14="http://schemas.microsoft.com/office/drawing/2010/main" xmlns="">
                 <a:solidFill>
                   <a:schemeClr val="accent2"/>
                 </a:solidFill>
               </a14:hiddenFill>
             </a:ext>
             <a:ext uri="{AF507438-7753-43e0-B8FC-AC1667EBCBE1}">
-              <a14:hiddenEffects xmlns="" xmlns:a14="http://schemas.microsoft.com/office/drawing/2010/main">
+              <a14:hiddenEffects xmlns:a14="http://schemas.microsoft.com/office/drawing/2010/main" xmlns="">
                 <a:effectLst>
                   <a:outerShdw blurRad="63500" dist="35921" dir="2700000" algn="ctr" rotWithShape="0">
                     <a:schemeClr val="bg2"/>
@@ -11878,14 +11725,14 @@
           </a:ln>
           <a:extLst>
             <a:ext uri="{909E8E84-426E-40dd-AFC4-6F175D3DCCD1}">
-              <a14:hiddenFill xmlns="" xmlns:a14="http://schemas.microsoft.com/office/drawing/2010/main">
+              <a14:hiddenFill xmlns:a14="http://schemas.microsoft.com/office/drawing/2010/main" xmlns="">
                 <a:solidFill>
                   <a:schemeClr val="accent2"/>
                 </a:solidFill>
               </a14:hiddenFill>
             </a:ext>
             <a:ext uri="{AF507438-7753-43e0-B8FC-AC1667EBCBE1}">
-              <a14:hiddenEffects xmlns="" xmlns:a14="http://schemas.microsoft.com/office/drawing/2010/main">
+              <a14:hiddenEffects xmlns:a14="http://schemas.microsoft.com/office/drawing/2010/main" xmlns="">
                 <a:effectLst>
                   <a:outerShdw blurRad="63500" dist="35921" dir="2700000" algn="ctr" rotWithShape="0">
                     <a:schemeClr val="bg2"/>
@@ -11978,14 +11825,14 @@
           </a:ln>
           <a:extLst>
             <a:ext uri="{909E8E84-426E-40dd-AFC4-6F175D3DCCD1}">
-              <a14:hiddenFill xmlns="" xmlns:a14="http://schemas.microsoft.com/office/drawing/2010/main">
+              <a14:hiddenFill xmlns:a14="http://schemas.microsoft.com/office/drawing/2010/main" xmlns="">
                 <a:solidFill>
                   <a:schemeClr val="accent2"/>
                 </a:solidFill>
               </a14:hiddenFill>
             </a:ext>
             <a:ext uri="{AF507438-7753-43e0-B8FC-AC1667EBCBE1}">
-              <a14:hiddenEffects xmlns="" xmlns:a14="http://schemas.microsoft.com/office/drawing/2010/main">
+              <a14:hiddenEffects xmlns:a14="http://schemas.microsoft.com/office/drawing/2010/main" xmlns="">
                 <a:effectLst>
                   <a:outerShdw blurRad="63500" dist="35921" dir="2700000" algn="ctr" rotWithShape="0">
                     <a:schemeClr val="bg2"/>
@@ -12078,14 +11925,14 @@
           </a:ln>
           <a:extLst>
             <a:ext uri="{909E8E84-426E-40dd-AFC4-6F175D3DCCD1}">
-              <a14:hiddenFill xmlns="" xmlns:a14="http://schemas.microsoft.com/office/drawing/2010/main">
+              <a14:hiddenFill xmlns:a14="http://schemas.microsoft.com/office/drawing/2010/main" xmlns="">
                 <a:solidFill>
                   <a:schemeClr val="accent2"/>
                 </a:solidFill>
               </a14:hiddenFill>
             </a:ext>
             <a:ext uri="{AF507438-7753-43e0-B8FC-AC1667EBCBE1}">
-              <a14:hiddenEffects xmlns="" xmlns:a14="http://schemas.microsoft.com/office/drawing/2010/main">
+              <a14:hiddenEffects xmlns:a14="http://schemas.microsoft.com/office/drawing/2010/main" xmlns="">
                 <a:effectLst>
                   <a:outerShdw blurRad="63500" dist="35921" dir="2700000" algn="ctr" rotWithShape="0">
                     <a:schemeClr val="bg2"/>
@@ -12178,14 +12025,14 @@
           </a:ln>
           <a:extLst>
             <a:ext uri="{909E8E84-426E-40dd-AFC4-6F175D3DCCD1}">
-              <a14:hiddenFill xmlns="" xmlns:a14="http://schemas.microsoft.com/office/drawing/2010/main">
+              <a14:hiddenFill xmlns:a14="http://schemas.microsoft.com/office/drawing/2010/main" xmlns="">
                 <a:solidFill>
                   <a:schemeClr val="accent2"/>
                 </a:solidFill>
               </a14:hiddenFill>
             </a:ext>
             <a:ext uri="{AF507438-7753-43e0-B8FC-AC1667EBCBE1}">
-              <a14:hiddenEffects xmlns="" xmlns:a14="http://schemas.microsoft.com/office/drawing/2010/main">
+              <a14:hiddenEffects xmlns:a14="http://schemas.microsoft.com/office/drawing/2010/main" xmlns="">
                 <a:effectLst>
                   <a:outerShdw blurRad="63500" dist="35921" dir="2700000" algn="ctr" rotWithShape="0">
                     <a:schemeClr val="bg2"/>
@@ -12278,14 +12125,14 @@
           </a:ln>
           <a:extLst>
             <a:ext uri="{909E8E84-426E-40dd-AFC4-6F175D3DCCD1}">
-              <a14:hiddenFill xmlns="" xmlns:a14="http://schemas.microsoft.com/office/drawing/2010/main">
+              <a14:hiddenFill xmlns:a14="http://schemas.microsoft.com/office/drawing/2010/main" xmlns="">
                 <a:solidFill>
                   <a:schemeClr val="accent2"/>
                 </a:solidFill>
               </a14:hiddenFill>
             </a:ext>
             <a:ext uri="{AF507438-7753-43e0-B8FC-AC1667EBCBE1}">
-              <a14:hiddenEffects xmlns="" xmlns:a14="http://schemas.microsoft.com/office/drawing/2010/main">
+              <a14:hiddenEffects xmlns:a14="http://schemas.microsoft.com/office/drawing/2010/main" xmlns="">
                 <a:effectLst>
                   <a:outerShdw blurRad="63500" dist="35921" dir="2700000" algn="ctr" rotWithShape="0">
                     <a:schemeClr val="bg2"/>
@@ -12378,14 +12225,14 @@
           </a:ln>
           <a:extLst>
             <a:ext uri="{909E8E84-426E-40dd-AFC4-6F175D3DCCD1}">
-              <a14:hiddenFill xmlns="" xmlns:a14="http://schemas.microsoft.com/office/drawing/2010/main">
+              <a14:hiddenFill xmlns:a14="http://schemas.microsoft.com/office/drawing/2010/main" xmlns="">
                 <a:solidFill>
                   <a:schemeClr val="accent2"/>
                 </a:solidFill>
               </a14:hiddenFill>
             </a:ext>
             <a:ext uri="{AF507438-7753-43e0-B8FC-AC1667EBCBE1}">
-              <a14:hiddenEffects xmlns="" xmlns:a14="http://schemas.microsoft.com/office/drawing/2010/main">
+              <a14:hiddenEffects xmlns:a14="http://schemas.microsoft.com/office/drawing/2010/main" xmlns="">
                 <a:effectLst>
                   <a:outerShdw blurRad="63500" dist="35921" dir="2700000" algn="ctr" rotWithShape="0">
                     <a:schemeClr val="bg2"/>
@@ -12478,14 +12325,14 @@
           </a:ln>
           <a:extLst>
             <a:ext uri="{909E8E84-426E-40dd-AFC4-6F175D3DCCD1}">
-              <a14:hiddenFill xmlns="" xmlns:a14="http://schemas.microsoft.com/office/drawing/2010/main">
+              <a14:hiddenFill xmlns:a14="http://schemas.microsoft.com/office/drawing/2010/main" xmlns="">
                 <a:solidFill>
                   <a:schemeClr val="accent2"/>
                 </a:solidFill>
               </a14:hiddenFill>
             </a:ext>
             <a:ext uri="{AF507438-7753-43e0-B8FC-AC1667EBCBE1}">
-              <a14:hiddenEffects xmlns="" xmlns:a14="http://schemas.microsoft.com/office/drawing/2010/main">
+              <a14:hiddenEffects xmlns:a14="http://schemas.microsoft.com/office/drawing/2010/main" xmlns="">
                 <a:effectLst>
                   <a:outerShdw blurRad="63500" dist="35921" dir="2700000" algn="ctr" rotWithShape="0">
                     <a:schemeClr val="bg2"/>
@@ -12578,14 +12425,14 @@
           </a:ln>
           <a:extLst>
             <a:ext uri="{909E8E84-426E-40dd-AFC4-6F175D3DCCD1}">
-              <a14:hiddenFill xmlns="" xmlns:a14="http://schemas.microsoft.com/office/drawing/2010/main">
+              <a14:hiddenFill xmlns:a14="http://schemas.microsoft.com/office/drawing/2010/main" xmlns="">
                 <a:solidFill>
                   <a:schemeClr val="accent2"/>
                 </a:solidFill>
               </a14:hiddenFill>
             </a:ext>
             <a:ext uri="{AF507438-7753-43e0-B8FC-AC1667EBCBE1}">
-              <a14:hiddenEffects xmlns="" xmlns:a14="http://schemas.microsoft.com/office/drawing/2010/main">
+              <a14:hiddenEffects xmlns:a14="http://schemas.microsoft.com/office/drawing/2010/main" xmlns="">
                 <a:effectLst>
                   <a:outerShdw blurRad="63500" dist="35921" dir="2700000" algn="ctr" rotWithShape="0">
                     <a:schemeClr val="bg2"/>
@@ -12678,14 +12525,14 @@
           </a:ln>
           <a:extLst>
             <a:ext uri="{909E8E84-426E-40dd-AFC4-6F175D3DCCD1}">
-              <a14:hiddenFill xmlns="" xmlns:a14="http://schemas.microsoft.com/office/drawing/2010/main">
+              <a14:hiddenFill xmlns:a14="http://schemas.microsoft.com/office/drawing/2010/main" xmlns="">
                 <a:solidFill>
                   <a:schemeClr val="accent2"/>
                 </a:solidFill>
               </a14:hiddenFill>
             </a:ext>
             <a:ext uri="{AF507438-7753-43e0-B8FC-AC1667EBCBE1}">
-              <a14:hiddenEffects xmlns="" xmlns:a14="http://schemas.microsoft.com/office/drawing/2010/main">
+              <a14:hiddenEffects xmlns:a14="http://schemas.microsoft.com/office/drawing/2010/main" xmlns="">
                 <a:effectLst>
                   <a:outerShdw blurRad="63500" dist="35921" dir="2700000" algn="ctr" rotWithShape="0">
                     <a:schemeClr val="bg2"/>
@@ -12778,14 +12625,14 @@
           </a:ln>
           <a:extLst>
             <a:ext uri="{909E8E84-426E-40dd-AFC4-6F175D3DCCD1}">
-              <a14:hiddenFill xmlns="" xmlns:a14="http://schemas.microsoft.com/office/drawing/2010/main">
+              <a14:hiddenFill xmlns:a14="http://schemas.microsoft.com/office/drawing/2010/main" xmlns="">
                 <a:solidFill>
                   <a:schemeClr val="accent2"/>
                 </a:solidFill>
               </a14:hiddenFill>
             </a:ext>
             <a:ext uri="{AF507438-7753-43e0-B8FC-AC1667EBCBE1}">
-              <a14:hiddenEffects xmlns="" xmlns:a14="http://schemas.microsoft.com/office/drawing/2010/main">
+              <a14:hiddenEffects xmlns:a14="http://schemas.microsoft.com/office/drawing/2010/main" xmlns="">
                 <a:effectLst>
                   <a:outerShdw blurRad="63500" dist="35921" dir="2700000" algn="ctr" rotWithShape="0">
                     <a:schemeClr val="bg2"/>
@@ -12878,14 +12725,14 @@
           </a:ln>
           <a:extLst>
             <a:ext uri="{909E8E84-426E-40dd-AFC4-6F175D3DCCD1}">
-              <a14:hiddenFill xmlns="" xmlns:a14="http://schemas.microsoft.com/office/drawing/2010/main">
+              <a14:hiddenFill xmlns:a14="http://schemas.microsoft.com/office/drawing/2010/main" xmlns="">
                 <a:solidFill>
                   <a:schemeClr val="accent2"/>
                 </a:solidFill>
               </a14:hiddenFill>
             </a:ext>
             <a:ext uri="{AF507438-7753-43e0-B8FC-AC1667EBCBE1}">
-              <a14:hiddenEffects xmlns="" xmlns:a14="http://schemas.microsoft.com/office/drawing/2010/main">
+              <a14:hiddenEffects xmlns:a14="http://schemas.microsoft.com/office/drawing/2010/main" xmlns="">
                 <a:effectLst>
                   <a:outerShdw blurRad="63500" dist="35921" dir="2700000" algn="ctr" rotWithShape="0">
                     <a:schemeClr val="bg2"/>
@@ -12978,14 +12825,14 @@
           </a:ln>
           <a:extLst>
             <a:ext uri="{909E8E84-426E-40dd-AFC4-6F175D3DCCD1}">
-              <a14:hiddenFill xmlns="" xmlns:a14="http://schemas.microsoft.com/office/drawing/2010/main">
+              <a14:hiddenFill xmlns:a14="http://schemas.microsoft.com/office/drawing/2010/main" xmlns="">
                 <a:solidFill>
                   <a:schemeClr val="accent2"/>
                 </a:solidFill>
               </a14:hiddenFill>
             </a:ext>
             <a:ext uri="{AF507438-7753-43e0-B8FC-AC1667EBCBE1}">
-              <a14:hiddenEffects xmlns="" xmlns:a14="http://schemas.microsoft.com/office/drawing/2010/main">
+              <a14:hiddenEffects xmlns:a14="http://schemas.microsoft.com/office/drawing/2010/main" xmlns="">
                 <a:effectLst>
                   <a:outerShdw blurRad="63500" dist="35921" dir="2700000" algn="ctr" rotWithShape="0">
                     <a:schemeClr val="bg2"/>
@@ -13078,14 +12925,14 @@
           </a:ln>
           <a:extLst>
             <a:ext uri="{909E8E84-426E-40dd-AFC4-6F175D3DCCD1}">
-              <a14:hiddenFill xmlns="" xmlns:a14="http://schemas.microsoft.com/office/drawing/2010/main">
+              <a14:hiddenFill xmlns:a14="http://schemas.microsoft.com/office/drawing/2010/main" xmlns="">
                 <a:solidFill>
                   <a:schemeClr val="accent2"/>
                 </a:solidFill>
               </a14:hiddenFill>
             </a:ext>
             <a:ext uri="{AF507438-7753-43e0-B8FC-AC1667EBCBE1}">
-              <a14:hiddenEffects xmlns="" xmlns:a14="http://schemas.microsoft.com/office/drawing/2010/main">
+              <a14:hiddenEffects xmlns:a14="http://schemas.microsoft.com/office/drawing/2010/main" xmlns="">
                 <a:effectLst>
                   <a:outerShdw blurRad="63500" dist="35921" dir="2700000" algn="ctr" rotWithShape="0">
                     <a:schemeClr val="bg2"/>
@@ -13178,14 +13025,14 @@
           </a:ln>
           <a:extLst>
             <a:ext uri="{909E8E84-426E-40dd-AFC4-6F175D3DCCD1}">
-              <a14:hiddenFill xmlns="" xmlns:a14="http://schemas.microsoft.com/office/drawing/2010/main">
+              <a14:hiddenFill xmlns:a14="http://schemas.microsoft.com/office/drawing/2010/main" xmlns="">
                 <a:solidFill>
                   <a:schemeClr val="accent2"/>
                 </a:solidFill>
               </a14:hiddenFill>
             </a:ext>
             <a:ext uri="{AF507438-7753-43e0-B8FC-AC1667EBCBE1}">
-              <a14:hiddenEffects xmlns="" xmlns:a14="http://schemas.microsoft.com/office/drawing/2010/main">
+              <a14:hiddenEffects xmlns:a14="http://schemas.microsoft.com/office/drawing/2010/main" xmlns="">
                 <a:effectLst>
                   <a:outerShdw blurRad="63500" dist="35921" dir="2700000" algn="ctr" rotWithShape="0">
                     <a:schemeClr val="bg2"/>
@@ -13278,14 +13125,14 @@
           </a:ln>
           <a:extLst>
             <a:ext uri="{909E8E84-426E-40dd-AFC4-6F175D3DCCD1}">
-              <a14:hiddenFill xmlns="" xmlns:a14="http://schemas.microsoft.com/office/drawing/2010/main">
+              <a14:hiddenFill xmlns:a14="http://schemas.microsoft.com/office/drawing/2010/main" xmlns="">
                 <a:solidFill>
                   <a:schemeClr val="accent2"/>
                 </a:solidFill>
               </a14:hiddenFill>
             </a:ext>
             <a:ext uri="{AF507438-7753-43e0-B8FC-AC1667EBCBE1}">
-              <a14:hiddenEffects xmlns="" xmlns:a14="http://schemas.microsoft.com/office/drawing/2010/main">
+              <a14:hiddenEffects xmlns:a14="http://schemas.microsoft.com/office/drawing/2010/main" xmlns="">
                 <a:effectLst>
                   <a:outerShdw blurRad="63500" dist="35921" dir="2700000" algn="ctr" rotWithShape="0">
                     <a:schemeClr val="bg2"/>
@@ -13378,14 +13225,14 @@
           </a:ln>
           <a:extLst>
             <a:ext uri="{909E8E84-426E-40dd-AFC4-6F175D3DCCD1}">
-              <a14:hiddenFill xmlns="" xmlns:a14="http://schemas.microsoft.com/office/drawing/2010/main">
+              <a14:hiddenFill xmlns:a14="http://schemas.microsoft.com/office/drawing/2010/main" xmlns="">
                 <a:solidFill>
                   <a:schemeClr val="accent2"/>
                 </a:solidFill>
               </a14:hiddenFill>
             </a:ext>
             <a:ext uri="{AF507438-7753-43e0-B8FC-AC1667EBCBE1}">
-              <a14:hiddenEffects xmlns="" xmlns:a14="http://schemas.microsoft.com/office/drawing/2010/main">
+              <a14:hiddenEffects xmlns:a14="http://schemas.microsoft.com/office/drawing/2010/main" xmlns="">
                 <a:effectLst>
                   <a:outerShdw blurRad="63500" dist="35921" dir="2700000" algn="ctr" rotWithShape="0">
                     <a:schemeClr val="bg2"/>
@@ -13478,14 +13325,14 @@
           </a:ln>
           <a:extLst>
             <a:ext uri="{909E8E84-426E-40dd-AFC4-6F175D3DCCD1}">
-              <a14:hiddenFill xmlns="" xmlns:a14="http://schemas.microsoft.com/office/drawing/2010/main">
+              <a14:hiddenFill xmlns:a14="http://schemas.microsoft.com/office/drawing/2010/main" xmlns="">
                 <a:solidFill>
                   <a:schemeClr val="accent2"/>
                 </a:solidFill>
               </a14:hiddenFill>
             </a:ext>
             <a:ext uri="{AF507438-7753-43e0-B8FC-AC1667EBCBE1}">
-              <a14:hiddenEffects xmlns="" xmlns:a14="http://schemas.microsoft.com/office/drawing/2010/main">
+              <a14:hiddenEffects xmlns:a14="http://schemas.microsoft.com/office/drawing/2010/main" xmlns="">
                 <a:effectLst>
                   <a:outerShdw blurRad="63500" dist="35921" dir="2700000" algn="ctr" rotWithShape="0">
                     <a:schemeClr val="bg2"/>
@@ -13578,14 +13425,14 @@
           </a:ln>
           <a:extLst>
             <a:ext uri="{909E8E84-426E-40dd-AFC4-6F175D3DCCD1}">
-              <a14:hiddenFill xmlns="" xmlns:a14="http://schemas.microsoft.com/office/drawing/2010/main">
+              <a14:hiddenFill xmlns:a14="http://schemas.microsoft.com/office/drawing/2010/main" xmlns="">
                 <a:solidFill>
                   <a:schemeClr val="accent2"/>
                 </a:solidFill>
               </a14:hiddenFill>
             </a:ext>
             <a:ext uri="{AF507438-7753-43e0-B8FC-AC1667EBCBE1}">
-              <a14:hiddenEffects xmlns="" xmlns:a14="http://schemas.microsoft.com/office/drawing/2010/main">
+              <a14:hiddenEffects xmlns:a14="http://schemas.microsoft.com/office/drawing/2010/main" xmlns="">
                 <a:effectLst>
                   <a:outerShdw blurRad="63500" dist="35921" dir="2700000" algn="ctr" rotWithShape="0">
                     <a:schemeClr val="bg2"/>
@@ -13678,14 +13525,14 @@
           </a:ln>
           <a:extLst>
             <a:ext uri="{909E8E84-426E-40dd-AFC4-6F175D3DCCD1}">
-              <a14:hiddenFill xmlns="" xmlns:a14="http://schemas.microsoft.com/office/drawing/2010/main">
+              <a14:hiddenFill xmlns:a14="http://schemas.microsoft.com/office/drawing/2010/main" xmlns="">
                 <a:solidFill>
                   <a:schemeClr val="accent2"/>
                 </a:solidFill>
               </a14:hiddenFill>
             </a:ext>
             <a:ext uri="{AF507438-7753-43e0-B8FC-AC1667EBCBE1}">
-              <a14:hiddenEffects xmlns="" xmlns:a14="http://schemas.microsoft.com/office/drawing/2010/main">
+              <a14:hiddenEffects xmlns:a14="http://schemas.microsoft.com/office/drawing/2010/main" xmlns="">
                 <a:effectLst>
                   <a:outerShdw blurRad="63500" dist="35921" dir="2700000" algn="ctr" rotWithShape="0">
                     <a:schemeClr val="bg2"/>
@@ -13778,14 +13625,14 @@
           </a:ln>
           <a:extLst>
             <a:ext uri="{909E8E84-426E-40dd-AFC4-6F175D3DCCD1}">
-              <a14:hiddenFill xmlns="" xmlns:a14="http://schemas.microsoft.com/office/drawing/2010/main">
+              <a14:hiddenFill xmlns:a14="http://schemas.microsoft.com/office/drawing/2010/main" xmlns="">
                 <a:solidFill>
                   <a:schemeClr val="accent2"/>
                 </a:solidFill>
               </a14:hiddenFill>
             </a:ext>
             <a:ext uri="{AF507438-7753-43e0-B8FC-AC1667EBCBE1}">
-              <a14:hiddenEffects xmlns="" xmlns:a14="http://schemas.microsoft.com/office/drawing/2010/main">
+              <a14:hiddenEffects xmlns:a14="http://schemas.microsoft.com/office/drawing/2010/main" xmlns="">
                 <a:effectLst>
                   <a:outerShdw blurRad="63500" dist="35921" dir="2700000" algn="ctr" rotWithShape="0">
                     <a:schemeClr val="bg2"/>
@@ -13878,14 +13725,14 @@
           </a:ln>
           <a:extLst>
             <a:ext uri="{909E8E84-426E-40dd-AFC4-6F175D3DCCD1}">
-              <a14:hiddenFill xmlns="" xmlns:a14="http://schemas.microsoft.com/office/drawing/2010/main">
+              <a14:hiddenFill xmlns:a14="http://schemas.microsoft.com/office/drawing/2010/main" xmlns="">
                 <a:solidFill>
                   <a:schemeClr val="accent2"/>
                 </a:solidFill>
               </a14:hiddenFill>
             </a:ext>
             <a:ext uri="{AF507438-7753-43e0-B8FC-AC1667EBCBE1}">
-              <a14:hiddenEffects xmlns="" xmlns:a14="http://schemas.microsoft.com/office/drawing/2010/main">
+              <a14:hiddenEffects xmlns:a14="http://schemas.microsoft.com/office/drawing/2010/main" xmlns="">
                 <a:effectLst>
                   <a:outerShdw blurRad="63500" dist="35921" dir="2700000" algn="ctr" rotWithShape="0">
                     <a:schemeClr val="bg2"/>
@@ -13978,14 +13825,14 @@
           </a:ln>
           <a:extLst>
             <a:ext uri="{909E8E84-426E-40dd-AFC4-6F175D3DCCD1}">
-              <a14:hiddenFill xmlns="" xmlns:a14="http://schemas.microsoft.com/office/drawing/2010/main">
+              <a14:hiddenFill xmlns:a14="http://schemas.microsoft.com/office/drawing/2010/main" xmlns="">
                 <a:solidFill>
                   <a:schemeClr val="accent2"/>
                 </a:solidFill>
               </a14:hiddenFill>
             </a:ext>
             <a:ext uri="{AF507438-7753-43e0-B8FC-AC1667EBCBE1}">
-              <a14:hiddenEffects xmlns="" xmlns:a14="http://schemas.microsoft.com/office/drawing/2010/main">
+              <a14:hiddenEffects xmlns:a14="http://schemas.microsoft.com/office/drawing/2010/main" xmlns="">
                 <a:effectLst>
                   <a:outerShdw blurRad="63500" dist="35921" dir="2700000" algn="ctr" rotWithShape="0">
                     <a:schemeClr val="bg2"/>
@@ -14078,14 +13925,14 @@
           </a:ln>
           <a:extLst>
             <a:ext uri="{909E8E84-426E-40dd-AFC4-6F175D3DCCD1}">
-              <a14:hiddenFill xmlns="" xmlns:a14="http://schemas.microsoft.com/office/drawing/2010/main">
+              <a14:hiddenFill xmlns:a14="http://schemas.microsoft.com/office/drawing/2010/main" xmlns="">
                 <a:solidFill>
                   <a:schemeClr val="accent2"/>
                 </a:solidFill>
               </a14:hiddenFill>
             </a:ext>
             <a:ext uri="{AF507438-7753-43e0-B8FC-AC1667EBCBE1}">
-              <a14:hiddenEffects xmlns="" xmlns:a14="http://schemas.microsoft.com/office/drawing/2010/main">
+              <a14:hiddenEffects xmlns:a14="http://schemas.microsoft.com/office/drawing/2010/main" xmlns="">
                 <a:effectLst>
                   <a:outerShdw blurRad="63500" dist="35921" dir="2700000" algn="ctr" rotWithShape="0">
                     <a:schemeClr val="bg2"/>
@@ -14178,14 +14025,14 @@
           </a:ln>
           <a:extLst>
             <a:ext uri="{909E8E84-426E-40dd-AFC4-6F175D3DCCD1}">
-              <a14:hiddenFill xmlns="" xmlns:a14="http://schemas.microsoft.com/office/drawing/2010/main">
+              <a14:hiddenFill xmlns:a14="http://schemas.microsoft.com/office/drawing/2010/main" xmlns="">
                 <a:solidFill>
                   <a:schemeClr val="accent2"/>
                 </a:solidFill>
               </a14:hiddenFill>
             </a:ext>
             <a:ext uri="{AF507438-7753-43e0-B8FC-AC1667EBCBE1}">
-              <a14:hiddenEffects xmlns="" xmlns:a14="http://schemas.microsoft.com/office/drawing/2010/main">
+              <a14:hiddenEffects xmlns:a14="http://schemas.microsoft.com/office/drawing/2010/main" xmlns="">
                 <a:effectLst>
                   <a:outerShdw blurRad="63500" dist="35921" dir="2700000" algn="ctr" rotWithShape="0">
                     <a:schemeClr val="bg2"/>
@@ -14278,14 +14125,14 @@
           </a:ln>
           <a:extLst>
             <a:ext uri="{909E8E84-426E-40dd-AFC4-6F175D3DCCD1}">
-              <a14:hiddenFill xmlns="" xmlns:a14="http://schemas.microsoft.com/office/drawing/2010/main">
+              <a14:hiddenFill xmlns:a14="http://schemas.microsoft.com/office/drawing/2010/main" xmlns="">
                 <a:solidFill>
                   <a:schemeClr val="accent2"/>
                 </a:solidFill>
               </a14:hiddenFill>
             </a:ext>
             <a:ext uri="{AF507438-7753-43e0-B8FC-AC1667EBCBE1}">
-              <a14:hiddenEffects xmlns="" xmlns:a14="http://schemas.microsoft.com/office/drawing/2010/main">
+              <a14:hiddenEffects xmlns:a14="http://schemas.microsoft.com/office/drawing/2010/main" xmlns="">
                 <a:effectLst>
                   <a:outerShdw blurRad="63500" dist="35921" dir="2700000" algn="ctr" rotWithShape="0">
                     <a:schemeClr val="bg2"/>
@@ -14378,14 +14225,14 @@
           </a:ln>
           <a:extLst>
             <a:ext uri="{909E8E84-426E-40dd-AFC4-6F175D3DCCD1}">
-              <a14:hiddenFill xmlns="" xmlns:a14="http://schemas.microsoft.com/office/drawing/2010/main">
+              <a14:hiddenFill xmlns:a14="http://schemas.microsoft.com/office/drawing/2010/main" xmlns="">
                 <a:solidFill>
                   <a:schemeClr val="accent2"/>
                 </a:solidFill>
               </a14:hiddenFill>
             </a:ext>
             <a:ext uri="{AF507438-7753-43e0-B8FC-AC1667EBCBE1}">
-              <a14:hiddenEffects xmlns="" xmlns:a14="http://schemas.microsoft.com/office/drawing/2010/main">
+              <a14:hiddenEffects xmlns:a14="http://schemas.microsoft.com/office/drawing/2010/main" xmlns="">
                 <a:effectLst>
                   <a:outerShdw blurRad="63500" dist="35921" dir="2700000" algn="ctr" rotWithShape="0">
                     <a:schemeClr val="bg2"/>
@@ -14478,14 +14325,14 @@
           </a:ln>
           <a:extLst>
             <a:ext uri="{909E8E84-426E-40dd-AFC4-6F175D3DCCD1}">
-              <a14:hiddenFill xmlns="" xmlns:a14="http://schemas.microsoft.com/office/drawing/2010/main">
+              <a14:hiddenFill xmlns:a14="http://schemas.microsoft.com/office/drawing/2010/main" xmlns="">
                 <a:solidFill>
                   <a:schemeClr val="accent2"/>
                 </a:solidFill>
               </a14:hiddenFill>
             </a:ext>
             <a:ext uri="{AF507438-7753-43e0-B8FC-AC1667EBCBE1}">
-              <a14:hiddenEffects xmlns="" xmlns:a14="http://schemas.microsoft.com/office/drawing/2010/main">
+              <a14:hiddenEffects xmlns:a14="http://schemas.microsoft.com/office/drawing/2010/main" xmlns="">
                 <a:effectLst>
                   <a:outerShdw blurRad="63500" dist="35921" dir="2700000" algn="ctr" rotWithShape="0">
                     <a:schemeClr val="bg2"/>
@@ -14578,14 +14425,14 @@
           </a:ln>
           <a:extLst>
             <a:ext uri="{909E8E84-426E-40dd-AFC4-6F175D3DCCD1}">
-              <a14:hiddenFill xmlns="" xmlns:a14="http://schemas.microsoft.com/office/drawing/2010/main">
+              <a14:hiddenFill xmlns:a14="http://schemas.microsoft.com/office/drawing/2010/main" xmlns="">
                 <a:solidFill>
                   <a:schemeClr val="accent2"/>
                 </a:solidFill>
               </a14:hiddenFill>
             </a:ext>
             <a:ext uri="{AF507438-7753-43e0-B8FC-AC1667EBCBE1}">
-              <a14:hiddenEffects xmlns="" xmlns:a14="http://schemas.microsoft.com/office/drawing/2010/main">
+              <a14:hiddenEffects xmlns:a14="http://schemas.microsoft.com/office/drawing/2010/main" xmlns="">
                 <a:effectLst>
                   <a:outerShdw blurRad="63500" dist="35921" dir="2700000" algn="ctr" rotWithShape="0">
                     <a:schemeClr val="bg2"/>
@@ -14678,14 +14525,14 @@
           </a:ln>
           <a:extLst>
             <a:ext uri="{909E8E84-426E-40dd-AFC4-6F175D3DCCD1}">
-              <a14:hiddenFill xmlns="" xmlns:a14="http://schemas.microsoft.com/office/drawing/2010/main">
+              <a14:hiddenFill xmlns:a14="http://schemas.microsoft.com/office/drawing/2010/main" xmlns="">
                 <a:solidFill>
                   <a:schemeClr val="accent2"/>
                 </a:solidFill>
               </a14:hiddenFill>
             </a:ext>
             <a:ext uri="{AF507438-7753-43e0-B8FC-AC1667EBCBE1}">
-              <a14:hiddenEffects xmlns="" xmlns:a14="http://schemas.microsoft.com/office/drawing/2010/main">
+              <a14:hiddenEffects xmlns:a14="http://schemas.microsoft.com/office/drawing/2010/main" xmlns="">
                 <a:effectLst>
                   <a:outerShdw blurRad="63500" dist="35921" dir="2700000" algn="ctr" rotWithShape="0">
                     <a:schemeClr val="bg2"/>
@@ -14778,14 +14625,14 @@
           </a:ln>
           <a:extLst>
             <a:ext uri="{909E8E84-426E-40dd-AFC4-6F175D3DCCD1}">
-              <a14:hiddenFill xmlns="" xmlns:a14="http://schemas.microsoft.com/office/drawing/2010/main">
+              <a14:hiddenFill xmlns:a14="http://schemas.microsoft.com/office/drawing/2010/main" xmlns="">
                 <a:solidFill>
                   <a:schemeClr val="accent2"/>
                 </a:solidFill>
               </a14:hiddenFill>
             </a:ext>
             <a:ext uri="{AF507438-7753-43e0-B8FC-AC1667EBCBE1}">
-              <a14:hiddenEffects xmlns="" xmlns:a14="http://schemas.microsoft.com/office/drawing/2010/main">
+              <a14:hiddenEffects xmlns:a14="http://schemas.microsoft.com/office/drawing/2010/main" xmlns="">
                 <a:effectLst>
                   <a:outerShdw blurRad="63500" dist="35921" dir="2700000" algn="ctr" rotWithShape="0">
                     <a:schemeClr val="bg2"/>
@@ -14878,14 +14725,14 @@
           </a:ln>
           <a:extLst>
             <a:ext uri="{909E8E84-426E-40dd-AFC4-6F175D3DCCD1}">
-              <a14:hiddenFill xmlns="" xmlns:a14="http://schemas.microsoft.com/office/drawing/2010/main">
+              <a14:hiddenFill xmlns:a14="http://schemas.microsoft.com/office/drawing/2010/main" xmlns="">
                 <a:solidFill>
                   <a:schemeClr val="accent2"/>
                 </a:solidFill>
               </a14:hiddenFill>
             </a:ext>
             <a:ext uri="{AF507438-7753-43e0-B8FC-AC1667EBCBE1}">
-              <a14:hiddenEffects xmlns="" xmlns:a14="http://schemas.microsoft.com/office/drawing/2010/main">
+              <a14:hiddenEffects xmlns:a14="http://schemas.microsoft.com/office/drawing/2010/main" xmlns="">
                 <a:effectLst>
                   <a:outerShdw blurRad="63500" dist="35921" dir="2700000" algn="ctr" rotWithShape="0">
                     <a:schemeClr val="bg2"/>
@@ -14978,14 +14825,14 @@
           </a:ln>
           <a:extLst>
             <a:ext uri="{909E8E84-426E-40dd-AFC4-6F175D3DCCD1}">
-              <a14:hiddenFill xmlns="" xmlns:a14="http://schemas.microsoft.com/office/drawing/2010/main">
+              <a14:hiddenFill xmlns:a14="http://schemas.microsoft.com/office/drawing/2010/main" xmlns="">
                 <a:solidFill>
                   <a:schemeClr val="accent2"/>
                 </a:solidFill>
               </a14:hiddenFill>
             </a:ext>
             <a:ext uri="{AF507438-7753-43e0-B8FC-AC1667EBCBE1}">
-              <a14:hiddenEffects xmlns="" xmlns:a14="http://schemas.microsoft.com/office/drawing/2010/main">
+              <a14:hiddenEffects xmlns:a14="http://schemas.microsoft.com/office/drawing/2010/main" xmlns="">
                 <a:effectLst>
                   <a:outerShdw blurRad="63500" dist="35921" dir="2700000" algn="ctr" rotWithShape="0">
                     <a:schemeClr val="bg2"/>
@@ -15078,14 +14925,14 @@
           </a:ln>
           <a:extLst>
             <a:ext uri="{909E8E84-426E-40dd-AFC4-6F175D3DCCD1}">
-              <a14:hiddenFill xmlns="" xmlns:a14="http://schemas.microsoft.com/office/drawing/2010/main">
+              <a14:hiddenFill xmlns:a14="http://schemas.microsoft.com/office/drawing/2010/main" xmlns="">
                 <a:solidFill>
                   <a:schemeClr val="accent2"/>
                 </a:solidFill>
               </a14:hiddenFill>
             </a:ext>
             <a:ext uri="{AF507438-7753-43e0-B8FC-AC1667EBCBE1}">
-              <a14:hiddenEffects xmlns="" xmlns:a14="http://schemas.microsoft.com/office/drawing/2010/main">
+              <a14:hiddenEffects xmlns:a14="http://schemas.microsoft.com/office/drawing/2010/main" xmlns="">
                 <a:effectLst>
                   <a:outerShdw blurRad="63500" dist="35921" dir="2700000" algn="ctr" rotWithShape="0">
                     <a:schemeClr val="bg2"/>
@@ -15178,14 +15025,14 @@
           </a:ln>
           <a:extLst>
             <a:ext uri="{909E8E84-426E-40dd-AFC4-6F175D3DCCD1}">
-              <a14:hiddenFill xmlns="" xmlns:a14="http://schemas.microsoft.com/office/drawing/2010/main">
+              <a14:hiddenFill xmlns:a14="http://schemas.microsoft.com/office/drawing/2010/main" xmlns="">
                 <a:solidFill>
                   <a:schemeClr val="accent2"/>
                 </a:solidFill>
               </a14:hiddenFill>
             </a:ext>
             <a:ext uri="{AF507438-7753-43e0-B8FC-AC1667EBCBE1}">
-              <a14:hiddenEffects xmlns="" xmlns:a14="http://schemas.microsoft.com/office/drawing/2010/main">
+              <a14:hiddenEffects xmlns:a14="http://schemas.microsoft.com/office/drawing/2010/main" xmlns="">
                 <a:effectLst>
                   <a:outerShdw blurRad="63500" dist="35921" dir="2700000" algn="ctr" rotWithShape="0">
                     <a:schemeClr val="bg2"/>
@@ -15278,14 +15125,14 @@
           </a:ln>
           <a:extLst>
             <a:ext uri="{909E8E84-426E-40dd-AFC4-6F175D3DCCD1}">
-              <a14:hiddenFill xmlns="" xmlns:a14="http://schemas.microsoft.com/office/drawing/2010/main">
+              <a14:hiddenFill xmlns:a14="http://schemas.microsoft.com/office/drawing/2010/main" xmlns="">
                 <a:solidFill>
                   <a:schemeClr val="accent2"/>
                 </a:solidFill>
               </a14:hiddenFill>
             </a:ext>
             <a:ext uri="{AF507438-7753-43e0-B8FC-AC1667EBCBE1}">
-              <a14:hiddenEffects xmlns="" xmlns:a14="http://schemas.microsoft.com/office/drawing/2010/main">
+              <a14:hiddenEffects xmlns:a14="http://schemas.microsoft.com/office/drawing/2010/main" xmlns="">
                 <a:effectLst>
                   <a:outerShdw blurRad="63500" dist="35921" dir="2700000" algn="ctr" rotWithShape="0">
                     <a:schemeClr val="bg2"/>
@@ -15378,14 +15225,14 @@
           </a:ln>
           <a:extLst>
             <a:ext uri="{909E8E84-426E-40dd-AFC4-6F175D3DCCD1}">
-              <a14:hiddenFill xmlns="" xmlns:a14="http://schemas.microsoft.com/office/drawing/2010/main">
+              <a14:hiddenFill xmlns:a14="http://schemas.microsoft.com/office/drawing/2010/main" xmlns="">
                 <a:solidFill>
                   <a:schemeClr val="accent2"/>
                 </a:solidFill>
               </a14:hiddenFill>
             </a:ext>
             <a:ext uri="{AF507438-7753-43e0-B8FC-AC1667EBCBE1}">
-              <a14:hiddenEffects xmlns="" xmlns:a14="http://schemas.microsoft.com/office/drawing/2010/main">
+              <a14:hiddenEffects xmlns:a14="http://schemas.microsoft.com/office/drawing/2010/main" xmlns="">
                 <a:effectLst>
                   <a:outerShdw blurRad="63500" dist="35921" dir="2700000" algn="ctr" rotWithShape="0">
                     <a:schemeClr val="bg2"/>
@@ -15478,14 +15325,14 @@
           </a:ln>
           <a:extLst>
             <a:ext uri="{909E8E84-426E-40dd-AFC4-6F175D3DCCD1}">
-              <a14:hiddenFill xmlns="" xmlns:a14="http://schemas.microsoft.com/office/drawing/2010/main">
+              <a14:hiddenFill xmlns:a14="http://schemas.microsoft.com/office/drawing/2010/main" xmlns="">
                 <a:solidFill>
                   <a:schemeClr val="accent2"/>
                 </a:solidFill>
               </a14:hiddenFill>
             </a:ext>
             <a:ext uri="{AF507438-7753-43e0-B8FC-AC1667EBCBE1}">
-              <a14:hiddenEffects xmlns="" xmlns:a14="http://schemas.microsoft.com/office/drawing/2010/main">
+              <a14:hiddenEffects xmlns:a14="http://schemas.microsoft.com/office/drawing/2010/main" xmlns="">
                 <a:effectLst>
                   <a:outerShdw blurRad="63500" dist="35921" dir="2700000" algn="ctr" rotWithShape="0">
                     <a:schemeClr val="bg2"/>
@@ -15578,14 +15425,14 @@
           </a:ln>
           <a:extLst>
             <a:ext uri="{909E8E84-426E-40dd-AFC4-6F175D3DCCD1}">
-              <a14:hiddenFill xmlns="" xmlns:a14="http://schemas.microsoft.com/office/drawing/2010/main">
+              <a14:hiddenFill xmlns:a14="http://schemas.microsoft.com/office/drawing/2010/main" xmlns="">
                 <a:solidFill>
                   <a:schemeClr val="accent2"/>
                 </a:solidFill>
               </a14:hiddenFill>
             </a:ext>
             <a:ext uri="{AF507438-7753-43e0-B8FC-AC1667EBCBE1}">
-              <a14:hiddenEffects xmlns="" xmlns:a14="http://schemas.microsoft.com/office/drawing/2010/main">
+              <a14:hiddenEffects xmlns:a14="http://schemas.microsoft.com/office/drawing/2010/main" xmlns="">
                 <a:effectLst>
                   <a:outerShdw blurRad="63500" dist="35921" dir="2700000" algn="ctr" rotWithShape="0">
                     <a:schemeClr val="bg2"/>
@@ -15678,14 +15525,14 @@
           </a:ln>
           <a:extLst>
             <a:ext uri="{909E8E84-426E-40dd-AFC4-6F175D3DCCD1}">
-              <a14:hiddenFill xmlns="" xmlns:a14="http://schemas.microsoft.com/office/drawing/2010/main">
+              <a14:hiddenFill xmlns:a14="http://schemas.microsoft.com/office/drawing/2010/main" xmlns="">
                 <a:solidFill>
                   <a:schemeClr val="accent2"/>
                 </a:solidFill>
               </a14:hiddenFill>
             </a:ext>
             <a:ext uri="{AF507438-7753-43e0-B8FC-AC1667EBCBE1}">
-              <a14:hiddenEffects xmlns="" xmlns:a14="http://schemas.microsoft.com/office/drawing/2010/main">
+              <a14:hiddenEffects xmlns:a14="http://schemas.microsoft.com/office/drawing/2010/main" xmlns="">
                 <a:effectLst>
                   <a:outerShdw blurRad="63500" dist="35921" dir="2700000" algn="ctr" rotWithShape="0">
                     <a:schemeClr val="bg2"/>
@@ -15778,14 +15625,14 @@
           </a:ln>
           <a:extLst>
             <a:ext uri="{909E8E84-426E-40dd-AFC4-6F175D3DCCD1}">
-              <a14:hiddenFill xmlns="" xmlns:a14="http://schemas.microsoft.com/office/drawing/2010/main">
+              <a14:hiddenFill xmlns:a14="http://schemas.microsoft.com/office/drawing/2010/main" xmlns="">
                 <a:solidFill>
                   <a:schemeClr val="accent2"/>
                 </a:solidFill>
               </a14:hiddenFill>
             </a:ext>
             <a:ext uri="{AF507438-7753-43e0-B8FC-AC1667EBCBE1}">
-              <a14:hiddenEffects xmlns="" xmlns:a14="http://schemas.microsoft.com/office/drawing/2010/main">
+              <a14:hiddenEffects xmlns:a14="http://schemas.microsoft.com/office/drawing/2010/main" xmlns="">
                 <a:effectLst>
                   <a:outerShdw blurRad="63500" dist="35921" dir="2700000" algn="ctr" rotWithShape="0">
                     <a:schemeClr val="bg2"/>
@@ -15878,14 +15725,14 @@
           </a:ln>
           <a:extLst>
             <a:ext uri="{909E8E84-426E-40dd-AFC4-6F175D3DCCD1}">
-              <a14:hiddenFill xmlns="" xmlns:a14="http://schemas.microsoft.com/office/drawing/2010/main">
+              <a14:hiddenFill xmlns:a14="http://schemas.microsoft.com/office/drawing/2010/main" xmlns="">
                 <a:solidFill>
                   <a:schemeClr val="accent2"/>
                 </a:solidFill>
               </a14:hiddenFill>
             </a:ext>
             <a:ext uri="{AF507438-7753-43e0-B8FC-AC1667EBCBE1}">
-              <a14:hiddenEffects xmlns="" xmlns:a14="http://schemas.microsoft.com/office/drawing/2010/main">
+              <a14:hiddenEffects xmlns:a14="http://schemas.microsoft.com/office/drawing/2010/main" xmlns="">
                 <a:effectLst>
                   <a:outerShdw blurRad="63500" dist="35921" dir="2700000" algn="ctr" rotWithShape="0">
                     <a:schemeClr val="bg2"/>
@@ -15978,14 +15825,14 @@
           </a:ln>
           <a:extLst>
             <a:ext uri="{909E8E84-426E-40dd-AFC4-6F175D3DCCD1}">
-              <a14:hiddenFill xmlns="" xmlns:a14="http://schemas.microsoft.com/office/drawing/2010/main">
+              <a14:hiddenFill xmlns:a14="http://schemas.microsoft.com/office/drawing/2010/main" xmlns="">
                 <a:solidFill>
                   <a:schemeClr val="accent2"/>
                 </a:solidFill>
               </a14:hiddenFill>
             </a:ext>
             <a:ext uri="{AF507438-7753-43e0-B8FC-AC1667EBCBE1}">
-              <a14:hiddenEffects xmlns="" xmlns:a14="http://schemas.microsoft.com/office/drawing/2010/main">
+              <a14:hiddenEffects xmlns:a14="http://schemas.microsoft.com/office/drawing/2010/main" xmlns="">
                 <a:effectLst>
                   <a:outerShdw blurRad="63500" dist="35921" dir="2700000" algn="ctr" rotWithShape="0">
                     <a:schemeClr val="bg2"/>
@@ -16078,14 +15925,14 @@
           </a:ln>
           <a:extLst>
             <a:ext uri="{909E8E84-426E-40dd-AFC4-6F175D3DCCD1}">
-              <a14:hiddenFill xmlns="" xmlns:a14="http://schemas.microsoft.com/office/drawing/2010/main">
+              <a14:hiddenFill xmlns:a14="http://schemas.microsoft.com/office/drawing/2010/main" xmlns="">
                 <a:solidFill>
                   <a:schemeClr val="accent2"/>
                 </a:solidFill>
               </a14:hiddenFill>
             </a:ext>
             <a:ext uri="{AF507438-7753-43e0-B8FC-AC1667EBCBE1}">
-              <a14:hiddenEffects xmlns="" xmlns:a14="http://schemas.microsoft.com/office/drawing/2010/main">
+              <a14:hiddenEffects xmlns:a14="http://schemas.microsoft.com/office/drawing/2010/main" xmlns="">
                 <a:effectLst>
                   <a:outerShdw blurRad="63500" dist="35921" dir="2700000" algn="ctr" rotWithShape="0">
                     <a:schemeClr val="bg2"/>
@@ -16178,14 +16025,14 @@
           </a:ln>
           <a:extLst>
             <a:ext uri="{909E8E84-426E-40dd-AFC4-6F175D3DCCD1}">
-              <a14:hiddenFill xmlns="" xmlns:a14="http://schemas.microsoft.com/office/drawing/2010/main">
+              <a14:hiddenFill xmlns:a14="http://schemas.microsoft.com/office/drawing/2010/main" xmlns="">
                 <a:solidFill>
                   <a:schemeClr val="accent2"/>
                 </a:solidFill>
               </a14:hiddenFill>
             </a:ext>
             <a:ext uri="{AF507438-7753-43e0-B8FC-AC1667EBCBE1}">
-              <a14:hiddenEffects xmlns="" xmlns:a14="http://schemas.microsoft.com/office/drawing/2010/main">
+              <a14:hiddenEffects xmlns:a14="http://schemas.microsoft.com/office/drawing/2010/main" xmlns="">
                 <a:effectLst>
                   <a:outerShdw blurRad="63500" dist="35921" dir="2700000" algn="ctr" rotWithShape="0">
                     <a:schemeClr val="bg2"/>
@@ -16278,14 +16125,14 @@
           </a:ln>
           <a:extLst>
             <a:ext uri="{909E8E84-426E-40dd-AFC4-6F175D3DCCD1}">
-              <a14:hiddenFill xmlns="" xmlns:a14="http://schemas.microsoft.com/office/drawing/2010/main">
+              <a14:hiddenFill xmlns:a14="http://schemas.microsoft.com/office/drawing/2010/main" xmlns="">
                 <a:solidFill>
                   <a:schemeClr val="accent2"/>
                 </a:solidFill>
               </a14:hiddenFill>
             </a:ext>
             <a:ext uri="{AF507438-7753-43e0-B8FC-AC1667EBCBE1}">
-              <a14:hiddenEffects xmlns="" xmlns:a14="http://schemas.microsoft.com/office/drawing/2010/main">
+              <a14:hiddenEffects xmlns:a14="http://schemas.microsoft.com/office/drawing/2010/main" xmlns="">
                 <a:effectLst>
                   <a:outerShdw blurRad="63500" dist="35921" dir="2700000" algn="ctr" rotWithShape="0">
                     <a:schemeClr val="bg2"/>
@@ -16378,14 +16225,14 @@
           </a:ln>
           <a:extLst>
             <a:ext uri="{909E8E84-426E-40dd-AFC4-6F175D3DCCD1}">
-              <a14:hiddenFill xmlns="" xmlns:a14="http://schemas.microsoft.com/office/drawing/2010/main">
+              <a14:hiddenFill xmlns:a14="http://schemas.microsoft.com/office/drawing/2010/main" xmlns="">
                 <a:solidFill>
                   <a:schemeClr val="accent2"/>
                 </a:solidFill>
               </a14:hiddenFill>
             </a:ext>
             <a:ext uri="{AF507438-7753-43e0-B8FC-AC1667EBCBE1}">
-              <a14:hiddenEffects xmlns="" xmlns:a14="http://schemas.microsoft.com/office/drawing/2010/main">
+              <a14:hiddenEffects xmlns:a14="http://schemas.microsoft.com/office/drawing/2010/main" xmlns="">
                 <a:effectLst>
                   <a:outerShdw blurRad="63500" dist="35921" dir="2700000" algn="ctr" rotWithShape="0">
                     <a:schemeClr val="bg2"/>
@@ -16694,14 +16541,14 @@
           </a:ln>
           <a:extLst>
             <a:ext uri="{909E8E84-426E-40dd-AFC4-6F175D3DCCD1}">
-              <a14:hiddenFill xmlns="" xmlns:a14="http://schemas.microsoft.com/office/drawing/2010/main">
+              <a14:hiddenFill xmlns:a14="http://schemas.microsoft.com/office/drawing/2010/main" xmlns="">
                 <a:solidFill>
                   <a:schemeClr val="accent2"/>
                 </a:solidFill>
               </a14:hiddenFill>
             </a:ext>
             <a:ext uri="{AF507438-7753-43e0-B8FC-AC1667EBCBE1}">
-              <a14:hiddenEffects xmlns="" xmlns:a14="http://schemas.microsoft.com/office/drawing/2010/main">
+              <a14:hiddenEffects xmlns:a14="http://schemas.microsoft.com/office/drawing/2010/main" xmlns="">
                 <a:effectLst>
                   <a:outerShdw blurRad="63500" dist="35921" dir="2700000" algn="ctr" rotWithShape="0">
                     <a:schemeClr val="bg2"/>
@@ -16830,14 +16677,14 @@
           </a:ln>
           <a:extLst>
             <a:ext uri="{909E8E84-426E-40dd-AFC4-6F175D3DCCD1}">
-              <a14:hiddenFill xmlns="" xmlns:a14="http://schemas.microsoft.com/office/drawing/2010/main">
+              <a14:hiddenFill xmlns:a14="http://schemas.microsoft.com/office/drawing/2010/main" xmlns="">
                 <a:solidFill>
                   <a:schemeClr val="accent2"/>
                 </a:solidFill>
               </a14:hiddenFill>
             </a:ext>
             <a:ext uri="{AF507438-7753-43e0-B8FC-AC1667EBCBE1}">
-              <a14:hiddenEffects xmlns="" xmlns:a14="http://schemas.microsoft.com/office/drawing/2010/main">
+              <a14:hiddenEffects xmlns:a14="http://schemas.microsoft.com/office/drawing/2010/main" xmlns="">
                 <a:effectLst>
                   <a:outerShdw blurRad="63500" dist="35921" dir="2700000" algn="ctr" rotWithShape="0">
                     <a:schemeClr val="bg2"/>
@@ -16930,14 +16777,14 @@
           </a:ln>
           <a:extLst>
             <a:ext uri="{909E8E84-426E-40dd-AFC4-6F175D3DCCD1}">
-              <a14:hiddenFill xmlns="" xmlns:a14="http://schemas.microsoft.com/office/drawing/2010/main">
+              <a14:hiddenFill xmlns:a14="http://schemas.microsoft.com/office/drawing/2010/main" xmlns="">
                 <a:solidFill>
                   <a:schemeClr val="accent2"/>
                 </a:solidFill>
               </a14:hiddenFill>
             </a:ext>
             <a:ext uri="{AF507438-7753-43e0-B8FC-AC1667EBCBE1}">
-              <a14:hiddenEffects xmlns="" xmlns:a14="http://schemas.microsoft.com/office/drawing/2010/main">
+              <a14:hiddenEffects xmlns:a14="http://schemas.microsoft.com/office/drawing/2010/main" xmlns="">
                 <a:effectLst>
                   <a:outerShdw blurRad="63500" dist="35921" dir="2700000" algn="ctr" rotWithShape="0">
                     <a:schemeClr val="bg2"/>
@@ -17030,14 +16877,14 @@
           </a:ln>
           <a:extLst>
             <a:ext uri="{909E8E84-426E-40dd-AFC4-6F175D3DCCD1}">
-              <a14:hiddenFill xmlns="" xmlns:a14="http://schemas.microsoft.com/office/drawing/2010/main">
+              <a14:hiddenFill xmlns:a14="http://schemas.microsoft.com/office/drawing/2010/main" xmlns="">
                 <a:solidFill>
                   <a:schemeClr val="accent2"/>
                 </a:solidFill>
               </a14:hiddenFill>
             </a:ext>
             <a:ext uri="{AF507438-7753-43e0-B8FC-AC1667EBCBE1}">
-              <a14:hiddenEffects xmlns="" xmlns:a14="http://schemas.microsoft.com/office/drawing/2010/main">
+              <a14:hiddenEffects xmlns:a14="http://schemas.microsoft.com/office/drawing/2010/main" xmlns="">
                 <a:effectLst>
                   <a:outerShdw blurRad="63500" dist="35921" dir="2700000" algn="ctr" rotWithShape="0">
                     <a:schemeClr val="bg2"/>
@@ -17130,14 +16977,14 @@
           </a:ln>
           <a:extLst>
             <a:ext uri="{909E8E84-426E-40dd-AFC4-6F175D3DCCD1}">
-              <a14:hiddenFill xmlns="" xmlns:a14="http://schemas.microsoft.com/office/drawing/2010/main">
+              <a14:hiddenFill xmlns:a14="http://schemas.microsoft.com/office/drawing/2010/main" xmlns="">
                 <a:solidFill>
                   <a:schemeClr val="accent2"/>
                 </a:solidFill>
               </a14:hiddenFill>
             </a:ext>
             <a:ext uri="{AF507438-7753-43e0-B8FC-AC1667EBCBE1}">
-              <a14:hiddenEffects xmlns="" xmlns:a14="http://schemas.microsoft.com/office/drawing/2010/main">
+              <a14:hiddenEffects xmlns:a14="http://schemas.microsoft.com/office/drawing/2010/main" xmlns="">
                 <a:effectLst>
                   <a:outerShdw blurRad="63500" dist="35921" dir="2700000" algn="ctr" rotWithShape="0">
                     <a:schemeClr val="bg2"/>
@@ -17230,14 +17077,14 @@
           </a:ln>
           <a:extLst>
             <a:ext uri="{909E8E84-426E-40dd-AFC4-6F175D3DCCD1}">
-              <a14:hiddenFill xmlns="" xmlns:a14="http://schemas.microsoft.com/office/drawing/2010/main">
+              <a14:hiddenFill xmlns:a14="http://schemas.microsoft.com/office/drawing/2010/main" xmlns="">
                 <a:solidFill>
                   <a:schemeClr val="accent2"/>
                 </a:solidFill>
               </a14:hiddenFill>
             </a:ext>
             <a:ext uri="{AF507438-7753-43e0-B8FC-AC1667EBCBE1}">
-              <a14:hiddenEffects xmlns="" xmlns:a14="http://schemas.microsoft.com/office/drawing/2010/main">
+              <a14:hiddenEffects xmlns:a14="http://schemas.microsoft.com/office/drawing/2010/main" xmlns="">
                 <a:effectLst>
                   <a:outerShdw blurRad="63500" dist="35921" dir="2700000" algn="ctr" rotWithShape="0">
                     <a:schemeClr val="bg2"/>
@@ -17330,14 +17177,14 @@
           </a:ln>
           <a:extLst>
             <a:ext uri="{909E8E84-426E-40dd-AFC4-6F175D3DCCD1}">
-              <a14:hiddenFill xmlns="" xmlns:a14="http://schemas.microsoft.com/office/drawing/2010/main">
+              <a14:hiddenFill xmlns:a14="http://schemas.microsoft.com/office/drawing/2010/main" xmlns="">
                 <a:solidFill>
                   <a:schemeClr val="accent2"/>
                 </a:solidFill>
               </a14:hiddenFill>
             </a:ext>
             <a:ext uri="{AF507438-7753-43e0-B8FC-AC1667EBCBE1}">
-              <a14:hiddenEffects xmlns="" xmlns:a14="http://schemas.microsoft.com/office/drawing/2010/main">
+              <a14:hiddenEffects xmlns:a14="http://schemas.microsoft.com/office/drawing/2010/main" xmlns="">
                 <a:effectLst>
                   <a:outerShdw blurRad="63500" dist="35921" dir="2700000" algn="ctr" rotWithShape="0">
                     <a:schemeClr val="bg2"/>
@@ -17430,14 +17277,14 @@
           </a:ln>
           <a:extLst>
             <a:ext uri="{909E8E84-426E-40dd-AFC4-6F175D3DCCD1}">
-              <a14:hiddenFill xmlns="" xmlns:a14="http://schemas.microsoft.com/office/drawing/2010/main">
+              <a14:hiddenFill xmlns:a14="http://schemas.microsoft.com/office/drawing/2010/main" xmlns="">
                 <a:solidFill>
                   <a:schemeClr val="accent2"/>
                 </a:solidFill>
               </a14:hiddenFill>
             </a:ext>
             <a:ext uri="{AF507438-7753-43e0-B8FC-AC1667EBCBE1}">
-              <a14:hiddenEffects xmlns="" xmlns:a14="http://schemas.microsoft.com/office/drawing/2010/main">
+              <a14:hiddenEffects xmlns:a14="http://schemas.microsoft.com/office/drawing/2010/main" xmlns="">
                 <a:effectLst>
                   <a:outerShdw blurRad="63500" dist="35921" dir="2700000" algn="ctr" rotWithShape="0">
                     <a:schemeClr val="bg2"/>
@@ -17530,14 +17377,14 @@
           </a:ln>
           <a:extLst>
             <a:ext uri="{909E8E84-426E-40dd-AFC4-6F175D3DCCD1}">
-              <a14:hiddenFill xmlns="" xmlns:a14="http://schemas.microsoft.com/office/drawing/2010/main">
+              <a14:hiddenFill xmlns:a14="http://schemas.microsoft.com/office/drawing/2010/main" xmlns="">
                 <a:solidFill>
                   <a:schemeClr val="accent2"/>
                 </a:solidFill>
               </a14:hiddenFill>
             </a:ext>
             <a:ext uri="{AF507438-7753-43e0-B8FC-AC1667EBCBE1}">
-              <a14:hiddenEffects xmlns="" xmlns:a14="http://schemas.microsoft.com/office/drawing/2010/main">
+              <a14:hiddenEffects xmlns:a14="http://schemas.microsoft.com/office/drawing/2010/main" xmlns="">
                 <a:effectLst>
                   <a:outerShdw blurRad="63500" dist="35921" dir="2700000" algn="ctr" rotWithShape="0">
                     <a:schemeClr val="bg2"/>
@@ -17630,14 +17477,14 @@
           </a:ln>
           <a:extLst>
             <a:ext uri="{909E8E84-426E-40dd-AFC4-6F175D3DCCD1}">
-              <a14:hiddenFill xmlns="" xmlns:a14="http://schemas.microsoft.com/office/drawing/2010/main">
+              <a14:hiddenFill xmlns:a14="http://schemas.microsoft.com/office/drawing/2010/main" xmlns="">
                 <a:solidFill>
                   <a:schemeClr val="accent2"/>
                 </a:solidFill>
               </a14:hiddenFill>
             </a:ext>
             <a:ext uri="{AF507438-7753-43e0-B8FC-AC1667EBCBE1}">
-              <a14:hiddenEffects xmlns="" xmlns:a14="http://schemas.microsoft.com/office/drawing/2010/main">
+              <a14:hiddenEffects xmlns:a14="http://schemas.microsoft.com/office/drawing/2010/main" xmlns="">
                 <a:effectLst>
                   <a:outerShdw blurRad="63500" dist="35921" dir="2700000" algn="ctr" rotWithShape="0">
                     <a:schemeClr val="bg2"/>
@@ -17730,14 +17577,14 @@
           </a:ln>
           <a:extLst>
             <a:ext uri="{909E8E84-426E-40dd-AFC4-6F175D3DCCD1}">
-              <a14:hiddenFill xmlns="" xmlns:a14="http://schemas.microsoft.com/office/drawing/2010/main">
+              <a14:hiddenFill xmlns:a14="http://schemas.microsoft.com/office/drawing/2010/main" xmlns="">
                 <a:solidFill>
                   <a:schemeClr val="accent2"/>
                 </a:solidFill>
               </a14:hiddenFill>
             </a:ext>
             <a:ext uri="{AF507438-7753-43e0-B8FC-AC1667EBCBE1}">
-              <a14:hiddenEffects xmlns="" xmlns:a14="http://schemas.microsoft.com/office/drawing/2010/main">
+              <a14:hiddenEffects xmlns:a14="http://schemas.microsoft.com/office/drawing/2010/main" xmlns="">
                 <a:effectLst>
                   <a:outerShdw blurRad="63500" dist="35921" dir="2700000" algn="ctr" rotWithShape="0">
                     <a:schemeClr val="bg2"/>
@@ -17830,14 +17677,14 @@
           </a:ln>
           <a:extLst>
             <a:ext uri="{909E8E84-426E-40dd-AFC4-6F175D3DCCD1}">
-              <a14:hiddenFill xmlns="" xmlns:a14="http://schemas.microsoft.com/office/drawing/2010/main">
+              <a14:hiddenFill xmlns:a14="http://schemas.microsoft.com/office/drawing/2010/main" xmlns="">
                 <a:solidFill>
                   <a:schemeClr val="accent2"/>
                 </a:solidFill>
               </a14:hiddenFill>
             </a:ext>
             <a:ext uri="{AF507438-7753-43e0-B8FC-AC1667EBCBE1}">
-              <a14:hiddenEffects xmlns="" xmlns:a14="http://schemas.microsoft.com/office/drawing/2010/main">
+              <a14:hiddenEffects xmlns:a14="http://schemas.microsoft.com/office/drawing/2010/main" xmlns="">
                 <a:effectLst>
                   <a:outerShdw blurRad="63500" dist="35921" dir="2700000" algn="ctr" rotWithShape="0">
                     <a:schemeClr val="bg2"/>
@@ -19004,181 +18851,28 @@
             <p:ph type="title"/>
           </p:nvPr>
         </p:nvSpPr>
-        <p:spPr/>
+        <p:spPr>
+          <a:xfrm>
+            <a:off x="572400" y="184706"/>
+            <a:ext cx="8063999" cy="369332"/>
+          </a:xfrm>
+        </p:spPr>
         <p:txBody>
-          <a:bodyPr/>
+          <a:bodyPr anchor="ctr">
+            <a:normAutofit/>
+          </a:bodyPr>
           <a:lstStyle/>
           <a:p>
+            <a:pPr>
+              <a:lnSpc>
+                <a:spcPct val="90000"/>
+              </a:lnSpc>
+            </a:pPr>
             <a:r>
-              <a:rPr lang="de-DE" dirty="0" err="1"/>
+              <a:rPr lang="de-DE" sz="2000" err="1"/>
               <a:t>History</a:t>
             </a:r>
-            <a:endParaRPr lang="de-DE" dirty="0"/>
-          </a:p>
-        </p:txBody>
-      </p:sp>
-      <p:sp>
-        <p:nvSpPr>
-          <p:cNvPr id="4" name="Inhaltsplatzhalter 3">
-            <a:extLst>
-              <a:ext uri="{FF2B5EF4-FFF2-40B4-BE49-F238E27FC236}">
-                <a16:creationId xmlns:a16="http://schemas.microsoft.com/office/drawing/2014/main" id="{6F5B3F25-0BFD-41F6-3876-18FC49FC1391}"/>
-              </a:ext>
-            </a:extLst>
-          </p:cNvPr>
-          <p:cNvSpPr>
-            <a:spLocks noGrp="1"/>
-          </p:cNvSpPr>
-          <p:nvPr>
-            <p:ph sz="quarter" idx="10"/>
-          </p:nvPr>
-        </p:nvSpPr>
-        <p:spPr>
-          <a:xfrm>
-            <a:off x="1286541" y="5836232"/>
-            <a:ext cx="7350546" cy="274637"/>
-          </a:xfrm>
-        </p:spPr>
-        <p:txBody>
-          <a:bodyPr/>
-          <a:lstStyle/>
-          <a:p>
-            <a:r>
-              <a:rPr lang="de-DE" dirty="0">
-                <a:solidFill>
-                  <a:srgbClr val="7D8591"/>
-                </a:solidFill>
-                <a:latin typeface="+mj-lt"/>
-              </a:rPr>
-              <a:t>9</a:t>
-            </a:r>
-            <a:r>
-              <a:rPr lang="de-DE" b="0" i="0" u="none" strike="noStrike" dirty="0">
-                <a:solidFill>
-                  <a:srgbClr val="7D8591"/>
-                </a:solidFill>
-                <a:effectLst/>
-                <a:latin typeface="+mj-lt"/>
-              </a:rPr>
-              <a:t>. </a:t>
-            </a:r>
-            <a:r>
-              <a:rPr lang="de-DE" b="0" i="0" u="none" strike="noStrike" dirty="0" err="1">
-                <a:solidFill>
-                  <a:srgbClr val="7D8591"/>
-                </a:solidFill>
-                <a:effectLst/>
-                <a:latin typeface="+mj-lt"/>
-              </a:rPr>
-              <a:t>Akidau</a:t>
-            </a:r>
-            <a:r>
-              <a:rPr lang="de-DE" b="0" i="0" u="none" strike="noStrike" dirty="0">
-                <a:solidFill>
-                  <a:srgbClr val="7D8591"/>
-                </a:solidFill>
-                <a:effectLst/>
-                <a:latin typeface="+mj-lt"/>
-              </a:rPr>
-              <a:t>, T., </a:t>
-            </a:r>
-            <a:r>
-              <a:rPr lang="de-DE" b="0" i="0" u="none" strike="noStrike" dirty="0" err="1">
-                <a:solidFill>
-                  <a:srgbClr val="7D8591"/>
-                </a:solidFill>
-                <a:effectLst/>
-                <a:latin typeface="+mj-lt"/>
-              </a:rPr>
-              <a:t>Chernyak</a:t>
-            </a:r>
-            <a:r>
-              <a:rPr lang="de-DE" b="0" i="0" u="none" strike="noStrike" dirty="0">
-                <a:solidFill>
-                  <a:srgbClr val="7D8591"/>
-                </a:solidFill>
-                <a:effectLst/>
-                <a:latin typeface="+mj-lt"/>
-              </a:rPr>
-              <a:t>, S., &amp; Lax, R. (2018)</a:t>
-            </a:r>
-          </a:p>
-          <a:p>
-            <a:r>
-              <a:rPr lang="de-DE" dirty="0">
-                <a:solidFill>
-                  <a:srgbClr val="7D8591"/>
-                </a:solidFill>
-                <a:latin typeface="+mj-lt"/>
-              </a:rPr>
-              <a:t>10. Online: Apache Software </a:t>
-            </a:r>
-            <a:r>
-              <a:rPr lang="de-DE" dirty="0" err="1">
-                <a:solidFill>
-                  <a:srgbClr val="7D8591"/>
-                </a:solidFill>
-                <a:latin typeface="+mj-lt"/>
-              </a:rPr>
-              <a:t>Foundation</a:t>
-            </a:r>
-            <a:r>
-              <a:rPr lang="de-DE" dirty="0">
-                <a:solidFill>
-                  <a:srgbClr val="7D8591"/>
-                </a:solidFill>
-                <a:latin typeface="+mj-lt"/>
-              </a:rPr>
-              <a:t> Projects https://projects.apache.org/</a:t>
-            </a:r>
-            <a:endParaRPr lang="de-DE" b="0" i="0" u="none" strike="noStrike" dirty="0">
-              <a:solidFill>
-                <a:srgbClr val="7D8591"/>
-              </a:solidFill>
-              <a:effectLst/>
-              <a:latin typeface="+mj-lt"/>
-            </a:endParaRPr>
-          </a:p>
-          <a:p>
-            <a:endParaRPr lang="de-DE" dirty="0">
-              <a:latin typeface="+mj-lt"/>
-            </a:endParaRPr>
-          </a:p>
-        </p:txBody>
-      </p:sp>
-      <p:sp>
-        <p:nvSpPr>
-          <p:cNvPr id="5" name="Textplatzhalter 4">
-            <a:extLst>
-              <a:ext uri="{FF2B5EF4-FFF2-40B4-BE49-F238E27FC236}">
-                <a16:creationId xmlns:a16="http://schemas.microsoft.com/office/drawing/2014/main" id="{2241C1AD-D826-1DF6-1B65-F554E0BC1A8A}"/>
-              </a:ext>
-            </a:extLst>
-          </p:cNvPr>
-          <p:cNvSpPr>
-            <a:spLocks noGrp="1"/>
-          </p:cNvSpPr>
-          <p:nvPr>
-            <p:ph type="body" sz="quarter" idx="12"/>
-          </p:nvPr>
-        </p:nvSpPr>
-        <p:spPr/>
-        <p:txBody>
-          <a:bodyPr/>
-          <a:lstStyle/>
-          <a:p>
-            <a:r>
-              <a:rPr lang="de-DE" dirty="0"/>
-              <a:t>Different </a:t>
-            </a:r>
-            <a:r>
-              <a:rPr lang="de-DE" dirty="0" err="1"/>
-              <a:t>Architectures</a:t>
-            </a:r>
-            <a:r>
-              <a:rPr lang="de-DE" dirty="0"/>
-              <a:t> and Frameworks</a:t>
-            </a:r>
+            <a:endParaRPr lang="de-DE" sz="2000"/>
           </a:p>
         </p:txBody>
       </p:sp>
@@ -19204,14 +18898,63 @@
         </p:blipFill>
         <p:spPr>
           <a:xfrm>
-            <a:off x="249980" y="1676254"/>
-            <a:ext cx="8308541" cy="3340258"/>
+            <a:off x="573088" y="2089983"/>
+            <a:ext cx="8063999" cy="3245759"/>
           </a:xfrm>
           <a:prstGeom prst="rect">
             <a:avLst/>
           </a:prstGeom>
+          <a:noFill/>
         </p:spPr>
       </p:pic>
+      <p:sp>
+        <p:nvSpPr>
+          <p:cNvPr id="5" name="Textplatzhalter 4">
+            <a:extLst>
+              <a:ext uri="{FF2B5EF4-FFF2-40B4-BE49-F238E27FC236}">
+                <a16:creationId xmlns:a16="http://schemas.microsoft.com/office/drawing/2014/main" id="{2241C1AD-D826-1DF6-1B65-F554E0BC1A8A}"/>
+              </a:ext>
+            </a:extLst>
+          </p:cNvPr>
+          <p:cNvSpPr>
+            <a:spLocks noGrp="1"/>
+          </p:cNvSpPr>
+          <p:nvPr>
+            <p:ph type="body" sz="quarter" idx="12"/>
+          </p:nvPr>
+        </p:nvSpPr>
+        <p:spPr>
+          <a:xfrm>
+            <a:off x="572400" y="583200"/>
+            <a:ext cx="8063999" cy="273600"/>
+          </a:xfrm>
+        </p:spPr>
+        <p:txBody>
+          <a:bodyPr anchor="ctr">
+            <a:normAutofit/>
+          </a:bodyPr>
+          <a:lstStyle/>
+          <a:p>
+            <a:pPr>
+              <a:lnSpc>
+                <a:spcPct val="90000"/>
+              </a:lnSpc>
+            </a:pPr>
+            <a:r>
+              <a:rPr lang="de-DE" sz="1300"/>
+              <a:t>Different </a:t>
+            </a:r>
+            <a:r>
+              <a:rPr lang="de-DE" sz="1300" err="1"/>
+              <a:t>Architectures</a:t>
+            </a:r>
+            <a:r>
+              <a:rPr lang="de-DE" sz="1300"/>
+              <a:t> and Frameworks</a:t>
+            </a:r>
+          </a:p>
+        </p:txBody>
+      </p:sp>
     </p:spTree>
     <p:extLst>
       <p:ext uri="{BB962C8B-B14F-4D97-AF65-F5344CB8AC3E}">
@@ -19261,145 +19004,26 @@
             <p:ph type="title"/>
           </p:nvPr>
         </p:nvSpPr>
-        <p:spPr/>
+        <p:spPr>
+          <a:xfrm>
+            <a:off x="572400" y="184706"/>
+            <a:ext cx="8063999" cy="369332"/>
+          </a:xfrm>
+        </p:spPr>
         <p:txBody>
-          <a:bodyPr/>
+          <a:bodyPr anchor="ctr">
+            <a:normAutofit/>
+          </a:bodyPr>
           <a:lstStyle/>
           <a:p>
+            <a:pPr>
+              <a:lnSpc>
+                <a:spcPct val="90000"/>
+              </a:lnSpc>
+            </a:pPr>
             <a:r>
-              <a:rPr lang="de-DE" dirty="0"/>
+              <a:rPr lang="de-DE" sz="2000"/>
               <a:t>Traditional Infrastructure</a:t>
-            </a:r>
-          </a:p>
-        </p:txBody>
-      </p:sp>
-      <p:sp>
-        <p:nvSpPr>
-          <p:cNvPr id="4" name="Inhaltsplatzhalter 3">
-            <a:extLst>
-              <a:ext uri="{FF2B5EF4-FFF2-40B4-BE49-F238E27FC236}">
-                <a16:creationId xmlns:a16="http://schemas.microsoft.com/office/drawing/2014/main" id="{6F5B3F25-0BFD-41F6-3876-18FC49FC1391}"/>
-              </a:ext>
-            </a:extLst>
-          </p:cNvPr>
-          <p:cNvSpPr>
-            <a:spLocks noGrp="1"/>
-          </p:cNvSpPr>
-          <p:nvPr>
-            <p:ph sz="quarter" idx="10"/>
-          </p:nvPr>
-        </p:nvSpPr>
-        <p:spPr/>
-        <p:txBody>
-          <a:bodyPr/>
-          <a:lstStyle/>
-          <a:p>
-            <a:r>
-              <a:rPr lang="en-US" dirty="0">
-                <a:latin typeface="+mj-lt"/>
-              </a:rPr>
-              <a:t>6. </a:t>
-            </a:r>
-            <a:r>
-              <a:rPr lang="en-US" dirty="0" err="1">
-                <a:latin typeface="+mj-lt"/>
-              </a:rPr>
-              <a:t>Kleppmann</a:t>
-            </a:r>
-            <a:r>
-              <a:rPr lang="en-US" dirty="0">
-                <a:latin typeface="+mj-lt"/>
-              </a:rPr>
-              <a:t>, M. (2017) </a:t>
-            </a:r>
-          </a:p>
-          <a:p>
-            <a:r>
-              <a:rPr lang="en-US" dirty="0">
-                <a:latin typeface="+mj-lt"/>
-              </a:rPr>
-              <a:t>7. </a:t>
-            </a:r>
-            <a:r>
-              <a:rPr lang="en-US" dirty="0" err="1">
-                <a:solidFill>
-                  <a:srgbClr val="7D8591"/>
-                </a:solidFill>
-                <a:latin typeface="+mj-lt"/>
-              </a:rPr>
-              <a:t>Hueske</a:t>
-            </a:r>
-            <a:r>
-              <a:rPr lang="en-US" dirty="0">
-                <a:solidFill>
-                  <a:srgbClr val="7D8591"/>
-                </a:solidFill>
-                <a:latin typeface="+mj-lt"/>
-              </a:rPr>
-              <a:t>, F., &amp; </a:t>
-            </a:r>
-            <a:r>
-              <a:rPr lang="en-US" dirty="0" err="1">
-                <a:solidFill>
-                  <a:srgbClr val="7D8591"/>
-                </a:solidFill>
-                <a:latin typeface="+mj-lt"/>
-              </a:rPr>
-              <a:t>Kalavri</a:t>
-            </a:r>
-            <a:r>
-              <a:rPr lang="en-US" dirty="0">
-                <a:solidFill>
-                  <a:srgbClr val="7D8591"/>
-                </a:solidFill>
-                <a:latin typeface="+mj-lt"/>
-              </a:rPr>
-              <a:t>, V. (2019)</a:t>
-            </a:r>
-          </a:p>
-          <a:p>
-            <a:endParaRPr lang="de-DE" dirty="0">
-              <a:latin typeface="+mj-lt"/>
-            </a:endParaRPr>
-          </a:p>
-        </p:txBody>
-      </p:sp>
-      <p:sp>
-        <p:nvSpPr>
-          <p:cNvPr id="5" name="Textplatzhalter 4">
-            <a:extLst>
-              <a:ext uri="{FF2B5EF4-FFF2-40B4-BE49-F238E27FC236}">
-                <a16:creationId xmlns:a16="http://schemas.microsoft.com/office/drawing/2014/main" id="{2241C1AD-D826-1DF6-1B65-F554E0BC1A8A}"/>
-              </a:ext>
-            </a:extLst>
-          </p:cNvPr>
-          <p:cNvSpPr>
-            <a:spLocks noGrp="1"/>
-          </p:cNvSpPr>
-          <p:nvPr>
-            <p:ph type="body" sz="quarter" idx="12"/>
-          </p:nvPr>
-        </p:nvSpPr>
-        <p:spPr/>
-        <p:txBody>
-          <a:bodyPr/>
-          <a:lstStyle/>
-          <a:p>
-            <a:r>
-              <a:rPr lang="de-DE" dirty="0" err="1"/>
-              <a:t>Introduction</a:t>
-            </a:r>
-            <a:r>
-              <a:rPr lang="de-DE" dirty="0"/>
-              <a:t> </a:t>
-            </a:r>
-            <a:r>
-              <a:rPr lang="de-DE" dirty="0" err="1"/>
-              <a:t>to</a:t>
-            </a:r>
-            <a:r>
-              <a:rPr lang="de-DE" dirty="0"/>
-              <a:t> OLTP and OLAP</a:t>
             </a:r>
           </a:p>
         </p:txBody>
@@ -19426,14 +19050,67 @@
         </p:blipFill>
         <p:spPr>
           <a:xfrm>
-            <a:off x="2185971" y="1305709"/>
-            <a:ext cx="4772058" cy="4246582"/>
+            <a:off x="2061052" y="1448672"/>
+            <a:ext cx="5088070" cy="4528382"/>
           </a:xfrm>
           <a:prstGeom prst="rect">
             <a:avLst/>
           </a:prstGeom>
+          <a:noFill/>
         </p:spPr>
       </p:pic>
+      <p:sp>
+        <p:nvSpPr>
+          <p:cNvPr id="5" name="Textplatzhalter 4">
+            <a:extLst>
+              <a:ext uri="{FF2B5EF4-FFF2-40B4-BE49-F238E27FC236}">
+                <a16:creationId xmlns:a16="http://schemas.microsoft.com/office/drawing/2014/main" id="{2241C1AD-D826-1DF6-1B65-F554E0BC1A8A}"/>
+              </a:ext>
+            </a:extLst>
+          </p:cNvPr>
+          <p:cNvSpPr>
+            <a:spLocks noGrp="1"/>
+          </p:cNvSpPr>
+          <p:nvPr>
+            <p:ph type="body" sz="quarter" idx="12"/>
+          </p:nvPr>
+        </p:nvSpPr>
+        <p:spPr>
+          <a:xfrm>
+            <a:off x="572400" y="583200"/>
+            <a:ext cx="8063999" cy="273600"/>
+          </a:xfrm>
+        </p:spPr>
+        <p:txBody>
+          <a:bodyPr anchor="ctr">
+            <a:normAutofit/>
+          </a:bodyPr>
+          <a:lstStyle/>
+          <a:p>
+            <a:pPr>
+              <a:lnSpc>
+                <a:spcPct val="90000"/>
+              </a:lnSpc>
+            </a:pPr>
+            <a:r>
+              <a:rPr lang="de-DE" sz="1300" err="1"/>
+              <a:t>Introduction</a:t>
+            </a:r>
+            <a:r>
+              <a:rPr lang="de-DE" sz="1300"/>
+              <a:t> </a:t>
+            </a:r>
+            <a:r>
+              <a:rPr lang="de-DE" sz="1300" err="1"/>
+              <a:t>to</a:t>
+            </a:r>
+            <a:r>
+              <a:rPr lang="de-DE" sz="1300"/>
+              <a:t> OLTP and OLAP</a:t>
+            </a:r>
+          </a:p>
+        </p:txBody>
+      </p:sp>
     </p:spTree>
     <p:extLst>
       <p:ext uri="{BB962C8B-B14F-4D97-AF65-F5344CB8AC3E}">
@@ -19483,115 +19160,27 @@
             <p:ph type="title"/>
           </p:nvPr>
         </p:nvSpPr>
-        <p:spPr/>
+        <p:spPr>
+          <a:xfrm>
+            <a:off x="572400" y="184706"/>
+            <a:ext cx="8063999" cy="369332"/>
+          </a:xfrm>
+        </p:spPr>
         <p:txBody>
-          <a:bodyPr/>
+          <a:bodyPr anchor="ctr">
+            <a:normAutofit/>
+          </a:bodyPr>
           <a:lstStyle/>
           <a:p>
+            <a:pPr>
+              <a:lnSpc>
+                <a:spcPct val="90000"/>
+              </a:lnSpc>
+            </a:pPr>
             <a:r>
-              <a:rPr lang="de-DE" dirty="0"/>
+              <a:rPr lang="de-DE" sz="2000"/>
               <a:t>Lambda Architecture</a:t>
             </a:r>
-          </a:p>
-        </p:txBody>
-      </p:sp>
-      <p:sp>
-        <p:nvSpPr>
-          <p:cNvPr id="5" name="Textplatzhalter 4">
-            <a:extLst>
-              <a:ext uri="{FF2B5EF4-FFF2-40B4-BE49-F238E27FC236}">
-                <a16:creationId xmlns:a16="http://schemas.microsoft.com/office/drawing/2014/main" id="{2CC840F3-B6A1-CF2E-1008-FB7F9B8190F7}"/>
-              </a:ext>
-            </a:extLst>
-          </p:cNvPr>
-          <p:cNvSpPr>
-            <a:spLocks noGrp="1"/>
-          </p:cNvSpPr>
-          <p:nvPr>
-            <p:ph type="body" sz="quarter" idx="12"/>
-          </p:nvPr>
-        </p:nvSpPr>
-        <p:spPr/>
-        <p:txBody>
-          <a:bodyPr/>
-          <a:lstStyle/>
-          <a:p>
-            <a:r>
-              <a:rPr lang="de-DE" dirty="0"/>
-              <a:t>Layout</a:t>
-            </a:r>
-          </a:p>
-        </p:txBody>
-      </p:sp>
-      <p:sp>
-        <p:nvSpPr>
-          <p:cNvPr id="13" name="Inhaltsplatzhalter 12">
-            <a:extLst>
-              <a:ext uri="{FF2B5EF4-FFF2-40B4-BE49-F238E27FC236}">
-                <a16:creationId xmlns:a16="http://schemas.microsoft.com/office/drawing/2014/main" id="{3675987C-4F66-C465-DF77-15CE17022677}"/>
-              </a:ext>
-            </a:extLst>
-          </p:cNvPr>
-          <p:cNvSpPr>
-            <a:spLocks noGrp="1"/>
-          </p:cNvSpPr>
-          <p:nvPr>
-            <p:ph sz="quarter" idx="10"/>
-          </p:nvPr>
-        </p:nvSpPr>
-        <p:spPr/>
-        <p:txBody>
-          <a:bodyPr/>
-          <a:lstStyle/>
-          <a:p>
-            <a:r>
-              <a:rPr lang="de-DE" dirty="0">
-                <a:latin typeface="+mj-lt"/>
-              </a:rPr>
-              <a:t>8. </a:t>
-            </a:r>
-            <a:r>
-              <a:rPr lang="en-US" sz="900" dirty="0" err="1">
-                <a:latin typeface="+mj-lt"/>
-              </a:rPr>
-              <a:t>Hueske</a:t>
-            </a:r>
-            <a:r>
-              <a:rPr lang="en-US" sz="900" dirty="0">
-                <a:latin typeface="+mj-lt"/>
-              </a:rPr>
-              <a:t>, F., &amp; </a:t>
-            </a:r>
-            <a:r>
-              <a:rPr lang="en-US" sz="900" dirty="0" err="1">
-                <a:latin typeface="+mj-lt"/>
-              </a:rPr>
-              <a:t>Kalavri</a:t>
-            </a:r>
-            <a:r>
-              <a:rPr lang="en-US" sz="900" dirty="0">
-                <a:latin typeface="+mj-lt"/>
-              </a:rPr>
-              <a:t>, V. (2019)</a:t>
-            </a:r>
-            <a:endParaRPr lang="de-DE" sz="900" dirty="0">
-              <a:latin typeface="+mj-lt"/>
-            </a:endParaRPr>
-          </a:p>
-          <a:p>
-            <a:r>
-              <a:rPr lang="de-DE" sz="900" b="0" i="0" u="none" strike="noStrike" dirty="0">
-                <a:solidFill>
-                  <a:srgbClr val="7D8591"/>
-                </a:solidFill>
-                <a:effectLst/>
-                <a:latin typeface="+mj-lt"/>
-              </a:rPr>
-              <a:t>11. Marz, N. (2015). </a:t>
-            </a:r>
-            <a:endParaRPr lang="de-DE" dirty="0">
-              <a:latin typeface="+mj-lt"/>
-            </a:endParaRPr>
           </a:p>
         </p:txBody>
       </p:sp>
@@ -19617,14 +19206,55 @@
         </p:blipFill>
         <p:spPr>
           <a:xfrm>
-            <a:off x="757000" y="1809000"/>
-            <a:ext cx="7630000" cy="3240000"/>
+            <a:off x="573088" y="1999263"/>
+            <a:ext cx="8063999" cy="3427199"/>
           </a:xfrm>
           <a:prstGeom prst="rect">
             <a:avLst/>
           </a:prstGeom>
+          <a:noFill/>
         </p:spPr>
       </p:pic>
+      <p:sp>
+        <p:nvSpPr>
+          <p:cNvPr id="5" name="Textplatzhalter 4">
+            <a:extLst>
+              <a:ext uri="{FF2B5EF4-FFF2-40B4-BE49-F238E27FC236}">
+                <a16:creationId xmlns:a16="http://schemas.microsoft.com/office/drawing/2014/main" id="{2CC840F3-B6A1-CF2E-1008-FB7F9B8190F7}"/>
+              </a:ext>
+            </a:extLst>
+          </p:cNvPr>
+          <p:cNvSpPr>
+            <a:spLocks noGrp="1"/>
+          </p:cNvSpPr>
+          <p:nvPr>
+            <p:ph type="body" sz="quarter" idx="12"/>
+          </p:nvPr>
+        </p:nvSpPr>
+        <p:spPr>
+          <a:xfrm>
+            <a:off x="572400" y="583200"/>
+            <a:ext cx="8063999" cy="273600"/>
+          </a:xfrm>
+        </p:spPr>
+        <p:txBody>
+          <a:bodyPr anchor="ctr">
+            <a:normAutofit/>
+          </a:bodyPr>
+          <a:lstStyle/>
+          <a:p>
+            <a:pPr>
+              <a:lnSpc>
+                <a:spcPct val="90000"/>
+              </a:lnSpc>
+            </a:pPr>
+            <a:r>
+              <a:rPr lang="de-DE" sz="1300"/>
+              <a:t>Layout</a:t>
+            </a:r>
+          </a:p>
+        </p:txBody>
+      </p:sp>
     </p:spTree>
     <p:extLst>
       <p:ext uri="{BB962C8B-B14F-4D97-AF65-F5344CB8AC3E}">
@@ -19794,101 +19424,27 @@
             <p:ph type="title"/>
           </p:nvPr>
         </p:nvSpPr>
-        <p:spPr/>
+        <p:spPr>
+          <a:xfrm>
+            <a:off x="572400" y="184706"/>
+            <a:ext cx="8063999" cy="369332"/>
+          </a:xfrm>
+        </p:spPr>
         <p:txBody>
-          <a:bodyPr/>
+          <a:bodyPr anchor="ctr">
+            <a:normAutofit/>
+          </a:bodyPr>
           <a:lstStyle/>
           <a:p>
+            <a:pPr>
+              <a:lnSpc>
+                <a:spcPct val="90000"/>
+              </a:lnSpc>
+            </a:pPr>
             <a:r>
-              <a:rPr lang="de-DE" dirty="0"/>
+              <a:rPr lang="de-DE" sz="2000"/>
               <a:t>Hadoop</a:t>
             </a:r>
-          </a:p>
-        </p:txBody>
-      </p:sp>
-      <p:sp>
-        <p:nvSpPr>
-          <p:cNvPr id="5" name="Textplatzhalter 4">
-            <a:extLst>
-              <a:ext uri="{FF2B5EF4-FFF2-40B4-BE49-F238E27FC236}">
-                <a16:creationId xmlns:a16="http://schemas.microsoft.com/office/drawing/2014/main" id="{2CC840F3-B6A1-CF2E-1008-FB7F9B8190F7}"/>
-              </a:ext>
-            </a:extLst>
-          </p:cNvPr>
-          <p:cNvSpPr>
-            <a:spLocks noGrp="1"/>
-          </p:cNvSpPr>
-          <p:nvPr>
-            <p:ph type="body" sz="quarter" idx="12"/>
-          </p:nvPr>
-        </p:nvSpPr>
-        <p:spPr/>
-        <p:txBody>
-          <a:bodyPr/>
-          <a:lstStyle/>
-          <a:p>
-            <a:r>
-              <a:rPr lang="de-DE" dirty="0" err="1"/>
-              <a:t>Overview</a:t>
-            </a:r>
-            <a:endParaRPr lang="de-DE" dirty="0"/>
-          </a:p>
-        </p:txBody>
-      </p:sp>
-      <p:sp>
-        <p:nvSpPr>
-          <p:cNvPr id="13" name="Inhaltsplatzhalter 12">
-            <a:extLst>
-              <a:ext uri="{FF2B5EF4-FFF2-40B4-BE49-F238E27FC236}">
-                <a16:creationId xmlns:a16="http://schemas.microsoft.com/office/drawing/2014/main" id="{3675987C-4F66-C465-DF77-15CE17022677}"/>
-              </a:ext>
-            </a:extLst>
-          </p:cNvPr>
-          <p:cNvSpPr>
-            <a:spLocks noGrp="1"/>
-          </p:cNvSpPr>
-          <p:nvPr>
-            <p:ph sz="quarter" idx="10"/>
-          </p:nvPr>
-        </p:nvSpPr>
-        <p:spPr/>
-        <p:txBody>
-          <a:bodyPr/>
-          <a:lstStyle/>
-          <a:p>
-            <a:r>
-              <a:rPr lang="en-US" sz="900" b="0" i="0" u="none" strike="noStrike" dirty="0">
-                <a:solidFill>
-                  <a:srgbClr val="7D8591"/>
-                </a:solidFill>
-                <a:effectLst/>
-                <a:latin typeface="+mj-lt"/>
-              </a:rPr>
-              <a:t>12. </a:t>
-            </a:r>
-            <a:r>
-              <a:rPr lang="en-US" sz="900" b="0" i="0" u="none" strike="noStrike" dirty="0" err="1">
-                <a:solidFill>
-                  <a:srgbClr val="7D8591"/>
-                </a:solidFill>
-                <a:effectLst/>
-                <a:latin typeface="+mj-lt"/>
-              </a:rPr>
-              <a:t>Achari</a:t>
-            </a:r>
-            <a:r>
-              <a:rPr lang="en-US" sz="900" b="0" i="0" u="none" strike="noStrike" dirty="0">
-                <a:solidFill>
-                  <a:srgbClr val="7D8591"/>
-                </a:solidFill>
-                <a:effectLst/>
-                <a:latin typeface="+mj-lt"/>
-              </a:rPr>
-              <a:t>, S. (2015)</a:t>
-            </a:r>
-            <a:endParaRPr lang="de-DE" dirty="0">
-              <a:latin typeface="+mj-lt"/>
-            </a:endParaRPr>
           </a:p>
         </p:txBody>
       </p:sp>
@@ -19914,14 +19470,56 @@
         </p:blipFill>
         <p:spPr>
           <a:xfrm>
-            <a:off x="2333625" y="2281237"/>
-            <a:ext cx="4476750" cy="2295525"/>
+            <a:off x="967772" y="1801911"/>
+            <a:ext cx="7208456" cy="3694334"/>
           </a:xfrm>
           <a:prstGeom prst="rect">
             <a:avLst/>
           </a:prstGeom>
+          <a:noFill/>
         </p:spPr>
       </p:pic>
+      <p:sp>
+        <p:nvSpPr>
+          <p:cNvPr id="5" name="Textplatzhalter 4">
+            <a:extLst>
+              <a:ext uri="{FF2B5EF4-FFF2-40B4-BE49-F238E27FC236}">
+                <a16:creationId xmlns:a16="http://schemas.microsoft.com/office/drawing/2014/main" id="{2CC840F3-B6A1-CF2E-1008-FB7F9B8190F7}"/>
+              </a:ext>
+            </a:extLst>
+          </p:cNvPr>
+          <p:cNvSpPr>
+            <a:spLocks noGrp="1"/>
+          </p:cNvSpPr>
+          <p:nvPr>
+            <p:ph type="body" sz="quarter" idx="12"/>
+          </p:nvPr>
+        </p:nvSpPr>
+        <p:spPr>
+          <a:xfrm>
+            <a:off x="572400" y="583200"/>
+            <a:ext cx="8063999" cy="273600"/>
+          </a:xfrm>
+        </p:spPr>
+        <p:txBody>
+          <a:bodyPr anchor="ctr">
+            <a:normAutofit/>
+          </a:bodyPr>
+          <a:lstStyle/>
+          <a:p>
+            <a:pPr>
+              <a:lnSpc>
+                <a:spcPct val="90000"/>
+              </a:lnSpc>
+            </a:pPr>
+            <a:r>
+              <a:rPr lang="de-DE" sz="1300" err="1"/>
+              <a:t>Overview</a:t>
+            </a:r>
+            <a:endParaRPr lang="de-DE" sz="1300"/>
+          </a:p>
+        </p:txBody>
+      </p:sp>
     </p:spTree>
     <p:extLst>
       <p:ext uri="{BB962C8B-B14F-4D97-AF65-F5344CB8AC3E}">
@@ -19971,100 +19569,27 @@
             <p:ph type="title"/>
           </p:nvPr>
         </p:nvSpPr>
-        <p:spPr/>
+        <p:spPr>
+          <a:xfrm>
+            <a:off x="572400" y="184706"/>
+            <a:ext cx="8063999" cy="369332"/>
+          </a:xfrm>
+        </p:spPr>
         <p:txBody>
-          <a:bodyPr/>
+          <a:bodyPr anchor="ctr">
+            <a:normAutofit/>
+          </a:bodyPr>
           <a:lstStyle/>
           <a:p>
+            <a:pPr>
+              <a:lnSpc>
+                <a:spcPct val="90000"/>
+              </a:lnSpc>
+            </a:pPr>
             <a:r>
-              <a:rPr lang="de-DE" dirty="0"/>
+              <a:rPr lang="de-DE" sz="2000"/>
               <a:t>Hadoop</a:t>
             </a:r>
-          </a:p>
-        </p:txBody>
-      </p:sp>
-      <p:sp>
-        <p:nvSpPr>
-          <p:cNvPr id="5" name="Textplatzhalter 4">
-            <a:extLst>
-              <a:ext uri="{FF2B5EF4-FFF2-40B4-BE49-F238E27FC236}">
-                <a16:creationId xmlns:a16="http://schemas.microsoft.com/office/drawing/2014/main" id="{2CC840F3-B6A1-CF2E-1008-FB7F9B8190F7}"/>
-              </a:ext>
-            </a:extLst>
-          </p:cNvPr>
-          <p:cNvSpPr>
-            <a:spLocks noGrp="1"/>
-          </p:cNvSpPr>
-          <p:nvPr>
-            <p:ph type="body" sz="quarter" idx="12"/>
-          </p:nvPr>
-        </p:nvSpPr>
-        <p:spPr/>
-        <p:txBody>
-          <a:bodyPr/>
-          <a:lstStyle/>
-          <a:p>
-            <a:r>
-              <a:rPr lang="de-DE" dirty="0"/>
-              <a:t>HDFS</a:t>
-            </a:r>
-          </a:p>
-        </p:txBody>
-      </p:sp>
-      <p:sp>
-        <p:nvSpPr>
-          <p:cNvPr id="13" name="Inhaltsplatzhalter 12">
-            <a:extLst>
-              <a:ext uri="{FF2B5EF4-FFF2-40B4-BE49-F238E27FC236}">
-                <a16:creationId xmlns:a16="http://schemas.microsoft.com/office/drawing/2014/main" id="{3675987C-4F66-C465-DF77-15CE17022677}"/>
-              </a:ext>
-            </a:extLst>
-          </p:cNvPr>
-          <p:cNvSpPr>
-            <a:spLocks noGrp="1"/>
-          </p:cNvSpPr>
-          <p:nvPr>
-            <p:ph sz="quarter" idx="10"/>
-          </p:nvPr>
-        </p:nvSpPr>
-        <p:spPr/>
-        <p:txBody>
-          <a:bodyPr/>
-          <a:lstStyle/>
-          <a:p>
-            <a:r>
-              <a:rPr lang="en-US" sz="900" b="0" i="0" u="none" strike="noStrike" dirty="0">
-                <a:solidFill>
-                  <a:srgbClr val="7D8591"/>
-                </a:solidFill>
-                <a:effectLst/>
-                <a:latin typeface="+mj-lt"/>
-              </a:rPr>
-              <a:t>12. </a:t>
-            </a:r>
-            <a:r>
-              <a:rPr lang="en-US" sz="900" b="0" i="0" u="none" strike="noStrike" dirty="0" err="1">
-                <a:solidFill>
-                  <a:srgbClr val="7D8591"/>
-                </a:solidFill>
-                <a:effectLst/>
-                <a:latin typeface="+mj-lt"/>
-              </a:rPr>
-              <a:t>Achari</a:t>
-            </a:r>
-            <a:r>
-              <a:rPr lang="en-US" sz="900" b="0" i="0" u="none" strike="noStrike" dirty="0">
-                <a:solidFill>
-                  <a:srgbClr val="7D8591"/>
-                </a:solidFill>
-                <a:effectLst/>
-                <a:latin typeface="+mj-lt"/>
-              </a:rPr>
-              <a:t>, S. (2015)</a:t>
-            </a:r>
-            <a:endParaRPr lang="de-DE" dirty="0">
-              <a:latin typeface="+mj-lt"/>
-            </a:endParaRPr>
           </a:p>
         </p:txBody>
       </p:sp>
@@ -20090,14 +19615,55 @@
         </p:blipFill>
         <p:spPr>
           <a:xfrm>
-            <a:off x="2170989" y="1238250"/>
-            <a:ext cx="5581650" cy="4381500"/>
+            <a:off x="1720767" y="1448672"/>
+            <a:ext cx="5768640" cy="4528382"/>
           </a:xfrm>
           <a:prstGeom prst="rect">
             <a:avLst/>
           </a:prstGeom>
+          <a:noFill/>
         </p:spPr>
       </p:pic>
+      <p:sp>
+        <p:nvSpPr>
+          <p:cNvPr id="5" name="Textplatzhalter 4">
+            <a:extLst>
+              <a:ext uri="{FF2B5EF4-FFF2-40B4-BE49-F238E27FC236}">
+                <a16:creationId xmlns:a16="http://schemas.microsoft.com/office/drawing/2014/main" id="{2CC840F3-B6A1-CF2E-1008-FB7F9B8190F7}"/>
+              </a:ext>
+            </a:extLst>
+          </p:cNvPr>
+          <p:cNvSpPr>
+            <a:spLocks noGrp="1"/>
+          </p:cNvSpPr>
+          <p:nvPr>
+            <p:ph type="body" sz="quarter" idx="12"/>
+          </p:nvPr>
+        </p:nvSpPr>
+        <p:spPr>
+          <a:xfrm>
+            <a:off x="572400" y="583200"/>
+            <a:ext cx="8063999" cy="273600"/>
+          </a:xfrm>
+        </p:spPr>
+        <p:txBody>
+          <a:bodyPr anchor="ctr">
+            <a:normAutofit/>
+          </a:bodyPr>
+          <a:lstStyle/>
+          <a:p>
+            <a:pPr>
+              <a:lnSpc>
+                <a:spcPct val="90000"/>
+              </a:lnSpc>
+            </a:pPr>
+            <a:r>
+              <a:rPr lang="de-DE" sz="1300"/>
+              <a:t>HDFS</a:t>
+            </a:r>
+          </a:p>
+        </p:txBody>
+      </p:sp>
     </p:spTree>
     <p:extLst>
       <p:ext uri="{BB962C8B-B14F-4D97-AF65-F5344CB8AC3E}">
@@ -20147,42 +19713,26 @@
             <p:ph type="title"/>
           </p:nvPr>
         </p:nvSpPr>
-        <p:spPr/>
+        <p:spPr>
+          <a:xfrm>
+            <a:off x="572400" y="184706"/>
+            <a:ext cx="8063999" cy="369332"/>
+          </a:xfrm>
+        </p:spPr>
         <p:txBody>
-          <a:bodyPr/>
+          <a:bodyPr anchor="ctr">
+            <a:normAutofit/>
+          </a:bodyPr>
           <a:lstStyle/>
           <a:p>
+            <a:pPr>
+              <a:lnSpc>
+                <a:spcPct val="90000"/>
+              </a:lnSpc>
+            </a:pPr>
             <a:r>
-              <a:rPr lang="de-DE" dirty="0"/>
+              <a:rPr lang="de-DE" sz="2000"/>
               <a:t>Hadoop</a:t>
-            </a:r>
-          </a:p>
-        </p:txBody>
-      </p:sp>
-      <p:sp>
-        <p:nvSpPr>
-          <p:cNvPr id="5" name="Textplatzhalter 4">
-            <a:extLst>
-              <a:ext uri="{FF2B5EF4-FFF2-40B4-BE49-F238E27FC236}">
-                <a16:creationId xmlns:a16="http://schemas.microsoft.com/office/drawing/2014/main" id="{2CC840F3-B6A1-CF2E-1008-FB7F9B8190F7}"/>
-              </a:ext>
-            </a:extLst>
-          </p:cNvPr>
-          <p:cNvSpPr>
-            <a:spLocks noGrp="1"/>
-          </p:cNvSpPr>
-          <p:nvPr>
-            <p:ph type="body" sz="quarter" idx="12"/>
-          </p:nvPr>
-        </p:nvSpPr>
-        <p:spPr/>
-        <p:txBody>
-          <a:bodyPr/>
-          <a:lstStyle/>
-          <a:p>
-            <a:r>
-              <a:rPr lang="de-DE" dirty="0"/>
-              <a:t>MapReduce</a:t>
             </a:r>
           </a:p>
         </p:txBody>
@@ -20209,20 +19759,21 @@
         </p:blipFill>
         <p:spPr>
           <a:xfrm>
-            <a:off x="2573845" y="1234939"/>
-            <a:ext cx="3868293" cy="4205364"/>
+            <a:off x="2522032" y="1448672"/>
+            <a:ext cx="4166110" cy="4528382"/>
           </a:xfrm>
           <a:prstGeom prst="rect">
             <a:avLst/>
           </a:prstGeom>
+          <a:noFill/>
         </p:spPr>
       </p:pic>
       <p:sp>
         <p:nvSpPr>
-          <p:cNvPr id="7" name="Inhaltsplatzhalter 12">
+          <p:cNvPr id="5" name="Textplatzhalter 4">
             <a:extLst>
               <a:ext uri="{FF2B5EF4-FFF2-40B4-BE49-F238E27FC236}">
-                <a16:creationId xmlns:a16="http://schemas.microsoft.com/office/drawing/2014/main" id="{FAFC4B27-EE28-1443-DBEA-BED112E2A468}"/>
+                <a16:creationId xmlns:a16="http://schemas.microsoft.com/office/drawing/2014/main" id="{2CC840F3-B6A1-CF2E-1008-FB7F9B8190F7}"/>
               </a:ext>
             </a:extLst>
           </p:cNvPr>
@@ -20230,52 +19781,30 @@
             <a:spLocks noGrp="1"/>
           </p:cNvSpPr>
           <p:nvPr>
-            <p:ph sz="quarter" idx="10"/>
+            <p:ph type="body" sz="quarter" idx="12"/>
           </p:nvPr>
         </p:nvSpPr>
         <p:spPr>
           <a:xfrm>
-            <a:off x="1285875" y="5818188"/>
-            <a:ext cx="7351713" cy="292100"/>
+            <a:off x="572400" y="583200"/>
+            <a:ext cx="8063999" cy="273600"/>
           </a:xfrm>
         </p:spPr>
         <p:txBody>
-          <a:bodyPr/>
+          <a:bodyPr anchor="ctr">
+            <a:normAutofit/>
+          </a:bodyPr>
           <a:lstStyle/>
           <a:p>
+            <a:pPr>
+              <a:lnSpc>
+                <a:spcPct val="90000"/>
+              </a:lnSpc>
+            </a:pPr>
             <a:r>
-              <a:rPr lang="en-US" sz="900" b="0" i="0" u="none" strike="noStrike" dirty="0">
-                <a:solidFill>
-                  <a:srgbClr val="7D8591"/>
-                </a:solidFill>
-                <a:effectLst/>
-                <a:latin typeface="+mj-lt"/>
-              </a:rPr>
-              <a:t>12. </a:t>
+              <a:rPr lang="de-DE" sz="1300"/>
+              <a:t>MapReduce</a:t>
             </a:r>
-            <a:r>
-              <a:rPr lang="en-US" sz="900" b="0" i="0" u="none" strike="noStrike" dirty="0" err="1">
-                <a:solidFill>
-                  <a:srgbClr val="7D8591"/>
-                </a:solidFill>
-                <a:effectLst/>
-                <a:latin typeface="+mj-lt"/>
-              </a:rPr>
-              <a:t>Achari</a:t>
-            </a:r>
-            <a:r>
-              <a:rPr lang="en-US" sz="900" b="0" i="0" u="none" strike="noStrike" dirty="0">
-                <a:solidFill>
-                  <a:srgbClr val="7D8591"/>
-                </a:solidFill>
-                <a:effectLst/>
-                <a:latin typeface="+mj-lt"/>
-              </a:rPr>
-              <a:t>, S. (2015)</a:t>
-            </a:r>
-            <a:endParaRPr lang="de-DE" dirty="0">
-              <a:latin typeface="+mj-lt"/>
-            </a:endParaRPr>
           </a:p>
         </p:txBody>
       </p:sp>
@@ -20569,14 +20098,14 @@
         <a:effectLst/>
         <a:extLst>
           <a:ext uri="{909E8E84-426E-40dd-AFC4-6F175D3DCCD1}">
-            <a14:hiddenFill xmlns:a14="http://schemas.microsoft.com/office/drawing/2010/main" xmlns="">
+            <a14:hiddenFill xmlns="" xmlns:a14="http://schemas.microsoft.com/office/drawing/2010/main">
               <a:solidFill>
                 <a:schemeClr val="accent2"/>
               </a:solidFill>
             </a14:hiddenFill>
           </a:ext>
           <a:ext uri="{AF507438-7753-43e0-B8FC-AC1667EBCBE1}">
-            <a14:hiddenEffects xmlns:a14="http://schemas.microsoft.com/office/drawing/2010/main" xmlns="">
+            <a14:hiddenEffects xmlns="" xmlns:a14="http://schemas.microsoft.com/office/drawing/2010/main">
               <a:effectLst>
                 <a:outerShdw blurRad="63500" dist="35921" dir="2700000" algn="ctr" rotWithShape="0">
                   <a:schemeClr val="bg2"/>
@@ -20649,14 +20178,14 @@
         <a:effectLst/>
         <a:extLst>
           <a:ext uri="{909E8E84-426E-40dd-AFC4-6F175D3DCCD1}">
-            <a14:hiddenFill xmlns:a14="http://schemas.microsoft.com/office/drawing/2010/main" xmlns="">
+            <a14:hiddenFill xmlns="" xmlns:a14="http://schemas.microsoft.com/office/drawing/2010/main">
               <a:solidFill>
                 <a:schemeClr val="accent2"/>
               </a:solidFill>
             </a14:hiddenFill>
           </a:ext>
           <a:ext uri="{AF507438-7753-43e0-B8FC-AC1667EBCBE1}">
-            <a14:hiddenEffects xmlns:a14="http://schemas.microsoft.com/office/drawing/2010/main" xmlns="">
+            <a14:hiddenEffects xmlns="" xmlns:a14="http://schemas.microsoft.com/office/drawing/2010/main">
               <a:effectLst>
                 <a:outerShdw blurRad="63500" dist="35921" dir="2700000" algn="ctr" rotWithShape="0">
                   <a:schemeClr val="bg2"/>

</xml_diff>

<commit_message>
add post-insights after provided twitter migration lambda -> kappa
</commit_message>
<xml_diff>
--- a/content/presentation/Presentation-Stream-Processing-Merged.pptx
+++ b/content/presentation/Presentation-Stream-Processing-Merged.pptx
@@ -5,10 +5,10 @@
     <p:sldMasterId id="2147483648" r:id="rId1"/>
   </p:sldMasterIdLst>
   <p:notesMasterIdLst>
-    <p:notesMasterId r:id="rId20"/>
+    <p:notesMasterId r:id="rId22"/>
   </p:notesMasterIdLst>
   <p:handoutMasterIdLst>
-    <p:handoutMasterId r:id="rId21"/>
+    <p:handoutMasterId r:id="rId23"/>
   </p:handoutMasterIdLst>
   <p:sldIdLst>
     <p:sldId id="1944" r:id="rId2"/>
@@ -26,9 +26,11 @@
     <p:sldId id="1949" r:id="rId14"/>
     <p:sldId id="1950" r:id="rId15"/>
     <p:sldId id="1972" r:id="rId16"/>
-    <p:sldId id="1948" r:id="rId17"/>
-    <p:sldId id="1975" r:id="rId18"/>
-    <p:sldId id="1945" r:id="rId19"/>
+    <p:sldId id="1977" r:id="rId17"/>
+    <p:sldId id="1948" r:id="rId18"/>
+    <p:sldId id="1978" r:id="rId19"/>
+    <p:sldId id="1975" r:id="rId20"/>
+    <p:sldId id="1945" r:id="rId21"/>
   </p:sldIdLst>
   <p:sldSz cx="9144000" cy="6858000" type="screen4x3"/>
   <p:notesSz cx="6858000" cy="9661525"/>
@@ -38,7 +40,7 @@
     </p:custShow>
   </p:custShowLst>
   <p:custDataLst>
-    <p:tags r:id="rId22"/>
+    <p:tags r:id="rId24"/>
   </p:custDataLst>
   <p:defaultTextStyle>
     <a:defPPr>
@@ -6352,10 +6354,10 @@
               </a:lnSpc>
             </a:pPr>
             <a:r>
-              <a:rPr lang="en-US" sz="2000"/>
+              <a:rPr lang="en-US" sz="2000" dirty="0"/>
               <a:t>Real Case Study: Twitter</a:t>
             </a:r>
-            <a:endParaRPr lang="de-DE" sz="2000"/>
+            <a:endParaRPr lang="de-DE" sz="2000" dirty="0"/>
           </a:p>
         </p:txBody>
       </p:sp>
@@ -6431,7 +6433,7 @@
         </p:spPr>
         <p:txBody>
           <a:bodyPr anchor="ctr">
-            <a:normAutofit/>
+            <a:normAutofit lnSpcReduction="10000"/>
           </a:bodyPr>
           <a:lstStyle/>
           <a:p>
@@ -6441,8 +6443,94 @@
               </a:lnSpc>
             </a:pPr>
             <a:r>
-              <a:rPr lang="de-DE" sz="1300"/>
-              <a:t>After: Lambda</a:t>
+              <a:rPr lang="de-DE" sz="1400" dirty="0" err="1"/>
+              <a:t>Before</a:t>
+            </a:r>
+            <a:r>
+              <a:rPr lang="de-DE" sz="1400" dirty="0"/>
+              <a:t>: Lambda</a:t>
+            </a:r>
+          </a:p>
+        </p:txBody>
+      </p:sp>
+      <p:sp>
+        <p:nvSpPr>
+          <p:cNvPr id="7" name="TextBox 6">
+            <a:extLst>
+              <a:ext uri="{FF2B5EF4-FFF2-40B4-BE49-F238E27FC236}">
+                <a16:creationId xmlns:a16="http://schemas.microsoft.com/office/drawing/2014/main" id="{7F41D8DA-6FDC-1129-868F-248B774172BA}"/>
+              </a:ext>
+            </a:extLst>
+          </p:cNvPr>
+          <p:cNvSpPr txBox="1"/>
+          <p:nvPr/>
+        </p:nvSpPr>
+        <p:spPr>
+          <a:xfrm>
+            <a:off x="816095" y="1512130"/>
+            <a:ext cx="1787669" cy="477054"/>
+          </a:xfrm>
+          <a:prstGeom prst="rect">
+            <a:avLst/>
+          </a:prstGeom>
+          <a:noFill/>
+        </p:spPr>
+        <p:txBody>
+          <a:bodyPr wrap="none" rtlCol="0">
+            <a:spAutoFit/>
+          </a:bodyPr>
+          <a:lstStyle/>
+          <a:p>
+            <a:r>
+              <a:rPr lang="en-US" dirty="0">
+                <a:solidFill>
+                  <a:schemeClr val="accent6">
+                    <a:lumMod val="75000"/>
+                  </a:schemeClr>
+                </a:solidFill>
+              </a:rPr>
+              <a:t>Batch layer</a:t>
+            </a:r>
+          </a:p>
+        </p:txBody>
+      </p:sp>
+      <p:sp>
+        <p:nvSpPr>
+          <p:cNvPr id="8" name="TextBox 7">
+            <a:extLst>
+              <a:ext uri="{FF2B5EF4-FFF2-40B4-BE49-F238E27FC236}">
+                <a16:creationId xmlns:a16="http://schemas.microsoft.com/office/drawing/2014/main" id="{1FFFC2CA-D8EA-FE90-C20B-0F1543F7DD2E}"/>
+              </a:ext>
+            </a:extLst>
+          </p:cNvPr>
+          <p:cNvSpPr txBox="1"/>
+          <p:nvPr/>
+        </p:nvSpPr>
+        <p:spPr>
+          <a:xfrm>
+            <a:off x="816095" y="5345870"/>
+            <a:ext cx="1893467" cy="477054"/>
+          </a:xfrm>
+          <a:prstGeom prst="rect">
+            <a:avLst/>
+          </a:prstGeom>
+          <a:noFill/>
+        </p:spPr>
+        <p:txBody>
+          <a:bodyPr wrap="none" rtlCol="0">
+            <a:spAutoFit/>
+          </a:bodyPr>
+          <a:lstStyle/>
+          <a:p>
+            <a:r>
+              <a:rPr lang="en-US" dirty="0">
+                <a:solidFill>
+                  <a:schemeClr val="accent6">
+                    <a:lumMod val="75000"/>
+                  </a:schemeClr>
+                </a:solidFill>
+              </a:rPr>
+              <a:t>Speed layer</a:t>
             </a:r>
           </a:p>
         </p:txBody>
@@ -6485,6 +6573,227 @@
           <p:cNvPr id="2" name="Title 1">
             <a:extLst>
               <a:ext uri="{FF2B5EF4-FFF2-40B4-BE49-F238E27FC236}">
+                <a16:creationId xmlns:a16="http://schemas.microsoft.com/office/drawing/2014/main" id="{E60624A9-0C73-05DF-78AA-5F6B397204A2}"/>
+              </a:ext>
+            </a:extLst>
+          </p:cNvPr>
+          <p:cNvSpPr>
+            <a:spLocks noGrp="1"/>
+          </p:cNvSpPr>
+          <p:nvPr>
+            <p:ph type="title"/>
+          </p:nvPr>
+        </p:nvSpPr>
+        <p:spPr/>
+        <p:txBody>
+          <a:bodyPr/>
+          <a:lstStyle/>
+          <a:p>
+            <a:r>
+              <a:rPr lang="en-US" sz="2000" dirty="0"/>
+              <a:t>Real Case Study: Twitter</a:t>
+            </a:r>
+          </a:p>
+        </p:txBody>
+      </p:sp>
+      <p:sp>
+        <p:nvSpPr>
+          <p:cNvPr id="3" name="Content Placeholder 2">
+            <a:extLst>
+              <a:ext uri="{FF2B5EF4-FFF2-40B4-BE49-F238E27FC236}">
+                <a16:creationId xmlns:a16="http://schemas.microsoft.com/office/drawing/2014/main" id="{B5EC0EA2-9A87-4ED1-DF77-180D63B1D550}"/>
+              </a:ext>
+            </a:extLst>
+          </p:cNvPr>
+          <p:cNvSpPr>
+            <a:spLocks noGrp="1"/>
+          </p:cNvSpPr>
+          <p:nvPr>
+            <p:ph idx="1"/>
+          </p:nvPr>
+        </p:nvSpPr>
+        <p:spPr/>
+        <p:txBody>
+          <a:bodyPr/>
+          <a:lstStyle/>
+          <a:p>
+            <a:r>
+              <a:rPr lang="de-DE" sz="1800" dirty="0" err="1"/>
+              <a:t>Summingbird</a:t>
+            </a:r>
+            <a:r>
+              <a:rPr lang="de-DE" sz="1800" dirty="0"/>
+              <a:t> </a:t>
+            </a:r>
+            <a:r>
+              <a:rPr lang="de-DE" sz="1800" dirty="0" err="1"/>
+              <a:t>provides</a:t>
+            </a:r>
+            <a:r>
+              <a:rPr lang="de-DE" sz="1800" dirty="0"/>
+              <a:t> high-level </a:t>
+            </a:r>
+            <a:r>
+              <a:rPr lang="de-DE" sz="1800" dirty="0" err="1"/>
+              <a:t>language</a:t>
+            </a:r>
+            <a:r>
+              <a:rPr lang="de-DE" sz="1800" dirty="0"/>
+              <a:t>, </a:t>
+            </a:r>
+            <a:r>
+              <a:rPr lang="de-DE" sz="1800" dirty="0" err="1"/>
+              <a:t>eliminating</a:t>
+            </a:r>
+            <a:r>
+              <a:rPr lang="de-DE" sz="1800" dirty="0"/>
+              <a:t> </a:t>
+            </a:r>
+            <a:r>
+              <a:rPr lang="de-DE" sz="1800" dirty="0" err="1"/>
+              <a:t>the</a:t>
+            </a:r>
+            <a:r>
+              <a:rPr lang="de-DE" sz="1800" dirty="0"/>
+              <a:t> </a:t>
+            </a:r>
+            <a:r>
+              <a:rPr lang="de-DE" sz="1800" dirty="0" err="1"/>
+              <a:t>problem</a:t>
+            </a:r>
+            <a:r>
+              <a:rPr lang="de-DE" sz="1800" dirty="0"/>
+              <a:t> </a:t>
+            </a:r>
+            <a:r>
+              <a:rPr lang="de-DE" sz="1800" dirty="0" err="1"/>
+              <a:t>of</a:t>
+            </a:r>
+            <a:r>
+              <a:rPr lang="de-DE" sz="1800" dirty="0"/>
+              <a:t> parallel </a:t>
+            </a:r>
+            <a:r>
+              <a:rPr lang="de-DE" sz="1800" dirty="0" err="1"/>
+              <a:t>maintainance</a:t>
+            </a:r>
+            <a:r>
+              <a:rPr lang="de-DE" sz="1800" dirty="0"/>
+              <a:t> Lambda </a:t>
+            </a:r>
+            <a:r>
+              <a:rPr lang="de-DE" sz="1800" dirty="0" err="1"/>
+              <a:t>layers</a:t>
+            </a:r>
+            <a:r>
+              <a:rPr lang="de-DE" sz="1800" dirty="0"/>
+              <a:t>.</a:t>
+            </a:r>
+          </a:p>
+          <a:p>
+            <a:endParaRPr lang="en-US" sz="1800" dirty="0"/>
+          </a:p>
+          <a:p>
+            <a:r>
+              <a:rPr lang="en-US" sz="1800" dirty="0"/>
+              <a:t>Twitter Service Auto-Scaling Rules (TSAR) manages services’ auto-scaling. It adjusts the number of instances running for a particular service based on real-time demand. Also, merges produced data by both layers.</a:t>
+            </a:r>
+          </a:p>
+          <a:p>
+            <a:pPr marL="0" indent="0">
+              <a:buNone/>
+            </a:pPr>
+            <a:endParaRPr lang="en-US" sz="1800" dirty="0"/>
+          </a:p>
+          <a:p>
+            <a:r>
+              <a:rPr lang="en-US" sz="1800" dirty="0"/>
+              <a:t>Batch processing costs are reduced by centralizing the computing on one data center and replicas distribution to others.</a:t>
+            </a:r>
+          </a:p>
+          <a:p>
+            <a:endParaRPr lang="en-US" sz="1800" dirty="0"/>
+          </a:p>
+          <a:p>
+            <a:r>
+              <a:rPr lang="en-US" sz="1800" dirty="0"/>
+              <a:t>Arising streaming volumes led to the data losses in the Speed Layer, which resulted into less accurate aggregated data shown to Twitter users.</a:t>
+            </a:r>
+          </a:p>
+          <a:p>
+            <a:endParaRPr lang="en-US" dirty="0"/>
+          </a:p>
+          <a:p>
+            <a:endParaRPr lang="en-US" dirty="0"/>
+          </a:p>
+        </p:txBody>
+      </p:sp>
+      <p:sp>
+        <p:nvSpPr>
+          <p:cNvPr id="4" name="Text Placeholder 3">
+            <a:extLst>
+              <a:ext uri="{FF2B5EF4-FFF2-40B4-BE49-F238E27FC236}">
+                <a16:creationId xmlns:a16="http://schemas.microsoft.com/office/drawing/2014/main" id="{D5101F57-66DA-0D86-3768-0E6285E5C7E4}"/>
+              </a:ext>
+            </a:extLst>
+          </p:cNvPr>
+          <p:cNvSpPr>
+            <a:spLocks noGrp="1"/>
+          </p:cNvSpPr>
+          <p:nvPr>
+            <p:ph type="body" sz="quarter" idx="12"/>
+          </p:nvPr>
+        </p:nvSpPr>
+        <p:spPr/>
+        <p:txBody>
+          <a:bodyPr/>
+          <a:lstStyle/>
+          <a:p>
+            <a:r>
+              <a:rPr lang="en-US" sz="1400" dirty="0"/>
+              <a:t>Lambda Insights</a:t>
+            </a:r>
+          </a:p>
+        </p:txBody>
+      </p:sp>
+    </p:spTree>
+    <p:extLst>
+      <p:ext uri="{BB962C8B-B14F-4D97-AF65-F5344CB8AC3E}">
+        <p14:creationId xmlns:p14="http://schemas.microsoft.com/office/powerpoint/2010/main" val="335116240"/>
+      </p:ext>
+    </p:extLst>
+  </p:cSld>
+  <p:clrMapOvr>
+    <a:masterClrMapping/>
+  </p:clrMapOvr>
+  <p:transition>
+    <p:dissolve/>
+  </p:transition>
+</p:sld>
+</file>
+
+<file path=ppt/slides/slide17.xml><?xml version="1.0" encoding="utf-8"?>
+<p:sld xmlns:a="http://schemas.openxmlformats.org/drawingml/2006/main" xmlns:r="http://schemas.openxmlformats.org/officeDocument/2006/relationships" xmlns:p="http://schemas.openxmlformats.org/presentationml/2006/main">
+  <p:cSld>
+    <p:spTree>
+      <p:nvGrpSpPr>
+        <p:cNvPr id="1" name=""/>
+        <p:cNvGrpSpPr/>
+        <p:nvPr/>
+      </p:nvGrpSpPr>
+      <p:grpSpPr>
+        <a:xfrm>
+          <a:off x="0" y="0"/>
+          <a:ext cx="0" cy="0"/>
+          <a:chOff x="0" y="0"/>
+          <a:chExt cx="0" cy="0"/>
+        </a:xfrm>
+      </p:grpSpPr>
+      <p:sp>
+        <p:nvSpPr>
+          <p:cNvPr id="2" name="Title 1">
+            <a:extLst>
+              <a:ext uri="{FF2B5EF4-FFF2-40B4-BE49-F238E27FC236}">
                 <a16:creationId xmlns:a16="http://schemas.microsoft.com/office/drawing/2014/main" id="{0A2CA2E0-68D9-7AE9-5DBC-F920E7E76D96}"/>
               </a:ext>
             </a:extLst>
@@ -6514,7 +6823,7 @@
               </a:lnSpc>
             </a:pPr>
             <a:r>
-              <a:rPr lang="en-US" sz="2000"/>
+              <a:rPr lang="en-US" sz="2000" dirty="0"/>
               <a:t>Real Case Study: Twitter</a:t>
             </a:r>
           </a:p>
@@ -6575,7 +6884,7 @@
         </p:spPr>
         <p:txBody>
           <a:bodyPr anchor="ctr">
-            <a:normAutofit/>
+            <a:normAutofit lnSpcReduction="10000"/>
           </a:bodyPr>
           <a:lstStyle/>
           <a:p>
@@ -6585,7 +6894,7 @@
               </a:lnSpc>
             </a:pPr>
             <a:r>
-              <a:rPr lang="en-US" sz="1300"/>
+              <a:rPr lang="en-US" sz="1400" dirty="0"/>
               <a:t>After: Kappa</a:t>
             </a:r>
           </a:p>
@@ -6607,7 +6916,182 @@
 </p:sld>
 </file>
 
-<file path=ppt/slides/slide17.xml><?xml version="1.0" encoding="utf-8"?>
+<file path=ppt/slides/slide18.xml><?xml version="1.0" encoding="utf-8"?>
+<p:sld xmlns:a="http://schemas.openxmlformats.org/drawingml/2006/main" xmlns:r="http://schemas.openxmlformats.org/officeDocument/2006/relationships" xmlns:p="http://schemas.openxmlformats.org/presentationml/2006/main">
+  <p:cSld>
+    <p:spTree>
+      <p:nvGrpSpPr>
+        <p:cNvPr id="1" name=""/>
+        <p:cNvGrpSpPr/>
+        <p:nvPr/>
+      </p:nvGrpSpPr>
+      <p:grpSpPr>
+        <a:xfrm>
+          <a:off x="0" y="0"/>
+          <a:ext cx="0" cy="0"/>
+          <a:chOff x="0" y="0"/>
+          <a:chExt cx="0" cy="0"/>
+        </a:xfrm>
+      </p:grpSpPr>
+      <p:sp>
+        <p:nvSpPr>
+          <p:cNvPr id="2" name="Title 1">
+            <a:extLst>
+              <a:ext uri="{FF2B5EF4-FFF2-40B4-BE49-F238E27FC236}">
+                <a16:creationId xmlns:a16="http://schemas.microsoft.com/office/drawing/2014/main" id="{E2F86803-ACDE-F9C6-A910-9A444A86C472}"/>
+              </a:ext>
+            </a:extLst>
+          </p:cNvPr>
+          <p:cNvSpPr>
+            <a:spLocks noGrp="1"/>
+          </p:cNvSpPr>
+          <p:nvPr>
+            <p:ph type="title"/>
+          </p:nvPr>
+        </p:nvSpPr>
+        <p:spPr/>
+        <p:txBody>
+          <a:bodyPr/>
+          <a:lstStyle/>
+          <a:p>
+            <a:r>
+              <a:rPr lang="en-US" sz="2000" dirty="0"/>
+              <a:t>Real Case Study: Twitter</a:t>
+            </a:r>
+          </a:p>
+        </p:txBody>
+      </p:sp>
+      <p:sp>
+        <p:nvSpPr>
+          <p:cNvPr id="3" name="Content Placeholder 2">
+            <a:extLst>
+              <a:ext uri="{FF2B5EF4-FFF2-40B4-BE49-F238E27FC236}">
+                <a16:creationId xmlns:a16="http://schemas.microsoft.com/office/drawing/2014/main" id="{89FD64E4-5355-3BEA-6DF3-3AE775A1A62A}"/>
+              </a:ext>
+            </a:extLst>
+          </p:cNvPr>
+          <p:cNvSpPr>
+            <a:spLocks noGrp="1"/>
+          </p:cNvSpPr>
+          <p:nvPr>
+            <p:ph idx="1"/>
+          </p:nvPr>
+        </p:nvSpPr>
+        <p:spPr/>
+        <p:txBody>
+          <a:bodyPr/>
+          <a:lstStyle/>
+          <a:p>
+            <a:r>
+              <a:rPr lang="en-US" dirty="0"/>
+              <a:t>During the whole data pipeline, Twitter ensures that all message are delivered, by using at-least-once semantics.</a:t>
+            </a:r>
+          </a:p>
+          <a:p>
+            <a:endParaRPr lang="en-US" dirty="0"/>
+          </a:p>
+          <a:p>
+            <a:r>
+              <a:rPr lang="en-US" dirty="0"/>
+              <a:t>Before transferring to the cloud, the pipeline makes data preprocessing and optimizes Kafka logs for a </a:t>
+            </a:r>
+            <a:r>
+              <a:rPr lang="en-US" dirty="0" err="1"/>
+              <a:t>Pubsub</a:t>
+            </a:r>
+            <a:r>
+              <a:rPr lang="en-US" dirty="0"/>
+              <a:t> topic for reducing data storage.</a:t>
+            </a:r>
+          </a:p>
+          <a:p>
+            <a:endParaRPr lang="en-US" dirty="0"/>
+          </a:p>
+          <a:p>
+            <a:r>
+              <a:rPr lang="en-US" dirty="0"/>
+              <a:t>To achieve near exactly-once processing, Twitter applies internal deduping strategies within a timed window. The deduplication is made by Dataflow workers via UUID assigned by the Event Processor.</a:t>
+            </a:r>
+          </a:p>
+          <a:p>
+            <a:pPr marL="0" indent="0">
+              <a:buNone/>
+            </a:pPr>
+            <a:endParaRPr lang="en-US" dirty="0"/>
+          </a:p>
+          <a:p>
+            <a:r>
+              <a:rPr lang="en-US" dirty="0"/>
+              <a:t>Distributed aggregation of real-time data over Dataflow and </a:t>
+            </a:r>
+            <a:r>
+              <a:rPr lang="en-US" dirty="0" err="1"/>
+              <a:t>BigQuery</a:t>
+            </a:r>
+            <a:r>
+              <a:rPr lang="en-US" dirty="0"/>
+              <a:t> provides low-latency and high streaming throughput.</a:t>
+            </a:r>
+          </a:p>
+          <a:p>
+            <a:endParaRPr lang="en-US" dirty="0"/>
+          </a:p>
+          <a:p>
+            <a:r>
+              <a:rPr lang="en-US" dirty="0"/>
+              <a:t>On-premise Twitter query services tap the data from the high-scalable and distributed storage system for structured data.</a:t>
+            </a:r>
+          </a:p>
+          <a:p>
+            <a:endParaRPr lang="en-US" dirty="0"/>
+          </a:p>
+        </p:txBody>
+      </p:sp>
+      <p:sp>
+        <p:nvSpPr>
+          <p:cNvPr id="4" name="Text Placeholder 3">
+            <a:extLst>
+              <a:ext uri="{FF2B5EF4-FFF2-40B4-BE49-F238E27FC236}">
+                <a16:creationId xmlns:a16="http://schemas.microsoft.com/office/drawing/2014/main" id="{C95EC48B-9240-23CA-EF93-F0F219A38F3A}"/>
+              </a:ext>
+            </a:extLst>
+          </p:cNvPr>
+          <p:cNvSpPr>
+            <a:spLocks noGrp="1"/>
+          </p:cNvSpPr>
+          <p:nvPr>
+            <p:ph type="body" sz="quarter" idx="12"/>
+          </p:nvPr>
+        </p:nvSpPr>
+        <p:spPr/>
+        <p:txBody>
+          <a:bodyPr/>
+          <a:lstStyle/>
+          <a:p>
+            <a:r>
+              <a:rPr lang="en-US" sz="1400" dirty="0"/>
+              <a:t>Kappa Insights</a:t>
+            </a:r>
+          </a:p>
+        </p:txBody>
+      </p:sp>
+    </p:spTree>
+    <p:extLst>
+      <p:ext uri="{BB962C8B-B14F-4D97-AF65-F5344CB8AC3E}">
+        <p14:creationId xmlns:p14="http://schemas.microsoft.com/office/powerpoint/2010/main" val="3675165042"/>
+      </p:ext>
+    </p:extLst>
+  </p:cSld>
+  <p:clrMapOvr>
+    <a:masterClrMapping/>
+  </p:clrMapOvr>
+  <p:transition>
+    <p:dissolve/>
+  </p:transition>
+</p:sld>
+</file>
+
+<file path=ppt/slides/slide19.xml><?xml version="1.0" encoding="utf-8"?>
 <p:sld xmlns:a="http://schemas.openxmlformats.org/drawingml/2006/main" xmlns:r="http://schemas.openxmlformats.org/officeDocument/2006/relationships" xmlns:p="http://schemas.openxmlformats.org/presentationml/2006/main">
   <p:cSld>
     <p:spTree>
@@ -17835,764 +18319,6 @@
 </p:sld>
 </file>
 
-<file path=ppt/slides/slide18.xml><?xml version="1.0" encoding="utf-8"?>
-<p:sld xmlns:a="http://schemas.openxmlformats.org/drawingml/2006/main" xmlns:r="http://schemas.openxmlformats.org/officeDocument/2006/relationships" xmlns:p="http://schemas.openxmlformats.org/presentationml/2006/main">
-  <p:cSld>
-    <p:spTree>
-      <p:nvGrpSpPr>
-        <p:cNvPr id="1" name=""/>
-        <p:cNvGrpSpPr/>
-        <p:nvPr/>
-      </p:nvGrpSpPr>
-      <p:grpSpPr>
-        <a:xfrm>
-          <a:off x="0" y="0"/>
-          <a:ext cx="0" cy="0"/>
-          <a:chOff x="0" y="0"/>
-          <a:chExt cx="0" cy="0"/>
-        </a:xfrm>
-      </p:grpSpPr>
-      <p:sp>
-        <p:nvSpPr>
-          <p:cNvPr id="6" name="Titel 5">
-            <a:extLst>
-              <a:ext uri="{FF2B5EF4-FFF2-40B4-BE49-F238E27FC236}">
-                <a16:creationId xmlns:a16="http://schemas.microsoft.com/office/drawing/2014/main" id="{2C4504D7-3E22-724F-6319-500AE7BF4BDE}"/>
-              </a:ext>
-            </a:extLst>
-          </p:cNvPr>
-          <p:cNvSpPr>
-            <a:spLocks noGrp="1"/>
-          </p:cNvSpPr>
-          <p:nvPr>
-            <p:ph type="title"/>
-          </p:nvPr>
-        </p:nvSpPr>
-        <p:spPr/>
-        <p:txBody>
-          <a:bodyPr/>
-          <a:lstStyle/>
-          <a:p>
-            <a:r>
-              <a:rPr lang="de-DE" dirty="0" err="1"/>
-              <a:t>Literature</a:t>
-            </a:r>
-            <a:endParaRPr lang="de-DE" dirty="0"/>
-          </a:p>
-        </p:txBody>
-      </p:sp>
-      <p:sp>
-        <p:nvSpPr>
-          <p:cNvPr id="8" name="Textplatzhalter 7">
-            <a:extLst>
-              <a:ext uri="{FF2B5EF4-FFF2-40B4-BE49-F238E27FC236}">
-                <a16:creationId xmlns:a16="http://schemas.microsoft.com/office/drawing/2014/main" id="{B85CCFC8-F558-33C0-C2A5-442E6114DA4A}"/>
-              </a:ext>
-            </a:extLst>
-          </p:cNvPr>
-          <p:cNvSpPr>
-            <a:spLocks noGrp="1"/>
-          </p:cNvSpPr>
-          <p:nvPr>
-            <p:ph type="body" sz="quarter" idx="12"/>
-          </p:nvPr>
-        </p:nvSpPr>
-        <p:spPr/>
-        <p:txBody>
-          <a:bodyPr/>
-          <a:lstStyle/>
-          <a:p>
-            <a:r>
-              <a:rPr lang="de-DE" dirty="0"/>
-              <a:t>Seite 1/1</a:t>
-            </a:r>
-          </a:p>
-        </p:txBody>
-      </p:sp>
-      <p:sp>
-        <p:nvSpPr>
-          <p:cNvPr id="18" name="Inhaltsplatzhalter 17">
-            <a:extLst>
-              <a:ext uri="{FF2B5EF4-FFF2-40B4-BE49-F238E27FC236}">
-                <a16:creationId xmlns:a16="http://schemas.microsoft.com/office/drawing/2014/main" id="{38137EB2-23CB-1E8C-ED42-024241D67AA3}"/>
-              </a:ext>
-            </a:extLst>
-          </p:cNvPr>
-          <p:cNvSpPr>
-            <a:spLocks noGrp="1"/>
-          </p:cNvSpPr>
-          <p:nvPr>
-            <p:ph idx="1"/>
-          </p:nvPr>
-        </p:nvSpPr>
-        <p:spPr>
-          <a:xfrm>
-            <a:off x="540000" y="1480143"/>
-            <a:ext cx="8063999" cy="4427275"/>
-          </a:xfrm>
-        </p:spPr>
-        <p:txBody>
-          <a:bodyPr/>
-          <a:lstStyle/>
-          <a:p>
-            <a:r>
-              <a:rPr lang="en-US" sz="1100" dirty="0">
-                <a:solidFill>
-                  <a:srgbClr val="7D8591"/>
-                </a:solidFill>
-                <a:latin typeface="+mj-lt"/>
-              </a:rPr>
-              <a:t>1. </a:t>
-            </a:r>
-            <a:r>
-              <a:rPr lang="en-US" sz="1100" dirty="0" err="1">
-                <a:solidFill>
-                  <a:srgbClr val="7D8591"/>
-                </a:solidFill>
-                <a:latin typeface="+mj-lt"/>
-              </a:rPr>
-              <a:t>Hueske</a:t>
-            </a:r>
-            <a:r>
-              <a:rPr lang="en-US" sz="1100" dirty="0">
-                <a:solidFill>
-                  <a:srgbClr val="7D8591"/>
-                </a:solidFill>
-                <a:latin typeface="+mj-lt"/>
-              </a:rPr>
-              <a:t>, F., &amp; </a:t>
-            </a:r>
-            <a:r>
-              <a:rPr lang="en-US" sz="1100" dirty="0" err="1">
-                <a:solidFill>
-                  <a:srgbClr val="7D8591"/>
-                </a:solidFill>
-                <a:latin typeface="+mj-lt"/>
-              </a:rPr>
-              <a:t>Kalavri</a:t>
-            </a:r>
-            <a:r>
-              <a:rPr lang="en-US" sz="1100" dirty="0">
-                <a:solidFill>
-                  <a:srgbClr val="7D8591"/>
-                </a:solidFill>
-                <a:latin typeface="+mj-lt"/>
-              </a:rPr>
-              <a:t>, V. (2019). Stream Processing with Apache </a:t>
-            </a:r>
-            <a:r>
-              <a:rPr lang="en-US" sz="1100" dirty="0" err="1">
-                <a:solidFill>
-                  <a:srgbClr val="7D8591"/>
-                </a:solidFill>
-                <a:latin typeface="+mj-lt"/>
-              </a:rPr>
-              <a:t>Flink</a:t>
-            </a:r>
-            <a:r>
-              <a:rPr lang="en-US" sz="1100" dirty="0">
-                <a:solidFill>
-                  <a:srgbClr val="7D8591"/>
-                </a:solidFill>
-                <a:latin typeface="+mj-lt"/>
-              </a:rPr>
-              <a:t> Fundamentals, Implementation, and Operation of Streaming Applications. O’Reilly Media.</a:t>
-            </a:r>
-          </a:p>
-          <a:p>
-            <a:r>
-              <a:rPr lang="de-DE" sz="1100" dirty="0">
-                <a:solidFill>
-                  <a:srgbClr val="7D8591"/>
-                </a:solidFill>
-                <a:latin typeface="+mj-lt"/>
-              </a:rPr>
-              <a:t>2. Feick, Martin, Niko Kleer, and Marek Kohn. "</a:t>
-            </a:r>
-            <a:r>
-              <a:rPr lang="de-DE" sz="1100" dirty="0" err="1">
-                <a:solidFill>
-                  <a:srgbClr val="7D8591"/>
-                </a:solidFill>
-                <a:latin typeface="+mj-lt"/>
-              </a:rPr>
-              <a:t>Fundamentals</a:t>
-            </a:r>
-            <a:r>
-              <a:rPr lang="de-DE" sz="1100" dirty="0">
-                <a:solidFill>
-                  <a:srgbClr val="7D8591"/>
-                </a:solidFill>
-                <a:latin typeface="+mj-lt"/>
-              </a:rPr>
-              <a:t> </a:t>
-            </a:r>
-            <a:r>
-              <a:rPr lang="de-DE" sz="1100" dirty="0" err="1">
-                <a:solidFill>
-                  <a:srgbClr val="7D8591"/>
-                </a:solidFill>
-                <a:latin typeface="+mj-lt"/>
-              </a:rPr>
-              <a:t>of</a:t>
-            </a:r>
-            <a:r>
-              <a:rPr lang="de-DE" sz="1100" dirty="0">
-                <a:solidFill>
-                  <a:srgbClr val="7D8591"/>
-                </a:solidFill>
-                <a:latin typeface="+mj-lt"/>
-              </a:rPr>
-              <a:t> real-time </a:t>
-            </a:r>
-            <a:r>
-              <a:rPr lang="de-DE" sz="1100" dirty="0" err="1">
-                <a:solidFill>
-                  <a:srgbClr val="7D8591"/>
-                </a:solidFill>
-                <a:latin typeface="+mj-lt"/>
-              </a:rPr>
-              <a:t>data</a:t>
-            </a:r>
-            <a:r>
-              <a:rPr lang="de-DE" sz="1100" dirty="0">
-                <a:solidFill>
-                  <a:srgbClr val="7D8591"/>
-                </a:solidFill>
-                <a:latin typeface="+mj-lt"/>
-              </a:rPr>
-              <a:t> </a:t>
-            </a:r>
-            <a:r>
-              <a:rPr lang="de-DE" sz="1100" dirty="0" err="1">
-                <a:solidFill>
-                  <a:srgbClr val="7D8591"/>
-                </a:solidFill>
-                <a:latin typeface="+mj-lt"/>
-              </a:rPr>
-              <a:t>processing</a:t>
-            </a:r>
-            <a:r>
-              <a:rPr lang="de-DE" sz="1100" dirty="0">
-                <a:solidFill>
-                  <a:srgbClr val="7D8591"/>
-                </a:solidFill>
-                <a:latin typeface="+mj-lt"/>
-              </a:rPr>
-              <a:t> </a:t>
-            </a:r>
-            <a:r>
-              <a:rPr lang="de-DE" sz="1100" dirty="0" err="1">
-                <a:solidFill>
-                  <a:srgbClr val="7D8591"/>
-                </a:solidFill>
-                <a:latin typeface="+mj-lt"/>
-              </a:rPr>
-              <a:t>architectures</a:t>
-            </a:r>
-            <a:r>
-              <a:rPr lang="de-DE" sz="1100" dirty="0">
-                <a:solidFill>
-                  <a:srgbClr val="7D8591"/>
-                </a:solidFill>
-                <a:latin typeface="+mj-lt"/>
-              </a:rPr>
-              <a:t> </a:t>
-            </a:r>
-            <a:r>
-              <a:rPr lang="de-DE" sz="1100" dirty="0" err="1">
-                <a:solidFill>
-                  <a:srgbClr val="7D8591"/>
-                </a:solidFill>
-                <a:latin typeface="+mj-lt"/>
-              </a:rPr>
-              <a:t>lambda</a:t>
-            </a:r>
-            <a:r>
-              <a:rPr lang="de-DE" sz="1100" dirty="0">
-                <a:solidFill>
-                  <a:srgbClr val="7D8591"/>
-                </a:solidFill>
-                <a:latin typeface="+mj-lt"/>
-              </a:rPr>
-              <a:t> and </a:t>
-            </a:r>
-            <a:r>
-              <a:rPr lang="de-DE" sz="1100" dirty="0" err="1">
-                <a:solidFill>
-                  <a:srgbClr val="7D8591"/>
-                </a:solidFill>
-                <a:latin typeface="+mj-lt"/>
-              </a:rPr>
-              <a:t>kappa</a:t>
-            </a:r>
-            <a:r>
-              <a:rPr lang="de-DE" sz="1100" dirty="0">
-                <a:solidFill>
-                  <a:srgbClr val="7D8591"/>
-                </a:solidFill>
-                <a:latin typeface="+mj-lt"/>
-              </a:rPr>
-              <a:t>.“</a:t>
-            </a:r>
-          </a:p>
-          <a:p>
-            <a:r>
-              <a:rPr lang="de-DE" sz="1100" dirty="0">
-                <a:solidFill>
-                  <a:srgbClr val="7D8591"/>
-                </a:solidFill>
-                <a:latin typeface="+mj-lt"/>
-              </a:rPr>
-              <a:t>3. </a:t>
-            </a:r>
-            <a:r>
-              <a:rPr lang="de-DE" sz="1100" dirty="0" err="1">
-                <a:solidFill>
-                  <a:srgbClr val="7D8591"/>
-                </a:solidFill>
-                <a:latin typeface="+mj-lt"/>
-              </a:rPr>
-              <a:t>Owczarek</a:t>
-            </a:r>
-            <a:r>
-              <a:rPr lang="de-DE" sz="1100" dirty="0">
-                <a:solidFill>
-                  <a:srgbClr val="7D8591"/>
-                </a:solidFill>
-                <a:latin typeface="+mj-lt"/>
-              </a:rPr>
-              <a:t>. “Lambda vs. Kappa Architecture.” URL: https://nexocode.com/blog/posts/lambda-vs-kappa-architecture/</a:t>
-            </a:r>
-          </a:p>
-          <a:p>
-            <a:r>
-              <a:rPr lang="de-DE" sz="1100" dirty="0">
-                <a:solidFill>
-                  <a:srgbClr val="7D8591"/>
-                </a:solidFill>
-                <a:latin typeface="+mj-lt"/>
-              </a:rPr>
-              <a:t>4. </a:t>
-            </a:r>
-            <a:r>
-              <a:rPr lang="de-DE" sz="1100" dirty="0" err="1">
-                <a:solidFill>
-                  <a:srgbClr val="7D8591"/>
-                </a:solidFill>
-                <a:latin typeface="+mj-lt"/>
-              </a:rPr>
-              <a:t>Garg</a:t>
-            </a:r>
-            <a:r>
-              <a:rPr lang="de-DE" sz="1100" dirty="0">
-                <a:solidFill>
-                  <a:srgbClr val="7D8591"/>
-                </a:solidFill>
-                <a:latin typeface="+mj-lt"/>
-              </a:rPr>
-              <a:t>, </a:t>
-            </a:r>
-            <a:r>
-              <a:rPr lang="de-DE" sz="1100" dirty="0" err="1">
-                <a:solidFill>
-                  <a:srgbClr val="7D8591"/>
-                </a:solidFill>
-                <a:latin typeface="+mj-lt"/>
-              </a:rPr>
-              <a:t>Nishant</a:t>
-            </a:r>
-            <a:r>
-              <a:rPr lang="de-DE" sz="1100" dirty="0">
-                <a:solidFill>
-                  <a:srgbClr val="7D8591"/>
-                </a:solidFill>
-                <a:latin typeface="+mj-lt"/>
-              </a:rPr>
-              <a:t>. Apache </a:t>
-            </a:r>
-            <a:r>
-              <a:rPr lang="de-DE" sz="1100" dirty="0" err="1">
-                <a:solidFill>
-                  <a:srgbClr val="7D8591"/>
-                </a:solidFill>
-                <a:latin typeface="+mj-lt"/>
-              </a:rPr>
-              <a:t>kafka</a:t>
-            </a:r>
-            <a:r>
-              <a:rPr lang="de-DE" sz="1100" dirty="0">
-                <a:solidFill>
-                  <a:srgbClr val="7D8591"/>
-                </a:solidFill>
-                <a:latin typeface="+mj-lt"/>
-              </a:rPr>
-              <a:t>. Birmingham, UK: Packt Publishing, 2013.</a:t>
-            </a:r>
-          </a:p>
-          <a:p>
-            <a:r>
-              <a:rPr lang="de-DE" sz="1100" dirty="0">
-                <a:solidFill>
-                  <a:srgbClr val="7D8591"/>
-                </a:solidFill>
-                <a:latin typeface="+mj-lt"/>
-              </a:rPr>
-              <a:t>5. Twitter Blog: </a:t>
-            </a:r>
-            <a:r>
-              <a:rPr lang="de-DE" sz="1100" dirty="0">
-                <a:solidFill>
-                  <a:srgbClr val="7D8591"/>
-                </a:solidFill>
-                <a:latin typeface="+mj-lt"/>
-                <a:hlinkClick r:id="rId2">
-                  <a:extLst>
-                    <a:ext uri="{A12FA001-AC4F-418D-AE19-62706E023703}">
-                      <ahyp:hlinkClr xmlns:ahyp="http://schemas.microsoft.com/office/drawing/2018/hyperlinkcolor" val="tx"/>
-                    </a:ext>
-                  </a:extLst>
-                </a:hlinkClick>
-              </a:rPr>
-              <a:t>https://blog.twitter.com/engineering/en_us/topics/infrastructure/2021/processing-billions-of-events-in-real-time-at-twitter-</a:t>
-            </a:r>
-            <a:endParaRPr lang="de-DE" sz="1100" dirty="0">
-              <a:solidFill>
-                <a:srgbClr val="7D8591"/>
-              </a:solidFill>
-              <a:latin typeface="+mj-lt"/>
-            </a:endParaRPr>
-          </a:p>
-          <a:p>
-            <a:r>
-              <a:rPr lang="en-US" sz="1100" dirty="0">
-                <a:solidFill>
-                  <a:srgbClr val="7D8591"/>
-                </a:solidFill>
-                <a:latin typeface="+mj-lt"/>
-              </a:rPr>
-              <a:t>6. Apache </a:t>
-            </a:r>
-            <a:r>
-              <a:rPr lang="en-US" sz="1100" dirty="0" err="1">
-                <a:solidFill>
-                  <a:srgbClr val="7D8591"/>
-                </a:solidFill>
-                <a:latin typeface="+mj-lt"/>
-              </a:rPr>
-              <a:t>Flink</a:t>
-            </a:r>
-            <a:r>
-              <a:rPr lang="en-US" sz="1100" dirty="0">
-                <a:solidFill>
-                  <a:srgbClr val="7D8591"/>
-                </a:solidFill>
-                <a:latin typeface="+mj-lt"/>
-              </a:rPr>
-              <a:t> Documentation: https://nightlies.apache.org/flink/flink-docs-release-1.16/docs/concepts/flink-architecture/</a:t>
-            </a:r>
-          </a:p>
-          <a:p>
-            <a:endParaRPr lang="de-DE" sz="1100" dirty="0">
-              <a:solidFill>
-                <a:srgbClr val="7D8591"/>
-              </a:solidFill>
-              <a:latin typeface="+mj-lt"/>
-            </a:endParaRPr>
-          </a:p>
-          <a:p>
-            <a:r>
-              <a:rPr lang="en-US" sz="1100" dirty="0">
-                <a:solidFill>
-                  <a:srgbClr val="7D8591"/>
-                </a:solidFill>
-                <a:latin typeface="+mj-lt"/>
-              </a:rPr>
-              <a:t>7. </a:t>
-            </a:r>
-            <a:r>
-              <a:rPr lang="en-US" sz="1100" dirty="0" err="1">
-                <a:solidFill>
-                  <a:srgbClr val="7D8591"/>
-                </a:solidFill>
-                <a:latin typeface="+mj-lt"/>
-              </a:rPr>
-              <a:t>Kleppmann</a:t>
-            </a:r>
-            <a:r>
-              <a:rPr lang="en-US" sz="1100" dirty="0">
-                <a:solidFill>
-                  <a:srgbClr val="7D8591"/>
-                </a:solidFill>
-                <a:latin typeface="+mj-lt"/>
-              </a:rPr>
-              <a:t>, M. (2017). Designing Data-Intensive Applications: The Big Ideas Behind Reliable, Scalable, and Maintainable Systems. O’Reilly Media</a:t>
-            </a:r>
-          </a:p>
-          <a:p>
-            <a:r>
-              <a:rPr lang="de-DE" sz="1100" dirty="0">
-                <a:solidFill>
-                  <a:srgbClr val="7D8591"/>
-                </a:solidFill>
-                <a:latin typeface="+mj-lt"/>
-              </a:rPr>
-              <a:t>8. </a:t>
-            </a:r>
-            <a:r>
-              <a:rPr lang="en-US" sz="1100" dirty="0" err="1">
-                <a:solidFill>
-                  <a:srgbClr val="7D8591"/>
-                </a:solidFill>
-                <a:latin typeface="+mj-lt"/>
-              </a:rPr>
-              <a:t>Hueske</a:t>
-            </a:r>
-            <a:r>
-              <a:rPr lang="en-US" sz="1100" dirty="0">
-                <a:solidFill>
-                  <a:srgbClr val="7D8591"/>
-                </a:solidFill>
-                <a:latin typeface="+mj-lt"/>
-              </a:rPr>
-              <a:t>, F., &amp; </a:t>
-            </a:r>
-            <a:r>
-              <a:rPr lang="en-US" sz="1100" dirty="0" err="1">
-                <a:solidFill>
-                  <a:srgbClr val="7D8591"/>
-                </a:solidFill>
-                <a:latin typeface="+mj-lt"/>
-              </a:rPr>
-              <a:t>Kalavri</a:t>
-            </a:r>
-            <a:r>
-              <a:rPr lang="en-US" sz="1100" dirty="0">
-                <a:solidFill>
-                  <a:srgbClr val="7D8591"/>
-                </a:solidFill>
-                <a:latin typeface="+mj-lt"/>
-              </a:rPr>
-              <a:t>, V. (2019). Stream Processing with Apache </a:t>
-            </a:r>
-            <a:r>
-              <a:rPr lang="en-US" sz="1100" dirty="0" err="1">
-                <a:solidFill>
-                  <a:srgbClr val="7D8591"/>
-                </a:solidFill>
-                <a:latin typeface="+mj-lt"/>
-              </a:rPr>
-              <a:t>Flink</a:t>
-            </a:r>
-            <a:r>
-              <a:rPr lang="en-US" sz="1100" dirty="0">
-                <a:solidFill>
-                  <a:srgbClr val="7D8591"/>
-                </a:solidFill>
-                <a:latin typeface="+mj-lt"/>
-              </a:rPr>
-              <a:t> Fundamentals, Implementation, and Operation of Streaming Applications. O’Reilly Media.</a:t>
-            </a:r>
-          </a:p>
-          <a:p>
-            <a:r>
-              <a:rPr lang="de-DE" sz="1100" dirty="0">
-                <a:solidFill>
-                  <a:srgbClr val="7D8591"/>
-                </a:solidFill>
-                <a:latin typeface="+mj-lt"/>
-              </a:rPr>
-              <a:t>9. </a:t>
-            </a:r>
-            <a:r>
-              <a:rPr lang="de-DE" sz="1100" dirty="0" err="1">
-                <a:solidFill>
-                  <a:srgbClr val="7D8591"/>
-                </a:solidFill>
-                <a:latin typeface="+mj-lt"/>
-              </a:rPr>
-              <a:t>Akidau</a:t>
-            </a:r>
-            <a:r>
-              <a:rPr lang="de-DE" sz="1100" dirty="0">
-                <a:solidFill>
-                  <a:srgbClr val="7D8591"/>
-                </a:solidFill>
-                <a:latin typeface="+mj-lt"/>
-              </a:rPr>
-              <a:t>, T., </a:t>
-            </a:r>
-            <a:r>
-              <a:rPr lang="de-DE" sz="1100" dirty="0" err="1">
-                <a:solidFill>
-                  <a:srgbClr val="7D8591"/>
-                </a:solidFill>
-                <a:latin typeface="+mj-lt"/>
-              </a:rPr>
-              <a:t>Chernyak</a:t>
-            </a:r>
-            <a:r>
-              <a:rPr lang="de-DE" sz="1100" dirty="0">
-                <a:solidFill>
-                  <a:srgbClr val="7D8591"/>
-                </a:solidFill>
-                <a:latin typeface="+mj-lt"/>
-              </a:rPr>
-              <a:t>, S., &amp; Lax, R. (2018). Streaming Systems. O’Reilly Media.</a:t>
-            </a:r>
-          </a:p>
-          <a:p>
-            <a:r>
-              <a:rPr lang="de-DE" sz="1100" dirty="0">
-                <a:solidFill>
-                  <a:srgbClr val="7D8591"/>
-                </a:solidFill>
-                <a:latin typeface="+mj-lt"/>
-              </a:rPr>
-              <a:t>10. Online: Apache Software </a:t>
-            </a:r>
-            <a:r>
-              <a:rPr lang="de-DE" sz="1100" dirty="0" err="1">
-                <a:solidFill>
-                  <a:srgbClr val="7D8591"/>
-                </a:solidFill>
-                <a:latin typeface="+mj-lt"/>
-              </a:rPr>
-              <a:t>Foundation</a:t>
-            </a:r>
-            <a:r>
-              <a:rPr lang="de-DE" sz="1100" dirty="0">
-                <a:solidFill>
-                  <a:srgbClr val="7D8591"/>
-                </a:solidFill>
-                <a:latin typeface="+mj-lt"/>
-              </a:rPr>
-              <a:t> Projects </a:t>
-            </a:r>
-            <a:r>
-              <a:rPr lang="de-DE" sz="1100" dirty="0">
-                <a:solidFill>
-                  <a:srgbClr val="7D8591"/>
-                </a:solidFill>
-                <a:latin typeface="+mj-lt"/>
-                <a:hlinkClick r:id="rId3">
-                  <a:extLst>
-                    <a:ext uri="{A12FA001-AC4F-418D-AE19-62706E023703}">
-                      <ahyp:hlinkClr xmlns:ahyp="http://schemas.microsoft.com/office/drawing/2018/hyperlinkcolor" val="tx"/>
-                    </a:ext>
-                  </a:extLst>
-                </a:hlinkClick>
-              </a:rPr>
-              <a:t>https://projects.apache.org/</a:t>
-            </a:r>
-            <a:endParaRPr lang="de-DE" sz="1100" dirty="0">
-              <a:solidFill>
-                <a:srgbClr val="7D8591"/>
-              </a:solidFill>
-              <a:latin typeface="+mj-lt"/>
-            </a:endParaRPr>
-          </a:p>
-          <a:p>
-            <a:r>
-              <a:rPr lang="de-DE" sz="1100" dirty="0">
-                <a:solidFill>
-                  <a:srgbClr val="7D8591"/>
-                </a:solidFill>
-                <a:latin typeface="+mj-lt"/>
-              </a:rPr>
-              <a:t>11. Marz, N. (2015). Big Data. Manning.</a:t>
-            </a:r>
-            <a:endParaRPr lang="en-US" sz="1100" dirty="0">
-              <a:solidFill>
-                <a:srgbClr val="7D8591"/>
-              </a:solidFill>
-              <a:latin typeface="+mj-lt"/>
-            </a:endParaRPr>
-          </a:p>
-          <a:p>
-            <a:r>
-              <a:rPr lang="en-US" sz="1100" dirty="0">
-                <a:solidFill>
-                  <a:srgbClr val="7D8591"/>
-                </a:solidFill>
-                <a:latin typeface="+mj-lt"/>
-              </a:rPr>
-              <a:t>12. </a:t>
-            </a:r>
-            <a:r>
-              <a:rPr lang="en-US" sz="1100" dirty="0" err="1">
-                <a:solidFill>
-                  <a:srgbClr val="7D8591"/>
-                </a:solidFill>
-                <a:latin typeface="+mj-lt"/>
-              </a:rPr>
-              <a:t>Achari</a:t>
-            </a:r>
-            <a:r>
-              <a:rPr lang="en-US" sz="1100" dirty="0">
-                <a:solidFill>
-                  <a:srgbClr val="7D8591"/>
-                </a:solidFill>
-                <a:latin typeface="+mj-lt"/>
-              </a:rPr>
-              <a:t>, S. (2015). Hadoop Essentials. </a:t>
-            </a:r>
-            <a:r>
-              <a:rPr lang="en-US" sz="1100" dirty="0" err="1">
-                <a:solidFill>
-                  <a:srgbClr val="7D8591"/>
-                </a:solidFill>
-                <a:latin typeface="+mj-lt"/>
-              </a:rPr>
-              <a:t>Packt</a:t>
-            </a:r>
-            <a:r>
-              <a:rPr lang="en-US" sz="1100" dirty="0">
-                <a:solidFill>
-                  <a:srgbClr val="7D8591"/>
-                </a:solidFill>
-                <a:latin typeface="+mj-lt"/>
-              </a:rPr>
-              <a:t> Publishing, Limited.</a:t>
-            </a:r>
-          </a:p>
-          <a:p>
-            <a:r>
-              <a:rPr lang="en-US" sz="1100" dirty="0">
-                <a:solidFill>
-                  <a:srgbClr val="7D8591"/>
-                </a:solidFill>
-                <a:latin typeface="+mj-lt"/>
-              </a:rPr>
-              <a:t>13. Online: Apache Spark Documentation https://spark.apache.org/docs/latest/structured-streaming-programming-guide.html</a:t>
-            </a:r>
-            <a:endParaRPr lang="de-DE" sz="1050" dirty="0">
-              <a:latin typeface="+mj-lt"/>
-            </a:endParaRPr>
-          </a:p>
-          <a:p>
-            <a:endParaRPr lang="en-US" sz="1050" dirty="0">
-              <a:latin typeface="+mj-lt"/>
-            </a:endParaRPr>
-          </a:p>
-        </p:txBody>
-      </p:sp>
-    </p:spTree>
-    <p:extLst>
-      <p:ext uri="{BB962C8B-B14F-4D97-AF65-F5344CB8AC3E}">
-        <p14:creationId xmlns:p14="http://schemas.microsoft.com/office/powerpoint/2010/main" val="4157898214"/>
-      </p:ext>
-    </p:extLst>
-  </p:cSld>
-  <p:clrMapOvr>
-    <a:masterClrMapping/>
-  </p:clrMapOvr>
-  <p:transition>
-    <p:dissolve/>
-  </p:transition>
-</p:sld>
-</file>
-
 <file path=ppt/slides/slide2.xml><?xml version="1.0" encoding="utf-8"?>
 <p:sld xmlns:a="http://schemas.openxmlformats.org/drawingml/2006/main" xmlns:r="http://schemas.openxmlformats.org/officeDocument/2006/relationships" xmlns:p="http://schemas.openxmlformats.org/presentationml/2006/main">
   <p:cSld>
@@ -18806,6 +18532,812 @@
     <p:extLst>
       <p:ext uri="{BB962C8B-B14F-4D97-AF65-F5344CB8AC3E}">
         <p14:creationId xmlns:p14="http://schemas.microsoft.com/office/powerpoint/2010/main" val="332645501"/>
+      </p:ext>
+    </p:extLst>
+  </p:cSld>
+  <p:clrMapOvr>
+    <a:masterClrMapping/>
+  </p:clrMapOvr>
+  <p:transition>
+    <p:dissolve/>
+  </p:transition>
+</p:sld>
+</file>
+
+<file path=ppt/slides/slide20.xml><?xml version="1.0" encoding="utf-8"?>
+<p:sld xmlns:a="http://schemas.openxmlformats.org/drawingml/2006/main" xmlns:r="http://schemas.openxmlformats.org/officeDocument/2006/relationships" xmlns:p="http://schemas.openxmlformats.org/presentationml/2006/main">
+  <p:cSld>
+    <p:spTree>
+      <p:nvGrpSpPr>
+        <p:cNvPr id="1" name=""/>
+        <p:cNvGrpSpPr/>
+        <p:nvPr/>
+      </p:nvGrpSpPr>
+      <p:grpSpPr>
+        <a:xfrm>
+          <a:off x="0" y="0"/>
+          <a:ext cx="0" cy="0"/>
+          <a:chOff x="0" y="0"/>
+          <a:chExt cx="0" cy="0"/>
+        </a:xfrm>
+      </p:grpSpPr>
+      <p:sp>
+        <p:nvSpPr>
+          <p:cNvPr id="6" name="Titel 5">
+            <a:extLst>
+              <a:ext uri="{FF2B5EF4-FFF2-40B4-BE49-F238E27FC236}">
+                <a16:creationId xmlns:a16="http://schemas.microsoft.com/office/drawing/2014/main" id="{2C4504D7-3E22-724F-6319-500AE7BF4BDE}"/>
+              </a:ext>
+            </a:extLst>
+          </p:cNvPr>
+          <p:cNvSpPr>
+            <a:spLocks noGrp="1"/>
+          </p:cNvSpPr>
+          <p:nvPr>
+            <p:ph type="title"/>
+          </p:nvPr>
+        </p:nvSpPr>
+        <p:spPr/>
+        <p:txBody>
+          <a:bodyPr/>
+          <a:lstStyle/>
+          <a:p>
+            <a:r>
+              <a:rPr lang="de-DE" dirty="0" err="1"/>
+              <a:t>Literature</a:t>
+            </a:r>
+            <a:endParaRPr lang="de-DE" dirty="0"/>
+          </a:p>
+        </p:txBody>
+      </p:sp>
+      <p:sp>
+        <p:nvSpPr>
+          <p:cNvPr id="8" name="Textplatzhalter 7">
+            <a:extLst>
+              <a:ext uri="{FF2B5EF4-FFF2-40B4-BE49-F238E27FC236}">
+                <a16:creationId xmlns:a16="http://schemas.microsoft.com/office/drawing/2014/main" id="{B85CCFC8-F558-33C0-C2A5-442E6114DA4A}"/>
+              </a:ext>
+            </a:extLst>
+          </p:cNvPr>
+          <p:cNvSpPr>
+            <a:spLocks noGrp="1"/>
+          </p:cNvSpPr>
+          <p:nvPr>
+            <p:ph type="body" sz="quarter" idx="12"/>
+          </p:nvPr>
+        </p:nvSpPr>
+        <p:spPr/>
+        <p:txBody>
+          <a:bodyPr/>
+          <a:lstStyle/>
+          <a:p>
+            <a:r>
+              <a:rPr lang="de-DE" dirty="0"/>
+              <a:t>Seite 1/1</a:t>
+            </a:r>
+          </a:p>
+        </p:txBody>
+      </p:sp>
+      <p:sp>
+        <p:nvSpPr>
+          <p:cNvPr id="18" name="Inhaltsplatzhalter 17">
+            <a:extLst>
+              <a:ext uri="{FF2B5EF4-FFF2-40B4-BE49-F238E27FC236}">
+                <a16:creationId xmlns:a16="http://schemas.microsoft.com/office/drawing/2014/main" id="{38137EB2-23CB-1E8C-ED42-024241D67AA3}"/>
+              </a:ext>
+            </a:extLst>
+          </p:cNvPr>
+          <p:cNvSpPr>
+            <a:spLocks noGrp="1"/>
+          </p:cNvSpPr>
+          <p:nvPr>
+            <p:ph idx="1"/>
+          </p:nvPr>
+        </p:nvSpPr>
+        <p:spPr>
+          <a:xfrm>
+            <a:off x="540000" y="1480143"/>
+            <a:ext cx="8063999" cy="4427275"/>
+          </a:xfrm>
+        </p:spPr>
+        <p:txBody>
+          <a:bodyPr/>
+          <a:lstStyle/>
+          <a:p>
+            <a:pPr marL="0" indent="0">
+              <a:buNone/>
+            </a:pPr>
+            <a:r>
+              <a:rPr lang="en-US" sz="1100" dirty="0">
+                <a:solidFill>
+                  <a:srgbClr val="7D8591"/>
+                </a:solidFill>
+                <a:latin typeface="+mj-lt"/>
+              </a:rPr>
+              <a:t>1. </a:t>
+            </a:r>
+            <a:r>
+              <a:rPr lang="en-US" sz="1100" dirty="0" err="1">
+                <a:solidFill>
+                  <a:srgbClr val="7D8591"/>
+                </a:solidFill>
+                <a:latin typeface="+mj-lt"/>
+              </a:rPr>
+              <a:t>Hueske</a:t>
+            </a:r>
+            <a:r>
+              <a:rPr lang="en-US" sz="1100" dirty="0">
+                <a:solidFill>
+                  <a:srgbClr val="7D8591"/>
+                </a:solidFill>
+                <a:latin typeface="+mj-lt"/>
+              </a:rPr>
+              <a:t>, F., &amp; </a:t>
+            </a:r>
+            <a:r>
+              <a:rPr lang="en-US" sz="1100" dirty="0" err="1">
+                <a:solidFill>
+                  <a:srgbClr val="7D8591"/>
+                </a:solidFill>
+                <a:latin typeface="+mj-lt"/>
+              </a:rPr>
+              <a:t>Kalavri</a:t>
+            </a:r>
+            <a:r>
+              <a:rPr lang="en-US" sz="1100" dirty="0">
+                <a:solidFill>
+                  <a:srgbClr val="7D8591"/>
+                </a:solidFill>
+                <a:latin typeface="+mj-lt"/>
+              </a:rPr>
+              <a:t>, V. (2019). Stream Processing with Apache </a:t>
+            </a:r>
+            <a:r>
+              <a:rPr lang="en-US" sz="1100" dirty="0" err="1">
+                <a:solidFill>
+                  <a:srgbClr val="7D8591"/>
+                </a:solidFill>
+                <a:latin typeface="+mj-lt"/>
+              </a:rPr>
+              <a:t>Flink</a:t>
+            </a:r>
+            <a:r>
+              <a:rPr lang="en-US" sz="1100" dirty="0">
+                <a:solidFill>
+                  <a:srgbClr val="7D8591"/>
+                </a:solidFill>
+                <a:latin typeface="+mj-lt"/>
+              </a:rPr>
+              <a:t> Fundamentals, Implementation, and Operation of Streaming Applications. O’Reilly Media.</a:t>
+            </a:r>
+          </a:p>
+          <a:p>
+            <a:pPr marL="0" indent="0">
+              <a:buNone/>
+            </a:pPr>
+            <a:r>
+              <a:rPr lang="de-DE" sz="1100" dirty="0">
+                <a:solidFill>
+                  <a:srgbClr val="7D8591"/>
+                </a:solidFill>
+                <a:latin typeface="+mj-lt"/>
+              </a:rPr>
+              <a:t>2. Feick, Martin, Niko Kleer, and Marek Kohn. "</a:t>
+            </a:r>
+            <a:r>
+              <a:rPr lang="de-DE" sz="1100" dirty="0" err="1">
+                <a:solidFill>
+                  <a:srgbClr val="7D8591"/>
+                </a:solidFill>
+                <a:latin typeface="+mj-lt"/>
+              </a:rPr>
+              <a:t>Fundamentals</a:t>
+            </a:r>
+            <a:r>
+              <a:rPr lang="de-DE" sz="1100" dirty="0">
+                <a:solidFill>
+                  <a:srgbClr val="7D8591"/>
+                </a:solidFill>
+                <a:latin typeface="+mj-lt"/>
+              </a:rPr>
+              <a:t> </a:t>
+            </a:r>
+            <a:r>
+              <a:rPr lang="de-DE" sz="1100" dirty="0" err="1">
+                <a:solidFill>
+                  <a:srgbClr val="7D8591"/>
+                </a:solidFill>
+                <a:latin typeface="+mj-lt"/>
+              </a:rPr>
+              <a:t>of</a:t>
+            </a:r>
+            <a:r>
+              <a:rPr lang="de-DE" sz="1100" dirty="0">
+                <a:solidFill>
+                  <a:srgbClr val="7D8591"/>
+                </a:solidFill>
+                <a:latin typeface="+mj-lt"/>
+              </a:rPr>
+              <a:t> real-time </a:t>
+            </a:r>
+            <a:r>
+              <a:rPr lang="de-DE" sz="1100" dirty="0" err="1">
+                <a:solidFill>
+                  <a:srgbClr val="7D8591"/>
+                </a:solidFill>
+                <a:latin typeface="+mj-lt"/>
+              </a:rPr>
+              <a:t>data</a:t>
+            </a:r>
+            <a:r>
+              <a:rPr lang="de-DE" sz="1100" dirty="0">
+                <a:solidFill>
+                  <a:srgbClr val="7D8591"/>
+                </a:solidFill>
+                <a:latin typeface="+mj-lt"/>
+              </a:rPr>
+              <a:t> </a:t>
+            </a:r>
+            <a:r>
+              <a:rPr lang="de-DE" sz="1100" dirty="0" err="1">
+                <a:solidFill>
+                  <a:srgbClr val="7D8591"/>
+                </a:solidFill>
+                <a:latin typeface="+mj-lt"/>
+              </a:rPr>
+              <a:t>processing</a:t>
+            </a:r>
+            <a:r>
+              <a:rPr lang="de-DE" sz="1100" dirty="0">
+                <a:solidFill>
+                  <a:srgbClr val="7D8591"/>
+                </a:solidFill>
+                <a:latin typeface="+mj-lt"/>
+              </a:rPr>
+              <a:t> </a:t>
+            </a:r>
+            <a:r>
+              <a:rPr lang="de-DE" sz="1100" dirty="0" err="1">
+                <a:solidFill>
+                  <a:srgbClr val="7D8591"/>
+                </a:solidFill>
+                <a:latin typeface="+mj-lt"/>
+              </a:rPr>
+              <a:t>architectures</a:t>
+            </a:r>
+            <a:r>
+              <a:rPr lang="de-DE" sz="1100" dirty="0">
+                <a:solidFill>
+                  <a:srgbClr val="7D8591"/>
+                </a:solidFill>
+                <a:latin typeface="+mj-lt"/>
+              </a:rPr>
+              <a:t> </a:t>
+            </a:r>
+            <a:r>
+              <a:rPr lang="de-DE" sz="1100" dirty="0" err="1">
+                <a:solidFill>
+                  <a:srgbClr val="7D8591"/>
+                </a:solidFill>
+                <a:latin typeface="+mj-lt"/>
+              </a:rPr>
+              <a:t>lambda</a:t>
+            </a:r>
+            <a:r>
+              <a:rPr lang="de-DE" sz="1100" dirty="0">
+                <a:solidFill>
+                  <a:srgbClr val="7D8591"/>
+                </a:solidFill>
+                <a:latin typeface="+mj-lt"/>
+              </a:rPr>
+              <a:t> and </a:t>
+            </a:r>
+            <a:r>
+              <a:rPr lang="de-DE" sz="1100" dirty="0" err="1">
+                <a:solidFill>
+                  <a:srgbClr val="7D8591"/>
+                </a:solidFill>
+                <a:latin typeface="+mj-lt"/>
+              </a:rPr>
+              <a:t>kappa</a:t>
+            </a:r>
+            <a:r>
+              <a:rPr lang="de-DE" sz="1100" dirty="0">
+                <a:solidFill>
+                  <a:srgbClr val="7D8591"/>
+                </a:solidFill>
+                <a:latin typeface="+mj-lt"/>
+              </a:rPr>
+              <a:t>.“</a:t>
+            </a:r>
+          </a:p>
+          <a:p>
+            <a:pPr marL="0" indent="0">
+              <a:buNone/>
+            </a:pPr>
+            <a:r>
+              <a:rPr lang="de-DE" sz="1100" dirty="0">
+                <a:solidFill>
+                  <a:srgbClr val="7D8591"/>
+                </a:solidFill>
+                <a:latin typeface="+mj-lt"/>
+              </a:rPr>
+              <a:t>3. </a:t>
+            </a:r>
+            <a:r>
+              <a:rPr lang="de-DE" sz="1100" dirty="0" err="1">
+                <a:solidFill>
+                  <a:srgbClr val="7D8591"/>
+                </a:solidFill>
+                <a:latin typeface="+mj-lt"/>
+              </a:rPr>
+              <a:t>Owczarek</a:t>
+            </a:r>
+            <a:r>
+              <a:rPr lang="de-DE" sz="1100" dirty="0">
+                <a:solidFill>
+                  <a:srgbClr val="7D8591"/>
+                </a:solidFill>
+                <a:latin typeface="+mj-lt"/>
+              </a:rPr>
+              <a:t>. “Lambda vs. Kappa Architecture.” URL: https://nexocode.com/blog/posts/lambda-vs-kappa-architecture/</a:t>
+            </a:r>
+          </a:p>
+          <a:p>
+            <a:pPr marL="0" indent="0">
+              <a:buNone/>
+            </a:pPr>
+            <a:r>
+              <a:rPr lang="de-DE" sz="1100" dirty="0">
+                <a:solidFill>
+                  <a:srgbClr val="7D8591"/>
+                </a:solidFill>
+                <a:latin typeface="+mj-lt"/>
+              </a:rPr>
+              <a:t>4. </a:t>
+            </a:r>
+            <a:r>
+              <a:rPr lang="de-DE" sz="1100" dirty="0" err="1">
+                <a:solidFill>
+                  <a:srgbClr val="7D8591"/>
+                </a:solidFill>
+                <a:latin typeface="+mj-lt"/>
+              </a:rPr>
+              <a:t>Garg</a:t>
+            </a:r>
+            <a:r>
+              <a:rPr lang="de-DE" sz="1100" dirty="0">
+                <a:solidFill>
+                  <a:srgbClr val="7D8591"/>
+                </a:solidFill>
+                <a:latin typeface="+mj-lt"/>
+              </a:rPr>
+              <a:t>, </a:t>
+            </a:r>
+            <a:r>
+              <a:rPr lang="de-DE" sz="1100" dirty="0" err="1">
+                <a:solidFill>
+                  <a:srgbClr val="7D8591"/>
+                </a:solidFill>
+                <a:latin typeface="+mj-lt"/>
+              </a:rPr>
+              <a:t>Nishant</a:t>
+            </a:r>
+            <a:r>
+              <a:rPr lang="de-DE" sz="1100" dirty="0">
+                <a:solidFill>
+                  <a:srgbClr val="7D8591"/>
+                </a:solidFill>
+                <a:latin typeface="+mj-lt"/>
+              </a:rPr>
+              <a:t>. Apache </a:t>
+            </a:r>
+            <a:r>
+              <a:rPr lang="de-DE" sz="1100" dirty="0" err="1">
+                <a:solidFill>
+                  <a:srgbClr val="7D8591"/>
+                </a:solidFill>
+                <a:latin typeface="+mj-lt"/>
+              </a:rPr>
+              <a:t>kafka</a:t>
+            </a:r>
+            <a:r>
+              <a:rPr lang="de-DE" sz="1100" dirty="0">
+                <a:solidFill>
+                  <a:srgbClr val="7D8591"/>
+                </a:solidFill>
+                <a:latin typeface="+mj-lt"/>
+              </a:rPr>
+              <a:t>. Birmingham, UK: Packt Publishing, 2013.</a:t>
+            </a:r>
+          </a:p>
+          <a:p>
+            <a:pPr marL="0" indent="0">
+              <a:buNone/>
+            </a:pPr>
+            <a:r>
+              <a:rPr lang="de-DE" sz="1100" dirty="0">
+                <a:solidFill>
+                  <a:srgbClr val="7D8591"/>
+                </a:solidFill>
+                <a:latin typeface="+mj-lt"/>
+              </a:rPr>
+              <a:t>5. Twitter Blog: </a:t>
+            </a:r>
+            <a:r>
+              <a:rPr lang="de-DE" sz="1100" dirty="0">
+                <a:solidFill>
+                  <a:srgbClr val="7D8591"/>
+                </a:solidFill>
+                <a:latin typeface="+mj-lt"/>
+                <a:hlinkClick r:id="rId2">
+                  <a:extLst>
+                    <a:ext uri="{A12FA001-AC4F-418D-AE19-62706E023703}">
+                      <ahyp:hlinkClr xmlns:ahyp="http://schemas.microsoft.com/office/drawing/2018/hyperlinkcolor" val="tx"/>
+                    </a:ext>
+                  </a:extLst>
+                </a:hlinkClick>
+              </a:rPr>
+              <a:t>https://blog.twitter.com/engineering/en_us/topics/infrastructure/2021/processing-billions-of-events-in-real-time-at-twitter-</a:t>
+            </a:r>
+            <a:endParaRPr lang="de-DE" sz="1100" dirty="0">
+              <a:solidFill>
+                <a:srgbClr val="7D8591"/>
+              </a:solidFill>
+              <a:latin typeface="+mj-lt"/>
+            </a:endParaRPr>
+          </a:p>
+          <a:p>
+            <a:pPr marL="0" indent="0">
+              <a:buNone/>
+            </a:pPr>
+            <a:r>
+              <a:rPr lang="en-US" sz="1100" dirty="0">
+                <a:solidFill>
+                  <a:srgbClr val="7D8591"/>
+                </a:solidFill>
+                <a:latin typeface="+mj-lt"/>
+              </a:rPr>
+              <a:t>6. Apache </a:t>
+            </a:r>
+            <a:r>
+              <a:rPr lang="en-US" sz="1100" dirty="0" err="1">
+                <a:solidFill>
+                  <a:srgbClr val="7D8591"/>
+                </a:solidFill>
+                <a:latin typeface="+mj-lt"/>
+              </a:rPr>
+              <a:t>Flink</a:t>
+            </a:r>
+            <a:r>
+              <a:rPr lang="en-US" sz="1100" dirty="0">
+                <a:solidFill>
+                  <a:srgbClr val="7D8591"/>
+                </a:solidFill>
+                <a:latin typeface="+mj-lt"/>
+              </a:rPr>
+              <a:t> Documentation: https://nightlies.apache.org/flink/flink-docs-release-1.16/docs/concepts/flink-architecture/</a:t>
+            </a:r>
+            <a:endParaRPr lang="de-DE" sz="1100" dirty="0">
+              <a:solidFill>
+                <a:srgbClr val="7D8591"/>
+              </a:solidFill>
+              <a:latin typeface="+mj-lt"/>
+            </a:endParaRPr>
+          </a:p>
+          <a:p>
+            <a:pPr marL="0" indent="0">
+              <a:buNone/>
+            </a:pPr>
+            <a:r>
+              <a:rPr lang="en-US" sz="1100" dirty="0">
+                <a:solidFill>
+                  <a:srgbClr val="7D8591"/>
+                </a:solidFill>
+                <a:latin typeface="+mj-lt"/>
+              </a:rPr>
+              <a:t>7. </a:t>
+            </a:r>
+            <a:r>
+              <a:rPr lang="en-US" sz="1100" dirty="0" err="1">
+                <a:solidFill>
+                  <a:srgbClr val="7D8591"/>
+                </a:solidFill>
+                <a:latin typeface="+mj-lt"/>
+              </a:rPr>
+              <a:t>Kleppmann</a:t>
+            </a:r>
+            <a:r>
+              <a:rPr lang="en-US" sz="1100" dirty="0">
+                <a:solidFill>
+                  <a:srgbClr val="7D8591"/>
+                </a:solidFill>
+                <a:latin typeface="+mj-lt"/>
+              </a:rPr>
+              <a:t>, M. (2017). Designing Data-Intensive Applications: The Big Ideas Behind Reliable, Scalable, and Maintainable Systems. O’Reilly Media</a:t>
+            </a:r>
+          </a:p>
+          <a:p>
+            <a:pPr marL="0" indent="0">
+              <a:buNone/>
+            </a:pPr>
+            <a:r>
+              <a:rPr lang="de-DE" sz="1100" dirty="0">
+                <a:solidFill>
+                  <a:srgbClr val="7D8591"/>
+                </a:solidFill>
+                <a:latin typeface="+mj-lt"/>
+              </a:rPr>
+              <a:t>8. </a:t>
+            </a:r>
+            <a:r>
+              <a:rPr lang="en-US" sz="1100" dirty="0" err="1">
+                <a:solidFill>
+                  <a:srgbClr val="7D8591"/>
+                </a:solidFill>
+                <a:latin typeface="+mj-lt"/>
+              </a:rPr>
+              <a:t>Hueske</a:t>
+            </a:r>
+            <a:r>
+              <a:rPr lang="en-US" sz="1100" dirty="0">
+                <a:solidFill>
+                  <a:srgbClr val="7D8591"/>
+                </a:solidFill>
+                <a:latin typeface="+mj-lt"/>
+              </a:rPr>
+              <a:t>, F., &amp; </a:t>
+            </a:r>
+            <a:r>
+              <a:rPr lang="en-US" sz="1100" dirty="0" err="1">
+                <a:solidFill>
+                  <a:srgbClr val="7D8591"/>
+                </a:solidFill>
+                <a:latin typeface="+mj-lt"/>
+              </a:rPr>
+              <a:t>Kalavri</a:t>
+            </a:r>
+            <a:r>
+              <a:rPr lang="en-US" sz="1100" dirty="0">
+                <a:solidFill>
+                  <a:srgbClr val="7D8591"/>
+                </a:solidFill>
+                <a:latin typeface="+mj-lt"/>
+              </a:rPr>
+              <a:t>, V. (2019). Stream Processing with Apache </a:t>
+            </a:r>
+            <a:r>
+              <a:rPr lang="en-US" sz="1100" dirty="0" err="1">
+                <a:solidFill>
+                  <a:srgbClr val="7D8591"/>
+                </a:solidFill>
+                <a:latin typeface="+mj-lt"/>
+              </a:rPr>
+              <a:t>Flink</a:t>
+            </a:r>
+            <a:r>
+              <a:rPr lang="en-US" sz="1100" dirty="0">
+                <a:solidFill>
+                  <a:srgbClr val="7D8591"/>
+                </a:solidFill>
+                <a:latin typeface="+mj-lt"/>
+              </a:rPr>
+              <a:t> Fundamentals, Implementation, and Operation of Streaming Applications. O’Reilly Media.</a:t>
+            </a:r>
+          </a:p>
+          <a:p>
+            <a:pPr marL="0" indent="0">
+              <a:buNone/>
+            </a:pPr>
+            <a:r>
+              <a:rPr lang="de-DE" sz="1100" dirty="0">
+                <a:solidFill>
+                  <a:srgbClr val="7D8591"/>
+                </a:solidFill>
+                <a:latin typeface="+mj-lt"/>
+              </a:rPr>
+              <a:t>9. </a:t>
+            </a:r>
+            <a:r>
+              <a:rPr lang="de-DE" sz="1100" dirty="0" err="1">
+                <a:solidFill>
+                  <a:srgbClr val="7D8591"/>
+                </a:solidFill>
+                <a:latin typeface="+mj-lt"/>
+              </a:rPr>
+              <a:t>Akidau</a:t>
+            </a:r>
+            <a:r>
+              <a:rPr lang="de-DE" sz="1100" dirty="0">
+                <a:solidFill>
+                  <a:srgbClr val="7D8591"/>
+                </a:solidFill>
+                <a:latin typeface="+mj-lt"/>
+              </a:rPr>
+              <a:t>, T., </a:t>
+            </a:r>
+            <a:r>
+              <a:rPr lang="de-DE" sz="1100" dirty="0" err="1">
+                <a:solidFill>
+                  <a:srgbClr val="7D8591"/>
+                </a:solidFill>
+                <a:latin typeface="+mj-lt"/>
+              </a:rPr>
+              <a:t>Chernyak</a:t>
+            </a:r>
+            <a:r>
+              <a:rPr lang="de-DE" sz="1100" dirty="0">
+                <a:solidFill>
+                  <a:srgbClr val="7D8591"/>
+                </a:solidFill>
+                <a:latin typeface="+mj-lt"/>
+              </a:rPr>
+              <a:t>, S., &amp; Lax, R. (2018). Streaming Systems. O’Reilly Media.</a:t>
+            </a:r>
+          </a:p>
+          <a:p>
+            <a:pPr marL="0" indent="0">
+              <a:buNone/>
+            </a:pPr>
+            <a:r>
+              <a:rPr lang="de-DE" sz="1100" dirty="0">
+                <a:solidFill>
+                  <a:srgbClr val="7D8591"/>
+                </a:solidFill>
+                <a:latin typeface="+mj-lt"/>
+              </a:rPr>
+              <a:t>10. Online: Apache Software </a:t>
+            </a:r>
+            <a:r>
+              <a:rPr lang="de-DE" sz="1100" dirty="0" err="1">
+                <a:solidFill>
+                  <a:srgbClr val="7D8591"/>
+                </a:solidFill>
+                <a:latin typeface="+mj-lt"/>
+              </a:rPr>
+              <a:t>Foundation</a:t>
+            </a:r>
+            <a:r>
+              <a:rPr lang="de-DE" sz="1100" dirty="0">
+                <a:solidFill>
+                  <a:srgbClr val="7D8591"/>
+                </a:solidFill>
+                <a:latin typeface="+mj-lt"/>
+              </a:rPr>
+              <a:t> Projects </a:t>
+            </a:r>
+            <a:r>
+              <a:rPr lang="de-DE" sz="1100" dirty="0">
+                <a:solidFill>
+                  <a:srgbClr val="7D8591"/>
+                </a:solidFill>
+                <a:latin typeface="+mj-lt"/>
+                <a:hlinkClick r:id="rId3">
+                  <a:extLst>
+                    <a:ext uri="{A12FA001-AC4F-418D-AE19-62706E023703}">
+                      <ahyp:hlinkClr xmlns:ahyp="http://schemas.microsoft.com/office/drawing/2018/hyperlinkcolor" val="tx"/>
+                    </a:ext>
+                  </a:extLst>
+                </a:hlinkClick>
+              </a:rPr>
+              <a:t>https://projects.apache.org/</a:t>
+            </a:r>
+            <a:endParaRPr lang="de-DE" sz="1100" dirty="0">
+              <a:solidFill>
+                <a:srgbClr val="7D8591"/>
+              </a:solidFill>
+              <a:latin typeface="+mj-lt"/>
+            </a:endParaRPr>
+          </a:p>
+          <a:p>
+            <a:pPr marL="0" indent="0">
+              <a:buNone/>
+            </a:pPr>
+            <a:r>
+              <a:rPr lang="de-DE" sz="1100" dirty="0">
+                <a:solidFill>
+                  <a:srgbClr val="7D8591"/>
+                </a:solidFill>
+                <a:latin typeface="+mj-lt"/>
+              </a:rPr>
+              <a:t>11. Marz, N. (2015). Big Data. Manning.</a:t>
+            </a:r>
+            <a:endParaRPr lang="en-US" sz="1100" dirty="0">
+              <a:solidFill>
+                <a:srgbClr val="7D8591"/>
+              </a:solidFill>
+              <a:latin typeface="+mj-lt"/>
+            </a:endParaRPr>
+          </a:p>
+          <a:p>
+            <a:pPr marL="0" indent="0">
+              <a:buNone/>
+            </a:pPr>
+            <a:r>
+              <a:rPr lang="en-US" sz="1100" dirty="0">
+                <a:solidFill>
+                  <a:srgbClr val="7D8591"/>
+                </a:solidFill>
+                <a:latin typeface="+mj-lt"/>
+              </a:rPr>
+              <a:t>12. </a:t>
+            </a:r>
+            <a:r>
+              <a:rPr lang="en-US" sz="1100" dirty="0" err="1">
+                <a:solidFill>
+                  <a:srgbClr val="7D8591"/>
+                </a:solidFill>
+                <a:latin typeface="+mj-lt"/>
+              </a:rPr>
+              <a:t>Achari</a:t>
+            </a:r>
+            <a:r>
+              <a:rPr lang="en-US" sz="1100" dirty="0">
+                <a:solidFill>
+                  <a:srgbClr val="7D8591"/>
+                </a:solidFill>
+                <a:latin typeface="+mj-lt"/>
+              </a:rPr>
+              <a:t>, S. (2015). Hadoop Essentials. </a:t>
+            </a:r>
+            <a:r>
+              <a:rPr lang="en-US" sz="1100" dirty="0" err="1">
+                <a:solidFill>
+                  <a:srgbClr val="7D8591"/>
+                </a:solidFill>
+                <a:latin typeface="+mj-lt"/>
+              </a:rPr>
+              <a:t>Packt</a:t>
+            </a:r>
+            <a:r>
+              <a:rPr lang="en-US" sz="1100" dirty="0">
+                <a:solidFill>
+                  <a:srgbClr val="7D8591"/>
+                </a:solidFill>
+                <a:latin typeface="+mj-lt"/>
+              </a:rPr>
+              <a:t> Publishing, Limited.</a:t>
+            </a:r>
+          </a:p>
+          <a:p>
+            <a:pPr marL="0" indent="0">
+              <a:buNone/>
+            </a:pPr>
+            <a:r>
+              <a:rPr lang="en-US" sz="1100" dirty="0">
+                <a:solidFill>
+                  <a:srgbClr val="7D8591"/>
+                </a:solidFill>
+                <a:latin typeface="+mj-lt"/>
+              </a:rPr>
+              <a:t>13. Online: Apache Spark Documentation https://spark.apache.org/docs/latest/structured-streaming-programming-guide.html</a:t>
+            </a:r>
+            <a:endParaRPr lang="de-DE" sz="1050" dirty="0">
+              <a:latin typeface="+mj-lt"/>
+            </a:endParaRPr>
+          </a:p>
+          <a:p>
+            <a:pPr marL="0" indent="0">
+              <a:buNone/>
+            </a:pPr>
+            <a:r>
+              <a:rPr lang="en-US" sz="1100" dirty="0">
+                <a:solidFill>
+                  <a:schemeClr val="accent1">
+                    <a:lumMod val="75000"/>
+                  </a:schemeClr>
+                </a:solidFill>
+                <a:latin typeface="+mj-lt"/>
+              </a:rPr>
+              <a:t>14. Chang, Dean (2006). Bigtable: A Distributed Storage System for Structured Data. 7th USENIX Symposium on Operating Systems Design and Implementation (OSDI)</a:t>
+            </a:r>
+          </a:p>
+        </p:txBody>
+      </p:sp>
+    </p:spTree>
+    <p:extLst>
+      <p:ext uri="{BB962C8B-B14F-4D97-AF65-F5344CB8AC3E}">
+        <p14:creationId xmlns:p14="http://schemas.microsoft.com/office/powerpoint/2010/main" val="4157898214"/>
       </p:ext>
     </p:extLst>
   </p:cSld>

</xml_diff>